<commit_message>
I changed it after I got it from Cydni
</commit_message>
<xml_diff>
--- a/Know the Signs_When and How to Talk about Drugs.pptx
+++ b/Know the Signs_When and How to Talk about Drugs.pptx
@@ -5,7 +5,7 @@
     <p:sldMasterId id="2147483648" r:id="rId1"/>
   </p:sldMasterIdLst>
   <p:notesMasterIdLst>
-    <p:notesMasterId r:id="rId17"/>
+    <p:notesMasterId r:id="rId18"/>
   </p:notesMasterIdLst>
   <p:sldIdLst>
     <p:sldId id="256" r:id="rId2"/>
@@ -19,10 +19,11 @@
     <p:sldId id="283" r:id="rId10"/>
     <p:sldId id="284" r:id="rId11"/>
     <p:sldId id="285" r:id="rId12"/>
-    <p:sldId id="286" r:id="rId13"/>
-    <p:sldId id="287" r:id="rId14"/>
-    <p:sldId id="288" r:id="rId15"/>
-    <p:sldId id="264" r:id="rId16"/>
+    <p:sldId id="289" r:id="rId13"/>
+    <p:sldId id="286" r:id="rId14"/>
+    <p:sldId id="287" r:id="rId15"/>
+    <p:sldId id="288" r:id="rId16"/>
+    <p:sldId id="264" r:id="rId17"/>
   </p:sldIdLst>
   <p:sldSz cx="12192000" cy="6858000"/>
   <p:notesSz cx="6858000" cy="9144000"/>
@@ -539,7 +540,7 @@
               <a:buNone/>
             </a:pPr>
             <a:r>
-              <a:rPr lang="en-US" baseline="0" dirty="0" smtClean="0"/>
+              <a:rPr lang="en-US" baseline="0" dirty="0"/>
               <a:t>[Agenda]</a:t>
             </a:r>
           </a:p>
@@ -549,7 +550,7 @@
               <a:buNone/>
             </a:pPr>
             <a:r>
-              <a:rPr lang="en-US" baseline="0" dirty="0" smtClean="0"/>
+              <a:rPr lang="en-US" baseline="0" dirty="0"/>
               <a:t>Thank introducer</a:t>
             </a:r>
           </a:p>
@@ -559,7 +560,7 @@
               <a:buNone/>
             </a:pPr>
             <a:r>
-              <a:rPr lang="en-US" baseline="0" dirty="0" smtClean="0"/>
+              <a:rPr lang="en-US" baseline="0" dirty="0"/>
               <a:t>Thank the bank</a:t>
             </a:r>
           </a:p>
@@ -569,7 +570,7 @@
               <a:buNone/>
             </a:pPr>
             <a:r>
-              <a:rPr lang="en-US" baseline="0" dirty="0" smtClean="0"/>
+              <a:rPr lang="en-US" baseline="0" dirty="0"/>
               <a:t>Thank attendees</a:t>
             </a:r>
           </a:p>
@@ -579,7 +580,7 @@
               <a:buNone/>
             </a:pPr>
             <a:r>
-              <a:rPr lang="en-US" baseline="0" dirty="0" smtClean="0"/>
+              <a:rPr lang="en-US" baseline="0" dirty="0"/>
               <a:t>I used to work at Barclay’s</a:t>
             </a:r>
           </a:p>
@@ -589,7 +590,7 @@
               <a:buNone/>
             </a:pPr>
             <a:r>
-              <a:rPr lang="en-US" baseline="0" dirty="0" smtClean="0"/>
+              <a:rPr lang="en-US" baseline="0" dirty="0"/>
               <a:t>Ben died on May 4, 2013</a:t>
             </a:r>
           </a:p>
@@ -599,7 +600,7 @@
               <a:buNone/>
             </a:pPr>
             <a:r>
-              <a:rPr lang="en-US" baseline="0" dirty="0" smtClean="0"/>
+              <a:rPr lang="en-US" baseline="0" dirty="0"/>
               <a:t>Started a non profit</a:t>
             </a:r>
           </a:p>
@@ -609,7 +610,7 @@
               <a:buNone/>
             </a:pPr>
             <a:r>
-              <a:rPr lang="en-US" baseline="0" dirty="0" smtClean="0"/>
+              <a:rPr lang="en-US" baseline="0" dirty="0"/>
               <a:t>3 NYC 3 NJ</a:t>
             </a:r>
           </a:p>
@@ -619,7 +620,7 @@
               <a:buNone/>
             </a:pPr>
             <a:r>
-              <a:rPr lang="en-US" baseline="0" dirty="0" smtClean="0"/>
+              <a:rPr lang="en-US" baseline="0" dirty="0"/>
               <a:t>Goal</a:t>
             </a:r>
           </a:p>
@@ -629,7 +630,7 @@
               <a:buNone/>
             </a:pPr>
             <a:r>
-              <a:rPr lang="en-US" baseline="0" dirty="0" smtClean="0"/>
+              <a:rPr lang="en-US" baseline="0" dirty="0"/>
               <a:t>Young Children</a:t>
             </a:r>
           </a:p>
@@ -638,7 +639,7 @@
               <a:buFont typeface="Wingdings" panose="05000000000000000000" pitchFamily="2" charset="2"/>
               <a:buNone/>
             </a:pPr>
-            <a:endParaRPr lang="en-US" baseline="0" dirty="0" smtClean="0"/>
+            <a:endParaRPr lang="en-US" baseline="0" dirty="0"/>
           </a:p>
           <a:p>
             <a:endParaRPr lang="en-US" dirty="0"/>
@@ -726,37 +727,37 @@
           <a:lstStyle/>
           <a:p>
             <a:r>
-              <a:rPr lang="en-US" dirty="0" smtClean="0"/>
+              <a:rPr lang="en-US" dirty="0"/>
               <a:t>[References]</a:t>
             </a:r>
           </a:p>
           <a:p>
             <a:r>
-              <a:rPr lang="en-US" dirty="0" smtClean="0"/>
+              <a:rPr lang="en-US" dirty="0"/>
               <a:t>You can contact me though the web site</a:t>
             </a:r>
           </a:p>
           <a:p>
             <a:r>
-              <a:rPr lang="en-US" dirty="0" smtClean="0"/>
+              <a:rPr lang="en-US" dirty="0"/>
               <a:t>Tena, Sidney</a:t>
             </a:r>
           </a:p>
           <a:p>
             <a:r>
-              <a:rPr lang="en-US" dirty="0" smtClean="0"/>
+              <a:rPr lang="en-US" dirty="0"/>
               <a:t>Volunteer, teen, Sidney was 14</a:t>
             </a:r>
           </a:p>
           <a:p>
             <a:r>
-              <a:rPr lang="en-US" dirty="0" smtClean="0"/>
+              <a:rPr lang="en-US" dirty="0"/>
               <a:t>Accurately scale addictiveness</a:t>
             </a:r>
           </a:p>
           <a:p>
             <a:r>
-              <a:rPr lang="en-US" dirty="0" smtClean="0"/>
+              <a:rPr lang="en-US" dirty="0"/>
               <a:t>If you know of a town / school I would love to be invited</a:t>
             </a:r>
           </a:p>
@@ -782,7 +783,7 @@
           <a:p>
             <a:fld id="{2D9FA661-854E-6C4F-AB9D-E78DE03011CC}" type="slidenum">
               <a:rPr lang="en-US" smtClean="0"/>
-              <a:t>13</a:t>
+              <a:t>14</a:t>
             </a:fld>
             <a:endParaRPr lang="en-US"/>
           </a:p>
@@ -823,7 +824,7 @@
           <p:cNvPr id="2" name="Title 1">
             <a:extLst>
               <a:ext uri="{FF2B5EF4-FFF2-40B4-BE49-F238E27FC236}">
-                <a16:creationId xmlns="" xmlns:a16="http://schemas.microsoft.com/office/drawing/2014/main" id="{E588418B-A6DE-8D43-8F45-DC6C463F3DD5}"/>
+                <a16:creationId xmlns:a16="http://schemas.microsoft.com/office/drawing/2014/main" id="{E588418B-A6DE-8D43-8F45-DC6C463F3DD5}"/>
               </a:ext>
             </a:extLst>
           </p:cNvPr>
@@ -860,7 +861,7 @@
           <p:cNvPr id="3" name="Subtitle 2">
             <a:extLst>
               <a:ext uri="{FF2B5EF4-FFF2-40B4-BE49-F238E27FC236}">
-                <a16:creationId xmlns="" xmlns:a16="http://schemas.microsoft.com/office/drawing/2014/main" id="{AE1CE7C5-E839-3849-97A2-7E1F984472C7}"/>
+                <a16:creationId xmlns:a16="http://schemas.microsoft.com/office/drawing/2014/main" id="{AE1CE7C5-E839-3849-97A2-7E1F984472C7}"/>
               </a:ext>
             </a:extLst>
           </p:cNvPr>
@@ -930,7 +931,7 @@
           <p:cNvPr id="4" name="Date Placeholder 3">
             <a:extLst>
               <a:ext uri="{FF2B5EF4-FFF2-40B4-BE49-F238E27FC236}">
-                <a16:creationId xmlns="" xmlns:a16="http://schemas.microsoft.com/office/drawing/2014/main" id="{48DD5A3F-975D-B44E-A1E3-2B2C43920F94}"/>
+                <a16:creationId xmlns:a16="http://schemas.microsoft.com/office/drawing/2014/main" id="{48DD5A3F-975D-B44E-A1E3-2B2C43920F94}"/>
               </a:ext>
             </a:extLst>
           </p:cNvPr>
@@ -959,7 +960,7 @@
           <p:cNvPr id="5" name="Footer Placeholder 4">
             <a:extLst>
               <a:ext uri="{FF2B5EF4-FFF2-40B4-BE49-F238E27FC236}">
-                <a16:creationId xmlns="" xmlns:a16="http://schemas.microsoft.com/office/drawing/2014/main" id="{7B8C601E-189F-EF42-BDF5-E7B18169796A}"/>
+                <a16:creationId xmlns:a16="http://schemas.microsoft.com/office/drawing/2014/main" id="{7B8C601E-189F-EF42-BDF5-E7B18169796A}"/>
               </a:ext>
             </a:extLst>
           </p:cNvPr>
@@ -984,7 +985,7 @@
           <p:cNvPr id="6" name="Slide Number Placeholder 5">
             <a:extLst>
               <a:ext uri="{FF2B5EF4-FFF2-40B4-BE49-F238E27FC236}">
-                <a16:creationId xmlns="" xmlns:a16="http://schemas.microsoft.com/office/drawing/2014/main" id="{BE35C719-EFE3-BA44-9B79-C47CD2C01C77}"/>
+                <a16:creationId xmlns:a16="http://schemas.microsoft.com/office/drawing/2014/main" id="{BE35C719-EFE3-BA44-9B79-C47CD2C01C77}"/>
               </a:ext>
             </a:extLst>
           </p:cNvPr>
@@ -1043,7 +1044,7 @@
           <p:cNvPr id="2" name="Title 1">
             <a:extLst>
               <a:ext uri="{FF2B5EF4-FFF2-40B4-BE49-F238E27FC236}">
-                <a16:creationId xmlns="" xmlns:a16="http://schemas.microsoft.com/office/drawing/2014/main" id="{8A0F0800-3B78-7046-9F03-7FDB15CBC529}"/>
+                <a16:creationId xmlns:a16="http://schemas.microsoft.com/office/drawing/2014/main" id="{8A0F0800-3B78-7046-9F03-7FDB15CBC529}"/>
               </a:ext>
             </a:extLst>
           </p:cNvPr>
@@ -1071,7 +1072,7 @@
           <p:cNvPr id="3" name="Vertical Text Placeholder 2">
             <a:extLst>
               <a:ext uri="{FF2B5EF4-FFF2-40B4-BE49-F238E27FC236}">
-                <a16:creationId xmlns="" xmlns:a16="http://schemas.microsoft.com/office/drawing/2014/main" id="{3407C157-CF74-F745-970C-B5B16FBE5A18}"/>
+                <a16:creationId xmlns:a16="http://schemas.microsoft.com/office/drawing/2014/main" id="{3407C157-CF74-F745-970C-B5B16FBE5A18}"/>
               </a:ext>
             </a:extLst>
           </p:cNvPr>
@@ -1128,7 +1129,7 @@
           <p:cNvPr id="4" name="Date Placeholder 3">
             <a:extLst>
               <a:ext uri="{FF2B5EF4-FFF2-40B4-BE49-F238E27FC236}">
-                <a16:creationId xmlns="" xmlns:a16="http://schemas.microsoft.com/office/drawing/2014/main" id="{10D2E06D-49D1-8346-AF30-A7A58266C99B}"/>
+                <a16:creationId xmlns:a16="http://schemas.microsoft.com/office/drawing/2014/main" id="{10D2E06D-49D1-8346-AF30-A7A58266C99B}"/>
               </a:ext>
             </a:extLst>
           </p:cNvPr>
@@ -1157,7 +1158,7 @@
           <p:cNvPr id="5" name="Footer Placeholder 4">
             <a:extLst>
               <a:ext uri="{FF2B5EF4-FFF2-40B4-BE49-F238E27FC236}">
-                <a16:creationId xmlns="" xmlns:a16="http://schemas.microsoft.com/office/drawing/2014/main" id="{FED0E39C-C906-6340-8888-F8D486564BE8}"/>
+                <a16:creationId xmlns:a16="http://schemas.microsoft.com/office/drawing/2014/main" id="{FED0E39C-C906-6340-8888-F8D486564BE8}"/>
               </a:ext>
             </a:extLst>
           </p:cNvPr>
@@ -1182,7 +1183,7 @@
           <p:cNvPr id="6" name="Slide Number Placeholder 5">
             <a:extLst>
               <a:ext uri="{FF2B5EF4-FFF2-40B4-BE49-F238E27FC236}">
-                <a16:creationId xmlns="" xmlns:a16="http://schemas.microsoft.com/office/drawing/2014/main" id="{3A4BF487-65FD-1C43-83BA-1432C716B4D7}"/>
+                <a16:creationId xmlns:a16="http://schemas.microsoft.com/office/drawing/2014/main" id="{3A4BF487-65FD-1C43-83BA-1432C716B4D7}"/>
               </a:ext>
             </a:extLst>
           </p:cNvPr>
@@ -1241,7 +1242,7 @@
           <p:cNvPr id="2" name="Vertical Title 1">
             <a:extLst>
               <a:ext uri="{FF2B5EF4-FFF2-40B4-BE49-F238E27FC236}">
-                <a16:creationId xmlns="" xmlns:a16="http://schemas.microsoft.com/office/drawing/2014/main" id="{A899EA69-7604-414A-A906-CC3E0E69CC7E}"/>
+                <a16:creationId xmlns:a16="http://schemas.microsoft.com/office/drawing/2014/main" id="{A899EA69-7604-414A-A906-CC3E0E69CC7E}"/>
               </a:ext>
             </a:extLst>
           </p:cNvPr>
@@ -1274,7 +1275,7 @@
           <p:cNvPr id="3" name="Vertical Text Placeholder 2">
             <a:extLst>
               <a:ext uri="{FF2B5EF4-FFF2-40B4-BE49-F238E27FC236}">
-                <a16:creationId xmlns="" xmlns:a16="http://schemas.microsoft.com/office/drawing/2014/main" id="{075B694F-87C6-CB48-99D1-30A51F219901}"/>
+                <a16:creationId xmlns:a16="http://schemas.microsoft.com/office/drawing/2014/main" id="{075B694F-87C6-CB48-99D1-30A51F219901}"/>
               </a:ext>
             </a:extLst>
           </p:cNvPr>
@@ -1336,7 +1337,7 @@
           <p:cNvPr id="4" name="Date Placeholder 3">
             <a:extLst>
               <a:ext uri="{FF2B5EF4-FFF2-40B4-BE49-F238E27FC236}">
-                <a16:creationId xmlns="" xmlns:a16="http://schemas.microsoft.com/office/drawing/2014/main" id="{C7D42998-F4E4-1043-BCB6-07AA5282209E}"/>
+                <a16:creationId xmlns:a16="http://schemas.microsoft.com/office/drawing/2014/main" id="{C7D42998-F4E4-1043-BCB6-07AA5282209E}"/>
               </a:ext>
             </a:extLst>
           </p:cNvPr>
@@ -1365,7 +1366,7 @@
           <p:cNvPr id="5" name="Footer Placeholder 4">
             <a:extLst>
               <a:ext uri="{FF2B5EF4-FFF2-40B4-BE49-F238E27FC236}">
-                <a16:creationId xmlns="" xmlns:a16="http://schemas.microsoft.com/office/drawing/2014/main" id="{C9BA0479-7C00-7B41-BBA6-8DF28263FF74}"/>
+                <a16:creationId xmlns:a16="http://schemas.microsoft.com/office/drawing/2014/main" id="{C9BA0479-7C00-7B41-BBA6-8DF28263FF74}"/>
               </a:ext>
             </a:extLst>
           </p:cNvPr>
@@ -1390,7 +1391,7 @@
           <p:cNvPr id="6" name="Slide Number Placeholder 5">
             <a:extLst>
               <a:ext uri="{FF2B5EF4-FFF2-40B4-BE49-F238E27FC236}">
-                <a16:creationId xmlns="" xmlns:a16="http://schemas.microsoft.com/office/drawing/2014/main" id="{35A86DAB-05F6-7849-9D65-F80D9814D51D}"/>
+                <a16:creationId xmlns:a16="http://schemas.microsoft.com/office/drawing/2014/main" id="{35A86DAB-05F6-7849-9D65-F80D9814D51D}"/>
               </a:ext>
             </a:extLst>
           </p:cNvPr>
@@ -1449,7 +1450,7 @@
           <p:cNvPr id="2" name="Title 1">
             <a:extLst>
               <a:ext uri="{FF2B5EF4-FFF2-40B4-BE49-F238E27FC236}">
-                <a16:creationId xmlns="" xmlns:a16="http://schemas.microsoft.com/office/drawing/2014/main" id="{D5337368-112D-7647-87D5-07D43436F6E6}"/>
+                <a16:creationId xmlns:a16="http://schemas.microsoft.com/office/drawing/2014/main" id="{D5337368-112D-7647-87D5-07D43436F6E6}"/>
               </a:ext>
             </a:extLst>
           </p:cNvPr>
@@ -1477,7 +1478,7 @@
           <p:cNvPr id="3" name="Content Placeholder 2">
             <a:extLst>
               <a:ext uri="{FF2B5EF4-FFF2-40B4-BE49-F238E27FC236}">
-                <a16:creationId xmlns="" xmlns:a16="http://schemas.microsoft.com/office/drawing/2014/main" id="{2BD9680C-9FFD-5143-A016-1B4CEDCEF388}"/>
+                <a16:creationId xmlns:a16="http://schemas.microsoft.com/office/drawing/2014/main" id="{2BD9680C-9FFD-5143-A016-1B4CEDCEF388}"/>
               </a:ext>
             </a:extLst>
           </p:cNvPr>
@@ -1534,7 +1535,7 @@
           <p:cNvPr id="4" name="Date Placeholder 3">
             <a:extLst>
               <a:ext uri="{FF2B5EF4-FFF2-40B4-BE49-F238E27FC236}">
-                <a16:creationId xmlns="" xmlns:a16="http://schemas.microsoft.com/office/drawing/2014/main" id="{3496A5C2-AA89-6247-AD1E-4B229868DD4C}"/>
+                <a16:creationId xmlns:a16="http://schemas.microsoft.com/office/drawing/2014/main" id="{3496A5C2-AA89-6247-AD1E-4B229868DD4C}"/>
               </a:ext>
             </a:extLst>
           </p:cNvPr>
@@ -1563,7 +1564,7 @@
           <p:cNvPr id="5" name="Footer Placeholder 4">
             <a:extLst>
               <a:ext uri="{FF2B5EF4-FFF2-40B4-BE49-F238E27FC236}">
-                <a16:creationId xmlns="" xmlns:a16="http://schemas.microsoft.com/office/drawing/2014/main" id="{B4EB4D15-2FC3-E246-A99D-2B3B371DA48C}"/>
+                <a16:creationId xmlns:a16="http://schemas.microsoft.com/office/drawing/2014/main" id="{B4EB4D15-2FC3-E246-A99D-2B3B371DA48C}"/>
               </a:ext>
             </a:extLst>
           </p:cNvPr>
@@ -1588,7 +1589,7 @@
           <p:cNvPr id="6" name="Slide Number Placeholder 5">
             <a:extLst>
               <a:ext uri="{FF2B5EF4-FFF2-40B4-BE49-F238E27FC236}">
-                <a16:creationId xmlns="" xmlns:a16="http://schemas.microsoft.com/office/drawing/2014/main" id="{E6387981-38B0-474D-B958-662FE41CF7A0}"/>
+                <a16:creationId xmlns:a16="http://schemas.microsoft.com/office/drawing/2014/main" id="{E6387981-38B0-474D-B958-662FE41CF7A0}"/>
               </a:ext>
             </a:extLst>
           </p:cNvPr>
@@ -1647,7 +1648,7 @@
           <p:cNvPr id="2" name="Title 1">
             <a:extLst>
               <a:ext uri="{FF2B5EF4-FFF2-40B4-BE49-F238E27FC236}">
-                <a16:creationId xmlns="" xmlns:a16="http://schemas.microsoft.com/office/drawing/2014/main" id="{2DED3023-4546-8946-8303-43C272E3CBE8}"/>
+                <a16:creationId xmlns:a16="http://schemas.microsoft.com/office/drawing/2014/main" id="{2DED3023-4546-8946-8303-43C272E3CBE8}"/>
               </a:ext>
             </a:extLst>
           </p:cNvPr>
@@ -1684,7 +1685,7 @@
           <p:cNvPr id="3" name="Text Placeholder 2">
             <a:extLst>
               <a:ext uri="{FF2B5EF4-FFF2-40B4-BE49-F238E27FC236}">
-                <a16:creationId xmlns="" xmlns:a16="http://schemas.microsoft.com/office/drawing/2014/main" id="{940933E9-FAAA-3042-B8AD-F9B1D9711264}"/>
+                <a16:creationId xmlns:a16="http://schemas.microsoft.com/office/drawing/2014/main" id="{940933E9-FAAA-3042-B8AD-F9B1D9711264}"/>
               </a:ext>
             </a:extLst>
           </p:cNvPr>
@@ -1809,7 +1810,7 @@
           <p:cNvPr id="4" name="Date Placeholder 3">
             <a:extLst>
               <a:ext uri="{FF2B5EF4-FFF2-40B4-BE49-F238E27FC236}">
-                <a16:creationId xmlns="" xmlns:a16="http://schemas.microsoft.com/office/drawing/2014/main" id="{0C26F230-D6E7-744F-9B14-82E14849DCD0}"/>
+                <a16:creationId xmlns:a16="http://schemas.microsoft.com/office/drawing/2014/main" id="{0C26F230-D6E7-744F-9B14-82E14849DCD0}"/>
               </a:ext>
             </a:extLst>
           </p:cNvPr>
@@ -1838,7 +1839,7 @@
           <p:cNvPr id="5" name="Footer Placeholder 4">
             <a:extLst>
               <a:ext uri="{FF2B5EF4-FFF2-40B4-BE49-F238E27FC236}">
-                <a16:creationId xmlns="" xmlns:a16="http://schemas.microsoft.com/office/drawing/2014/main" id="{8B83D4CD-A53F-424A-9954-DE6692110116}"/>
+                <a16:creationId xmlns:a16="http://schemas.microsoft.com/office/drawing/2014/main" id="{8B83D4CD-A53F-424A-9954-DE6692110116}"/>
               </a:ext>
             </a:extLst>
           </p:cNvPr>
@@ -1863,7 +1864,7 @@
           <p:cNvPr id="6" name="Slide Number Placeholder 5">
             <a:extLst>
               <a:ext uri="{FF2B5EF4-FFF2-40B4-BE49-F238E27FC236}">
-                <a16:creationId xmlns="" xmlns:a16="http://schemas.microsoft.com/office/drawing/2014/main" id="{33391748-53E3-E447-A2B3-88348AD1D3C6}"/>
+                <a16:creationId xmlns:a16="http://schemas.microsoft.com/office/drawing/2014/main" id="{33391748-53E3-E447-A2B3-88348AD1D3C6}"/>
               </a:ext>
             </a:extLst>
           </p:cNvPr>
@@ -1922,7 +1923,7 @@
           <p:cNvPr id="2" name="Title 1">
             <a:extLst>
               <a:ext uri="{FF2B5EF4-FFF2-40B4-BE49-F238E27FC236}">
-                <a16:creationId xmlns="" xmlns:a16="http://schemas.microsoft.com/office/drawing/2014/main" id="{644734D9-D319-E546-9D4D-004C62596606}"/>
+                <a16:creationId xmlns:a16="http://schemas.microsoft.com/office/drawing/2014/main" id="{644734D9-D319-E546-9D4D-004C62596606}"/>
               </a:ext>
             </a:extLst>
           </p:cNvPr>
@@ -1950,7 +1951,7 @@
           <p:cNvPr id="3" name="Content Placeholder 2">
             <a:extLst>
               <a:ext uri="{FF2B5EF4-FFF2-40B4-BE49-F238E27FC236}">
-                <a16:creationId xmlns="" xmlns:a16="http://schemas.microsoft.com/office/drawing/2014/main" id="{AB1C8503-BD2F-E643-8473-3B1EC1085120}"/>
+                <a16:creationId xmlns:a16="http://schemas.microsoft.com/office/drawing/2014/main" id="{AB1C8503-BD2F-E643-8473-3B1EC1085120}"/>
               </a:ext>
             </a:extLst>
           </p:cNvPr>
@@ -2012,7 +2013,7 @@
           <p:cNvPr id="4" name="Content Placeholder 3">
             <a:extLst>
               <a:ext uri="{FF2B5EF4-FFF2-40B4-BE49-F238E27FC236}">
-                <a16:creationId xmlns="" xmlns:a16="http://schemas.microsoft.com/office/drawing/2014/main" id="{995BDC64-6141-6844-B2ED-A2D241B9C895}"/>
+                <a16:creationId xmlns:a16="http://schemas.microsoft.com/office/drawing/2014/main" id="{995BDC64-6141-6844-B2ED-A2D241B9C895}"/>
               </a:ext>
             </a:extLst>
           </p:cNvPr>
@@ -2074,7 +2075,7 @@
           <p:cNvPr id="5" name="Date Placeholder 4">
             <a:extLst>
               <a:ext uri="{FF2B5EF4-FFF2-40B4-BE49-F238E27FC236}">
-                <a16:creationId xmlns="" xmlns:a16="http://schemas.microsoft.com/office/drawing/2014/main" id="{662F0519-FBE1-4F4E-B4A1-89B16E48A13A}"/>
+                <a16:creationId xmlns:a16="http://schemas.microsoft.com/office/drawing/2014/main" id="{662F0519-FBE1-4F4E-B4A1-89B16E48A13A}"/>
               </a:ext>
             </a:extLst>
           </p:cNvPr>
@@ -2103,7 +2104,7 @@
           <p:cNvPr id="6" name="Footer Placeholder 5">
             <a:extLst>
               <a:ext uri="{FF2B5EF4-FFF2-40B4-BE49-F238E27FC236}">
-                <a16:creationId xmlns="" xmlns:a16="http://schemas.microsoft.com/office/drawing/2014/main" id="{08A15D0E-32D3-DD4C-8A18-AB66F260A895}"/>
+                <a16:creationId xmlns:a16="http://schemas.microsoft.com/office/drawing/2014/main" id="{08A15D0E-32D3-DD4C-8A18-AB66F260A895}"/>
               </a:ext>
             </a:extLst>
           </p:cNvPr>
@@ -2128,7 +2129,7 @@
           <p:cNvPr id="7" name="Slide Number Placeholder 6">
             <a:extLst>
               <a:ext uri="{FF2B5EF4-FFF2-40B4-BE49-F238E27FC236}">
-                <a16:creationId xmlns="" xmlns:a16="http://schemas.microsoft.com/office/drawing/2014/main" id="{EE3A626E-7BF8-864B-8D98-880CF871CA2E}"/>
+                <a16:creationId xmlns:a16="http://schemas.microsoft.com/office/drawing/2014/main" id="{EE3A626E-7BF8-864B-8D98-880CF871CA2E}"/>
               </a:ext>
             </a:extLst>
           </p:cNvPr>
@@ -2187,7 +2188,7 @@
           <p:cNvPr id="2" name="Title 1">
             <a:extLst>
               <a:ext uri="{FF2B5EF4-FFF2-40B4-BE49-F238E27FC236}">
-                <a16:creationId xmlns="" xmlns:a16="http://schemas.microsoft.com/office/drawing/2014/main" id="{3E1C5939-77C4-4F47-802F-DD075CDC928F}"/>
+                <a16:creationId xmlns:a16="http://schemas.microsoft.com/office/drawing/2014/main" id="{3E1C5939-77C4-4F47-802F-DD075CDC928F}"/>
               </a:ext>
             </a:extLst>
           </p:cNvPr>
@@ -2220,7 +2221,7 @@
           <p:cNvPr id="3" name="Text Placeholder 2">
             <a:extLst>
               <a:ext uri="{FF2B5EF4-FFF2-40B4-BE49-F238E27FC236}">
-                <a16:creationId xmlns="" xmlns:a16="http://schemas.microsoft.com/office/drawing/2014/main" id="{D1DF791B-499B-654E-B203-79191F47F444}"/>
+                <a16:creationId xmlns:a16="http://schemas.microsoft.com/office/drawing/2014/main" id="{D1DF791B-499B-654E-B203-79191F47F444}"/>
               </a:ext>
             </a:extLst>
           </p:cNvPr>
@@ -2291,7 +2292,7 @@
           <p:cNvPr id="4" name="Content Placeholder 3">
             <a:extLst>
               <a:ext uri="{FF2B5EF4-FFF2-40B4-BE49-F238E27FC236}">
-                <a16:creationId xmlns="" xmlns:a16="http://schemas.microsoft.com/office/drawing/2014/main" id="{867567A7-F453-7343-818A-FF58B018D7BE}"/>
+                <a16:creationId xmlns:a16="http://schemas.microsoft.com/office/drawing/2014/main" id="{867567A7-F453-7343-818A-FF58B018D7BE}"/>
               </a:ext>
             </a:extLst>
           </p:cNvPr>
@@ -2353,7 +2354,7 @@
           <p:cNvPr id="5" name="Text Placeholder 4">
             <a:extLst>
               <a:ext uri="{FF2B5EF4-FFF2-40B4-BE49-F238E27FC236}">
-                <a16:creationId xmlns="" xmlns:a16="http://schemas.microsoft.com/office/drawing/2014/main" id="{A480518B-6F13-EA4A-8343-6D4C990EBA4E}"/>
+                <a16:creationId xmlns:a16="http://schemas.microsoft.com/office/drawing/2014/main" id="{A480518B-6F13-EA4A-8343-6D4C990EBA4E}"/>
               </a:ext>
             </a:extLst>
           </p:cNvPr>
@@ -2424,7 +2425,7 @@
           <p:cNvPr id="6" name="Content Placeholder 5">
             <a:extLst>
               <a:ext uri="{FF2B5EF4-FFF2-40B4-BE49-F238E27FC236}">
-                <a16:creationId xmlns="" xmlns:a16="http://schemas.microsoft.com/office/drawing/2014/main" id="{8A70A1A9-FCA2-B246-B637-10028A35098D}"/>
+                <a16:creationId xmlns:a16="http://schemas.microsoft.com/office/drawing/2014/main" id="{8A70A1A9-FCA2-B246-B637-10028A35098D}"/>
               </a:ext>
             </a:extLst>
           </p:cNvPr>
@@ -2486,7 +2487,7 @@
           <p:cNvPr id="7" name="Date Placeholder 6">
             <a:extLst>
               <a:ext uri="{FF2B5EF4-FFF2-40B4-BE49-F238E27FC236}">
-                <a16:creationId xmlns="" xmlns:a16="http://schemas.microsoft.com/office/drawing/2014/main" id="{1EC4E2B1-DF33-6A42-8B2D-3B8988D5139E}"/>
+                <a16:creationId xmlns:a16="http://schemas.microsoft.com/office/drawing/2014/main" id="{1EC4E2B1-DF33-6A42-8B2D-3B8988D5139E}"/>
               </a:ext>
             </a:extLst>
           </p:cNvPr>
@@ -2515,7 +2516,7 @@
           <p:cNvPr id="8" name="Footer Placeholder 7">
             <a:extLst>
               <a:ext uri="{FF2B5EF4-FFF2-40B4-BE49-F238E27FC236}">
-                <a16:creationId xmlns="" xmlns:a16="http://schemas.microsoft.com/office/drawing/2014/main" id="{DB88758D-CDB2-FE44-86E3-9D78AABD9BCE}"/>
+                <a16:creationId xmlns:a16="http://schemas.microsoft.com/office/drawing/2014/main" id="{DB88758D-CDB2-FE44-86E3-9D78AABD9BCE}"/>
               </a:ext>
             </a:extLst>
           </p:cNvPr>
@@ -2540,7 +2541,7 @@
           <p:cNvPr id="9" name="Slide Number Placeholder 8">
             <a:extLst>
               <a:ext uri="{FF2B5EF4-FFF2-40B4-BE49-F238E27FC236}">
-                <a16:creationId xmlns="" xmlns:a16="http://schemas.microsoft.com/office/drawing/2014/main" id="{52BFB8E1-1EDB-B642-B4E2-52120C51321D}"/>
+                <a16:creationId xmlns:a16="http://schemas.microsoft.com/office/drawing/2014/main" id="{52BFB8E1-1EDB-B642-B4E2-52120C51321D}"/>
               </a:ext>
             </a:extLst>
           </p:cNvPr>
@@ -2599,7 +2600,7 @@
           <p:cNvPr id="2" name="Title 1">
             <a:extLst>
               <a:ext uri="{FF2B5EF4-FFF2-40B4-BE49-F238E27FC236}">
-                <a16:creationId xmlns="" xmlns:a16="http://schemas.microsoft.com/office/drawing/2014/main" id="{2009A996-8A9A-B344-BF3D-F471F396895C}"/>
+                <a16:creationId xmlns:a16="http://schemas.microsoft.com/office/drawing/2014/main" id="{2009A996-8A9A-B344-BF3D-F471F396895C}"/>
               </a:ext>
             </a:extLst>
           </p:cNvPr>
@@ -2627,7 +2628,7 @@
           <p:cNvPr id="3" name="Date Placeholder 2">
             <a:extLst>
               <a:ext uri="{FF2B5EF4-FFF2-40B4-BE49-F238E27FC236}">
-                <a16:creationId xmlns="" xmlns:a16="http://schemas.microsoft.com/office/drawing/2014/main" id="{39AA58D4-5CD7-7A44-A25A-4746F8CDCAC7}"/>
+                <a16:creationId xmlns:a16="http://schemas.microsoft.com/office/drawing/2014/main" id="{39AA58D4-5CD7-7A44-A25A-4746F8CDCAC7}"/>
               </a:ext>
             </a:extLst>
           </p:cNvPr>
@@ -2656,7 +2657,7 @@
           <p:cNvPr id="4" name="Footer Placeholder 3">
             <a:extLst>
               <a:ext uri="{FF2B5EF4-FFF2-40B4-BE49-F238E27FC236}">
-                <a16:creationId xmlns="" xmlns:a16="http://schemas.microsoft.com/office/drawing/2014/main" id="{A37B593A-BB62-3D4E-91C1-2548ACDB290E}"/>
+                <a16:creationId xmlns:a16="http://schemas.microsoft.com/office/drawing/2014/main" id="{A37B593A-BB62-3D4E-91C1-2548ACDB290E}"/>
               </a:ext>
             </a:extLst>
           </p:cNvPr>
@@ -2681,7 +2682,7 @@
           <p:cNvPr id="5" name="Slide Number Placeholder 4">
             <a:extLst>
               <a:ext uri="{FF2B5EF4-FFF2-40B4-BE49-F238E27FC236}">
-                <a16:creationId xmlns="" xmlns:a16="http://schemas.microsoft.com/office/drawing/2014/main" id="{D7206E35-5615-FE42-A244-1A266D56F539}"/>
+                <a16:creationId xmlns:a16="http://schemas.microsoft.com/office/drawing/2014/main" id="{D7206E35-5615-FE42-A244-1A266D56F539}"/>
               </a:ext>
             </a:extLst>
           </p:cNvPr>
@@ -2740,7 +2741,7 @@
           <p:cNvPr id="2" name="Date Placeholder 1">
             <a:extLst>
               <a:ext uri="{FF2B5EF4-FFF2-40B4-BE49-F238E27FC236}">
-                <a16:creationId xmlns="" xmlns:a16="http://schemas.microsoft.com/office/drawing/2014/main" id="{B79B2E51-3DD8-AC4B-B365-3D1B4E75E489}"/>
+                <a16:creationId xmlns:a16="http://schemas.microsoft.com/office/drawing/2014/main" id="{B79B2E51-3DD8-AC4B-B365-3D1B4E75E489}"/>
               </a:ext>
             </a:extLst>
           </p:cNvPr>
@@ -2769,7 +2770,7 @@
           <p:cNvPr id="3" name="Footer Placeholder 2">
             <a:extLst>
               <a:ext uri="{FF2B5EF4-FFF2-40B4-BE49-F238E27FC236}">
-                <a16:creationId xmlns="" xmlns:a16="http://schemas.microsoft.com/office/drawing/2014/main" id="{9647DCEC-68F1-4E44-9B9E-A748FA83F3C1}"/>
+                <a16:creationId xmlns:a16="http://schemas.microsoft.com/office/drawing/2014/main" id="{9647DCEC-68F1-4E44-9B9E-A748FA83F3C1}"/>
               </a:ext>
             </a:extLst>
           </p:cNvPr>
@@ -2794,7 +2795,7 @@
           <p:cNvPr id="4" name="Slide Number Placeholder 3">
             <a:extLst>
               <a:ext uri="{FF2B5EF4-FFF2-40B4-BE49-F238E27FC236}">
-                <a16:creationId xmlns="" xmlns:a16="http://schemas.microsoft.com/office/drawing/2014/main" id="{CE0084A6-642C-594B-940A-FB1936F3C737}"/>
+                <a16:creationId xmlns:a16="http://schemas.microsoft.com/office/drawing/2014/main" id="{CE0084A6-642C-594B-940A-FB1936F3C737}"/>
               </a:ext>
             </a:extLst>
           </p:cNvPr>
@@ -2853,7 +2854,7 @@
           <p:cNvPr id="2" name="Title 1">
             <a:extLst>
               <a:ext uri="{FF2B5EF4-FFF2-40B4-BE49-F238E27FC236}">
-                <a16:creationId xmlns="" xmlns:a16="http://schemas.microsoft.com/office/drawing/2014/main" id="{154E8861-A207-EF41-9921-AB983D4660D2}"/>
+                <a16:creationId xmlns:a16="http://schemas.microsoft.com/office/drawing/2014/main" id="{154E8861-A207-EF41-9921-AB983D4660D2}"/>
               </a:ext>
             </a:extLst>
           </p:cNvPr>
@@ -2890,7 +2891,7 @@
           <p:cNvPr id="3" name="Content Placeholder 2">
             <a:extLst>
               <a:ext uri="{FF2B5EF4-FFF2-40B4-BE49-F238E27FC236}">
-                <a16:creationId xmlns="" xmlns:a16="http://schemas.microsoft.com/office/drawing/2014/main" id="{F4F6EB9B-9337-B143-8BD0-09B4440A770D}"/>
+                <a16:creationId xmlns:a16="http://schemas.microsoft.com/office/drawing/2014/main" id="{F4F6EB9B-9337-B143-8BD0-09B4440A770D}"/>
               </a:ext>
             </a:extLst>
           </p:cNvPr>
@@ -2980,7 +2981,7 @@
           <p:cNvPr id="4" name="Text Placeholder 3">
             <a:extLst>
               <a:ext uri="{FF2B5EF4-FFF2-40B4-BE49-F238E27FC236}">
-                <a16:creationId xmlns="" xmlns:a16="http://schemas.microsoft.com/office/drawing/2014/main" id="{4117C306-7318-064A-9E37-7E559CA8FBB0}"/>
+                <a16:creationId xmlns:a16="http://schemas.microsoft.com/office/drawing/2014/main" id="{4117C306-7318-064A-9E37-7E559CA8FBB0}"/>
               </a:ext>
             </a:extLst>
           </p:cNvPr>
@@ -3051,7 +3052,7 @@
           <p:cNvPr id="5" name="Date Placeholder 4">
             <a:extLst>
               <a:ext uri="{FF2B5EF4-FFF2-40B4-BE49-F238E27FC236}">
-                <a16:creationId xmlns="" xmlns:a16="http://schemas.microsoft.com/office/drawing/2014/main" id="{6265A917-1B57-764D-89AA-7A6F78F76332}"/>
+                <a16:creationId xmlns:a16="http://schemas.microsoft.com/office/drawing/2014/main" id="{6265A917-1B57-764D-89AA-7A6F78F76332}"/>
               </a:ext>
             </a:extLst>
           </p:cNvPr>
@@ -3080,7 +3081,7 @@
           <p:cNvPr id="6" name="Footer Placeholder 5">
             <a:extLst>
               <a:ext uri="{FF2B5EF4-FFF2-40B4-BE49-F238E27FC236}">
-                <a16:creationId xmlns="" xmlns:a16="http://schemas.microsoft.com/office/drawing/2014/main" id="{0808C17E-79F9-5240-AF08-A54DDCE6F954}"/>
+                <a16:creationId xmlns:a16="http://schemas.microsoft.com/office/drawing/2014/main" id="{0808C17E-79F9-5240-AF08-A54DDCE6F954}"/>
               </a:ext>
             </a:extLst>
           </p:cNvPr>
@@ -3105,7 +3106,7 @@
           <p:cNvPr id="7" name="Slide Number Placeholder 6">
             <a:extLst>
               <a:ext uri="{FF2B5EF4-FFF2-40B4-BE49-F238E27FC236}">
-                <a16:creationId xmlns="" xmlns:a16="http://schemas.microsoft.com/office/drawing/2014/main" id="{E95BCBD1-2E9A-AF46-8A13-7E3F360DC3FB}"/>
+                <a16:creationId xmlns:a16="http://schemas.microsoft.com/office/drawing/2014/main" id="{E95BCBD1-2E9A-AF46-8A13-7E3F360DC3FB}"/>
               </a:ext>
             </a:extLst>
           </p:cNvPr>
@@ -3164,7 +3165,7 @@
           <p:cNvPr id="2" name="Title 1">
             <a:extLst>
               <a:ext uri="{FF2B5EF4-FFF2-40B4-BE49-F238E27FC236}">
-                <a16:creationId xmlns="" xmlns:a16="http://schemas.microsoft.com/office/drawing/2014/main" id="{CD656AE0-F8AF-4843-AB4D-A4223378124B}"/>
+                <a16:creationId xmlns:a16="http://schemas.microsoft.com/office/drawing/2014/main" id="{CD656AE0-F8AF-4843-AB4D-A4223378124B}"/>
               </a:ext>
             </a:extLst>
           </p:cNvPr>
@@ -3201,7 +3202,7 @@
           <p:cNvPr id="3" name="Picture Placeholder 2">
             <a:extLst>
               <a:ext uri="{FF2B5EF4-FFF2-40B4-BE49-F238E27FC236}">
-                <a16:creationId xmlns="" xmlns:a16="http://schemas.microsoft.com/office/drawing/2014/main" id="{80E7016B-6806-154B-A859-1DB55CC368D3}"/>
+                <a16:creationId xmlns:a16="http://schemas.microsoft.com/office/drawing/2014/main" id="{80E7016B-6806-154B-A859-1DB55CC368D3}"/>
               </a:ext>
             </a:extLst>
           </p:cNvPr>
@@ -3268,7 +3269,7 @@
           <p:cNvPr id="4" name="Text Placeholder 3">
             <a:extLst>
               <a:ext uri="{FF2B5EF4-FFF2-40B4-BE49-F238E27FC236}">
-                <a16:creationId xmlns="" xmlns:a16="http://schemas.microsoft.com/office/drawing/2014/main" id="{853137BE-0A64-254F-87DF-34454B7C75C2}"/>
+                <a16:creationId xmlns:a16="http://schemas.microsoft.com/office/drawing/2014/main" id="{853137BE-0A64-254F-87DF-34454B7C75C2}"/>
               </a:ext>
             </a:extLst>
           </p:cNvPr>
@@ -3339,7 +3340,7 @@
           <p:cNvPr id="5" name="Date Placeholder 4">
             <a:extLst>
               <a:ext uri="{FF2B5EF4-FFF2-40B4-BE49-F238E27FC236}">
-                <a16:creationId xmlns="" xmlns:a16="http://schemas.microsoft.com/office/drawing/2014/main" id="{2F3C036A-1BE6-7C4C-9115-D722FCE759E3}"/>
+                <a16:creationId xmlns:a16="http://schemas.microsoft.com/office/drawing/2014/main" id="{2F3C036A-1BE6-7C4C-9115-D722FCE759E3}"/>
               </a:ext>
             </a:extLst>
           </p:cNvPr>
@@ -3368,7 +3369,7 @@
           <p:cNvPr id="6" name="Footer Placeholder 5">
             <a:extLst>
               <a:ext uri="{FF2B5EF4-FFF2-40B4-BE49-F238E27FC236}">
-                <a16:creationId xmlns="" xmlns:a16="http://schemas.microsoft.com/office/drawing/2014/main" id="{85DF9699-9007-A749-AA7D-5E4EA2ABAC16}"/>
+                <a16:creationId xmlns:a16="http://schemas.microsoft.com/office/drawing/2014/main" id="{85DF9699-9007-A749-AA7D-5E4EA2ABAC16}"/>
               </a:ext>
             </a:extLst>
           </p:cNvPr>
@@ -3393,7 +3394,7 @@
           <p:cNvPr id="7" name="Slide Number Placeholder 6">
             <a:extLst>
               <a:ext uri="{FF2B5EF4-FFF2-40B4-BE49-F238E27FC236}">
-                <a16:creationId xmlns="" xmlns:a16="http://schemas.microsoft.com/office/drawing/2014/main" id="{5C2F2665-7610-FE49-89A1-2FCAD96F26C5}"/>
+                <a16:creationId xmlns:a16="http://schemas.microsoft.com/office/drawing/2014/main" id="{5C2F2665-7610-FE49-89A1-2FCAD96F26C5}"/>
               </a:ext>
             </a:extLst>
           </p:cNvPr>
@@ -3457,7 +3458,7 @@
           <p:cNvPr id="2" name="Title Placeholder 1">
             <a:extLst>
               <a:ext uri="{FF2B5EF4-FFF2-40B4-BE49-F238E27FC236}">
-                <a16:creationId xmlns="" xmlns:a16="http://schemas.microsoft.com/office/drawing/2014/main" id="{2A61EC0F-0D06-504A-B8F3-F16DF6B78708}"/>
+                <a16:creationId xmlns:a16="http://schemas.microsoft.com/office/drawing/2014/main" id="{2A61EC0F-0D06-504A-B8F3-F16DF6B78708}"/>
               </a:ext>
             </a:extLst>
           </p:cNvPr>
@@ -3495,7 +3496,7 @@
           <p:cNvPr id="3" name="Text Placeholder 2">
             <a:extLst>
               <a:ext uri="{FF2B5EF4-FFF2-40B4-BE49-F238E27FC236}">
-                <a16:creationId xmlns="" xmlns:a16="http://schemas.microsoft.com/office/drawing/2014/main" id="{C416D925-797B-4D4D-9D11-F828996DC359}"/>
+                <a16:creationId xmlns:a16="http://schemas.microsoft.com/office/drawing/2014/main" id="{C416D925-797B-4D4D-9D11-F828996DC359}"/>
               </a:ext>
             </a:extLst>
           </p:cNvPr>
@@ -3562,7 +3563,7 @@
           <p:cNvPr id="4" name="Date Placeholder 3">
             <a:extLst>
               <a:ext uri="{FF2B5EF4-FFF2-40B4-BE49-F238E27FC236}">
-                <a16:creationId xmlns="" xmlns:a16="http://schemas.microsoft.com/office/drawing/2014/main" id="{9E327E55-8ECA-F645-9D4E-6B73BB82DD37}"/>
+                <a16:creationId xmlns:a16="http://schemas.microsoft.com/office/drawing/2014/main" id="{9E327E55-8ECA-F645-9D4E-6B73BB82DD37}"/>
               </a:ext>
             </a:extLst>
           </p:cNvPr>
@@ -3609,7 +3610,7 @@
           <p:cNvPr id="5" name="Footer Placeholder 4">
             <a:extLst>
               <a:ext uri="{FF2B5EF4-FFF2-40B4-BE49-F238E27FC236}">
-                <a16:creationId xmlns="" xmlns:a16="http://schemas.microsoft.com/office/drawing/2014/main" id="{B710A558-09F3-FB44-9630-BE51B5B2B9AF}"/>
+                <a16:creationId xmlns:a16="http://schemas.microsoft.com/office/drawing/2014/main" id="{B710A558-09F3-FB44-9630-BE51B5B2B9AF}"/>
               </a:ext>
             </a:extLst>
           </p:cNvPr>
@@ -3652,7 +3653,7 @@
           <p:cNvPr id="6" name="Slide Number Placeholder 5">
             <a:extLst>
               <a:ext uri="{FF2B5EF4-FFF2-40B4-BE49-F238E27FC236}">
-                <a16:creationId xmlns="" xmlns:a16="http://schemas.microsoft.com/office/drawing/2014/main" id="{F18A6910-6D87-B549-BF0B-E41EC3389B7D}"/>
+                <a16:creationId xmlns:a16="http://schemas.microsoft.com/office/drawing/2014/main" id="{F18A6910-6D87-B549-BF0B-E41EC3389B7D}"/>
               </a:ext>
             </a:extLst>
           </p:cNvPr>
@@ -4028,10 +4029,10 @@
           <p:cNvPr id="50" name="Rectangle 49">
             <a:extLst>
               <a:ext uri="{FF2B5EF4-FFF2-40B4-BE49-F238E27FC236}">
-                <a16:creationId xmlns="" xmlns:a16="http://schemas.microsoft.com/office/drawing/2014/main" id="{0E91F5CA-B392-444C-88E3-BF5BAAEBDEB0}"/>
+                <a16:creationId xmlns:a16="http://schemas.microsoft.com/office/drawing/2014/main" id="{0E91F5CA-B392-444C-88E3-BF5BAAEBDEB0}"/>
               </a:ext>
               <a:ext uri="{C183D7F6-B498-43B3-948B-1728B52AA6E4}">
-                <adec:decorative xmlns="" xmlns:adec="http://schemas.microsoft.com/office/drawing/2017/decorative" val="1"/>
+                <adec:decorative xmlns:adec="http://schemas.microsoft.com/office/drawing/2017/decorative" val="1"/>
               </a:ext>
             </a:extLst>
           </p:cNvPr>
@@ -4041,7 +4042,7 @@
           <p:nvPr>
             <p:extLst>
               <p:ext uri="{386F3935-93C4-4BCD-93E2-E3B085C9AB24}">
-                <p16:designElem xmlns="" xmlns:p16="http://schemas.microsoft.com/office/powerpoint/2015/main" val="1"/>
+                <p16:designElem xmlns:p16="http://schemas.microsoft.com/office/powerpoint/2015/main" val="1"/>
               </p:ext>
             </p:extLst>
           </p:nvPr>
@@ -4106,7 +4107,7 @@
           <p:cNvPr id="2" name="Title 1">
             <a:extLst>
               <a:ext uri="{FF2B5EF4-FFF2-40B4-BE49-F238E27FC236}">
-                <a16:creationId xmlns="" xmlns:a16="http://schemas.microsoft.com/office/drawing/2014/main" id="{B8456828-2028-8C44-99BB-7273D828BDF2}"/>
+                <a16:creationId xmlns:a16="http://schemas.microsoft.com/office/drawing/2014/main" id="{B8456828-2028-8C44-99BB-7273D828BDF2}"/>
               </a:ext>
             </a:extLst>
           </p:cNvPr>
@@ -4130,7 +4131,7 @@
           <a:lstStyle/>
           <a:p>
             <a:r>
-              <a:rPr lang="en-US" sz="4400" b="1" dirty="0" smtClean="0">
+              <a:rPr lang="en-US" sz="4400" b="1" dirty="0">
                 <a:solidFill>
                   <a:schemeClr val="tx2"/>
                 </a:solidFill>
@@ -4139,7 +4140,7 @@
               <a:t>Know the Signs:</a:t>
             </a:r>
             <a:br>
-              <a:rPr lang="en-US" sz="4400" b="1" dirty="0" smtClean="0">
+              <a:rPr lang="en-US" sz="4400" b="1" dirty="0">
                 <a:solidFill>
                   <a:schemeClr val="tx2"/>
                 </a:solidFill>
@@ -4147,7 +4148,7 @@
               </a:rPr>
             </a:br>
             <a:r>
-              <a:rPr lang="en-US" sz="4400" b="1" dirty="0" smtClean="0">
+              <a:rPr lang="en-US" sz="4400" b="1" dirty="0">
                 <a:solidFill>
                   <a:schemeClr val="tx2"/>
                 </a:solidFill>
@@ -4169,7 +4170,7 @@
           <p:cNvPr id="3" name="Subtitle 2">
             <a:extLst>
               <a:ext uri="{FF2B5EF4-FFF2-40B4-BE49-F238E27FC236}">
-                <a16:creationId xmlns="" xmlns:a16="http://schemas.microsoft.com/office/drawing/2014/main" id="{1FBA87C5-F535-134C-ACE5-21720C0B25C9}"/>
+                <a16:creationId xmlns:a16="http://schemas.microsoft.com/office/drawing/2014/main" id="{1FBA87C5-F535-134C-ACE5-21720C0B25C9}"/>
               </a:ext>
             </a:extLst>
           </p:cNvPr>
@@ -4199,25 +4200,7 @@
                 </a:solidFill>
                 <a:latin typeface="Montserrat" panose="02000505000000020004" pitchFamily="2" charset="0"/>
               </a:rPr>
-              <a:t>Hosted </a:t>
-            </a:r>
-            <a:r>
-              <a:rPr lang="en-US" sz="2200" dirty="0" smtClean="0">
-                <a:solidFill>
-                  <a:schemeClr val="tx2"/>
-                </a:solidFill>
-                <a:latin typeface="Montserrat" panose="02000505000000020004" pitchFamily="2" charset="0"/>
-              </a:rPr>
-              <a:t>by: </a:t>
-            </a:r>
-            <a:r>
-              <a:rPr lang="en-US" sz="2200" dirty="0">
-                <a:solidFill>
-                  <a:schemeClr val="tx2"/>
-                </a:solidFill>
-                <a:latin typeface="Montserrat" panose="02000505000000020004" pitchFamily="2" charset="0"/>
-              </a:rPr>
-              <a:t>Family Support </a:t>
+              <a:t>Hosted by: Family Support </a:t>
             </a:r>
           </a:p>
           <a:p>
@@ -4304,13 +4287,6 @@
   <p:clrMapOvr>
     <a:masterClrMapping/>
   </p:clrMapOvr>
-  <p:timing>
-    <p:tnLst>
-      <p:par>
-        <p:cTn id="1" dur="indefinite" restart="never" nodeType="tmRoot"/>
-      </p:par>
-    </p:tnLst>
-  </p:timing>
 </p:sld>
 </file>
 
@@ -4349,7 +4325,7 @@
           <a:lstStyle/>
           <a:p>
             <a:r>
-              <a:rPr lang="en-US" sz="4800" b="1" dirty="0" smtClean="0">
+              <a:rPr lang="en-US" sz="4800" b="1" dirty="0">
                 <a:solidFill>
                   <a:schemeClr val="tx2"/>
                 </a:solidFill>
@@ -4358,7 +4334,7 @@
               <a:t>How to Talk to our Children:</a:t>
             </a:r>
             <a:br>
-              <a:rPr lang="en-US" sz="4800" b="1" dirty="0" smtClean="0">
+              <a:rPr lang="en-US" sz="4800" b="1" dirty="0">
                 <a:solidFill>
                   <a:schemeClr val="tx2"/>
                 </a:solidFill>
@@ -4366,7 +4342,7 @@
               </a:rPr>
             </a:br>
             <a:r>
-              <a:rPr lang="en-US" sz="4800" b="1" dirty="0" smtClean="0">
+              <a:rPr lang="en-US" sz="4800" b="1" dirty="0">
                 <a:solidFill>
                   <a:schemeClr val="tx2">
                     <a:lumMod val="60000"/>
@@ -4377,15 +4353,6 @@
               </a:rPr>
               <a:t>Continued.</a:t>
             </a:r>
-            <a:endParaRPr lang="en-US" sz="4800" b="1" dirty="0">
-              <a:solidFill>
-                <a:schemeClr val="tx2">
-                  <a:lumMod val="60000"/>
-                  <a:lumOff val="40000"/>
-                </a:schemeClr>
-              </a:solidFill>
-              <a:latin typeface="Montserrat" panose="02000505000000020004" pitchFamily="2" charset="0"/>
-            </a:endParaRPr>
           </a:p>
         </p:txBody>
       </p:sp>
@@ -4407,38 +4374,14 @@
           <a:lstStyle/>
           <a:p>
             <a:r>
-              <a:rPr lang="en-US" sz="2400" dirty="0" smtClean="0">
-                <a:solidFill>
-                  <a:schemeClr val="tx2"/>
-                </a:solidFill>
-                <a:latin typeface="Montserrat" panose="02000505000000020004" pitchFamily="2" charset="0"/>
-              </a:rPr>
-              <a:t>A </a:t>
-            </a:r>
-            <a:r>
               <a:rPr lang="en-US" sz="2400" dirty="0">
                 <a:solidFill>
                   <a:schemeClr val="tx2"/>
                 </a:solidFill>
                 <a:latin typeface="Montserrat" panose="02000505000000020004" pitchFamily="2" charset="0"/>
               </a:rPr>
-              <a:t>doctor gives your child (or you) an opiate pain killer </a:t>
-            </a:r>
-            <a:r>
-              <a:rPr lang="en-US" sz="2400" dirty="0" smtClean="0">
-                <a:solidFill>
-                  <a:schemeClr val="tx2"/>
-                </a:solidFill>
-                <a:latin typeface="Montserrat" panose="02000505000000020004" pitchFamily="2" charset="0"/>
-              </a:rPr>
-              <a:t>prescription</a:t>
-            </a:r>
-            <a:endParaRPr lang="en-US" sz="2400" dirty="0">
-              <a:solidFill>
-                <a:schemeClr val="tx2"/>
-              </a:solidFill>
-              <a:latin typeface="Montserrat" panose="02000505000000020004" pitchFamily="2" charset="0"/>
-            </a:endParaRPr>
+              <a:t>A doctor gives your child (or you) an opiate pain killer prescription</a:t>
+            </a:r>
           </a:p>
           <a:p>
             <a:r>
@@ -4448,23 +4391,8 @@
                 </a:solidFill>
                 <a:latin typeface="Montserrat" panose="02000505000000020004" pitchFamily="2" charset="0"/>
               </a:rPr>
-              <a:t>Suggestion: Agree to rescue your child—role </a:t>
-            </a:r>
-            <a:r>
-              <a:rPr lang="en-US" sz="2400" dirty="0" smtClean="0">
-                <a:solidFill>
-                  <a:schemeClr val="tx2"/>
-                </a:solidFill>
-                <a:latin typeface="Montserrat" panose="02000505000000020004" pitchFamily="2" charset="0"/>
-              </a:rPr>
-              <a:t>play</a:t>
-            </a:r>
-            <a:endParaRPr lang="en-US" sz="2400" dirty="0">
-              <a:solidFill>
-                <a:schemeClr val="tx2"/>
-              </a:solidFill>
-              <a:latin typeface="Montserrat" panose="02000505000000020004" pitchFamily="2" charset="0"/>
-            </a:endParaRPr>
+              <a:t>Suggestion: Agree to rescue your child—role play</a:t>
+            </a:r>
           </a:p>
           <a:p>
             <a:r>
@@ -4474,77 +4402,8 @@
                 </a:solidFill>
                 <a:latin typeface="Montserrat" panose="02000505000000020004" pitchFamily="2" charset="0"/>
               </a:rPr>
-              <a:t>Role play the situation </a:t>
-            </a:r>
-            <a:r>
-              <a:rPr lang="en-US" sz="2400" dirty="0" smtClean="0">
-                <a:solidFill>
-                  <a:schemeClr val="tx2"/>
-                </a:solidFill>
-                <a:latin typeface="Montserrat" panose="02000505000000020004" pitchFamily="2" charset="0"/>
-              </a:rPr>
-              <a:t>where your </a:t>
-            </a:r>
-            <a:r>
-              <a:rPr lang="en-US" sz="2400" dirty="0">
-                <a:solidFill>
-                  <a:schemeClr val="tx2"/>
-                </a:solidFill>
-                <a:latin typeface="Montserrat" panose="02000505000000020004" pitchFamily="2" charset="0"/>
-              </a:rPr>
-              <a:t>child comes home and </a:t>
-            </a:r>
-            <a:r>
-              <a:rPr lang="en-US" sz="2400" dirty="0" smtClean="0">
-                <a:solidFill>
-                  <a:schemeClr val="tx2"/>
-                </a:solidFill>
-                <a:latin typeface="Montserrat" panose="02000505000000020004" pitchFamily="2" charset="0"/>
-              </a:rPr>
-              <a:t>says: </a:t>
-            </a:r>
-            <a:r>
-              <a:rPr lang="en-US" sz="2400" dirty="0">
-                <a:solidFill>
-                  <a:schemeClr val="tx2"/>
-                </a:solidFill>
-                <a:latin typeface="Montserrat" panose="02000505000000020004" pitchFamily="2" charset="0"/>
-              </a:rPr>
-              <a:t>“I messed </a:t>
-            </a:r>
-            <a:r>
-              <a:rPr lang="en-US" sz="2400" dirty="0" smtClean="0">
-                <a:solidFill>
-                  <a:schemeClr val="tx2"/>
-                </a:solidFill>
-                <a:latin typeface="Montserrat" panose="02000505000000020004" pitchFamily="2" charset="0"/>
-              </a:rPr>
-              <a:t>up. </a:t>
-            </a:r>
-            <a:r>
-              <a:rPr lang="en-US" sz="2400" dirty="0">
-                <a:solidFill>
-                  <a:schemeClr val="tx2"/>
-                </a:solidFill>
-                <a:latin typeface="Montserrat" panose="02000505000000020004" pitchFamily="2" charset="0"/>
-              </a:rPr>
-              <a:t>I used drugs and I need </a:t>
-            </a:r>
-            <a:r>
-              <a:rPr lang="en-US" sz="2400" dirty="0" smtClean="0">
-                <a:solidFill>
-                  <a:schemeClr val="tx2"/>
-                </a:solidFill>
-                <a:latin typeface="Montserrat" panose="02000505000000020004" pitchFamily="2" charset="0"/>
-              </a:rPr>
-              <a:t>help.”</a:t>
-            </a:r>
-            <a:endParaRPr lang="en-US" sz="2400" dirty="0">
-              <a:solidFill>
-                <a:schemeClr val="tx2"/>
-              </a:solidFill>
-              <a:latin typeface="Montserrat" panose="02000505000000020004" pitchFamily="2" charset="0"/>
-            </a:endParaRPr>
+              <a:t>Role play the situation where your child comes home and says: “I messed up. I used drugs and I need help.”</a:t>
+            </a:r>
           </a:p>
           <a:p>
             <a:pPr lvl="2">
@@ -4609,13 +4468,13 @@
           <a:lstStyle/>
           <a:p>
             <a:r>
-              <a:rPr lang="en-US" sz="4800" b="1" dirty="0" smtClean="0">
-                <a:solidFill>
-                  <a:schemeClr val="tx2"/>
-                </a:solidFill>
-                <a:latin typeface="Montserrat" panose="02000505000000020004" pitchFamily="2" charset="0"/>
-              </a:rPr>
-              <a:t>What to Do if Your Child Uses Drugs.</a:t>
+              <a:rPr lang="en-US" sz="4800" b="1" dirty="0">
+                <a:solidFill>
+                  <a:schemeClr val="tx2"/>
+                </a:solidFill>
+                <a:latin typeface="Montserrat" panose="02000505000000020004" pitchFamily="2" charset="0"/>
+              </a:rPr>
+              <a:t>What to Do if Your Child Uses Drugs</a:t>
             </a:r>
             <a:endParaRPr lang="en-US" sz="4800" b="1" dirty="0">
               <a:solidFill>
@@ -4661,25 +4520,7 @@
                 </a:solidFill>
                 <a:latin typeface="Montserrat" panose="02000505000000020004" pitchFamily="2" charset="0"/>
               </a:rPr>
-              <a:t>Drugs, the substance, aren’t the only cause for </a:t>
-            </a:r>
-            <a:r>
-              <a:rPr lang="en-US" sz="2400" dirty="0" smtClean="0">
-                <a:solidFill>
-                  <a:schemeClr val="tx2"/>
-                </a:solidFill>
-                <a:latin typeface="Montserrat" panose="02000505000000020004" pitchFamily="2" charset="0"/>
-              </a:rPr>
-              <a:t>addiction.</a:t>
-            </a:r>
-            <a:r>
-              <a:rPr lang="en-US" sz="2400" dirty="0">
-                <a:solidFill>
-                  <a:schemeClr val="tx2"/>
-                </a:solidFill>
-                <a:latin typeface="Montserrat" panose="02000505000000020004" pitchFamily="2" charset="0"/>
-              </a:rPr>
-              <a:t/>
+              <a:t>Drugs, the substance, aren’t the only cause for addiction.</a:t>
             </a:r>
             <a:br>
               <a:rPr lang="en-US" sz="2400" dirty="0">
@@ -4696,25 +4537,7 @@
                 </a:solidFill>
                 <a:latin typeface="Montserrat" panose="02000505000000020004" pitchFamily="2" charset="0"/>
               </a:rPr>
-              <a:t>Isolation, </a:t>
-            </a:r>
-            <a:r>
-              <a:rPr lang="en-US" sz="2400" dirty="0" smtClean="0">
-                <a:solidFill>
-                  <a:schemeClr val="tx2"/>
-                </a:solidFill>
-                <a:latin typeface="Montserrat" panose="02000505000000020004" pitchFamily="2" charset="0"/>
-              </a:rPr>
-              <a:t>hopelessness, and </a:t>
-            </a:r>
-            <a:r>
-              <a:rPr lang="en-US" sz="2400" dirty="0">
-                <a:solidFill>
-                  <a:schemeClr val="tx2"/>
-                </a:solidFill>
-                <a:latin typeface="Montserrat" panose="02000505000000020004" pitchFamily="2" charset="0"/>
-              </a:rPr>
-              <a:t>trauma are better predictors of drug use</a:t>
+              <a:t>Isolation, hopelessness, and trauma are better predictors of drug use</a:t>
             </a:r>
           </a:p>
           <a:p>
@@ -4771,25 +4594,7 @@
                 </a:solidFill>
                 <a:latin typeface="Montserrat" panose="02000505000000020004" pitchFamily="2" charset="0"/>
               </a:rPr>
-              <a:t>Recovery is a five </a:t>
-            </a:r>
-            <a:r>
-              <a:rPr lang="en-US" sz="2400" dirty="0" smtClean="0">
-                <a:solidFill>
-                  <a:schemeClr val="tx2"/>
-                </a:solidFill>
-                <a:latin typeface="Montserrat" panose="02000505000000020004" pitchFamily="2" charset="0"/>
-              </a:rPr>
-              <a:t>year process </a:t>
-            </a:r>
-            <a:r>
-              <a:rPr lang="en-US" sz="2400" dirty="0">
-                <a:solidFill>
-                  <a:schemeClr val="tx2"/>
-                </a:solidFill>
-                <a:latin typeface="Montserrat" panose="02000505000000020004" pitchFamily="2" charset="0"/>
-              </a:rPr>
-              <a:t>OR MORE</a:t>
+              <a:t>Recovery is a five year process OR MORE</a:t>
             </a:r>
           </a:p>
           <a:p>
@@ -4903,16 +4708,7 @@
                 </a:solidFill>
                 <a:latin typeface="Montserrat" panose="02000505000000020004" pitchFamily="2" charset="0"/>
               </a:rPr>
-              <a:t>Other </a:t>
-            </a:r>
-            <a:r>
-              <a:rPr lang="en-US" dirty="0" smtClean="0">
-                <a:solidFill>
-                  <a:schemeClr val="tx2"/>
-                </a:solidFill>
-                <a:latin typeface="Montserrat" panose="02000505000000020004" pitchFamily="2" charset="0"/>
-              </a:rPr>
-              <a:t>siblings</a:t>
+              <a:t>Other siblings</a:t>
             </a:r>
             <a:endParaRPr lang="en-US" sz="2400" dirty="0">
               <a:solidFill>
@@ -4955,7 +4751,13 @@
       </p:grpSpPr>
       <p:sp>
         <p:nvSpPr>
-          <p:cNvPr id="4" name="Title 3"/>
+          <p:cNvPr id="2" name="Title 1">
+            <a:extLst>
+              <a:ext uri="{FF2B5EF4-FFF2-40B4-BE49-F238E27FC236}">
+                <a16:creationId xmlns:a16="http://schemas.microsoft.com/office/drawing/2014/main" id="{5C962C17-64BB-41A3-A446-195A0D2F5385}"/>
+              </a:ext>
+            </a:extLst>
+          </p:cNvPr>
           <p:cNvSpPr>
             <a:spLocks noGrp="1"/>
           </p:cNvSpPr>
@@ -4965,82 +4767,96 @@
         </p:nvSpPr>
         <p:spPr/>
         <p:txBody>
-          <a:bodyPr>
-            <a:normAutofit/>
-          </a:bodyPr>
-          <a:lstStyle/>
-          <a:p>
-            <a:r>
-              <a:rPr lang="en-US" b="1" dirty="0">
-                <a:solidFill>
-                  <a:schemeClr val="tx2"/>
-                </a:solidFill>
-                <a:latin typeface="Montserrat" panose="02000505000000020004" pitchFamily="2" charset="0"/>
-              </a:rPr>
-              <a:t>It is your responsibility to keep yourself and your children </a:t>
-            </a:r>
-            <a:r>
-              <a:rPr lang="en-US" b="1" dirty="0" smtClean="0">
-                <a:solidFill>
-                  <a:schemeClr val="tx2"/>
-                </a:solidFill>
-                <a:latin typeface="Montserrat" panose="02000505000000020004" pitchFamily="2" charset="0"/>
-              </a:rPr>
-              <a:t>safe.</a:t>
-            </a:r>
-            <a:endParaRPr lang="en-US" sz="4800" b="1" dirty="0">
+          <a:bodyPr/>
+          <a:lstStyle/>
+          <a:p>
+            <a:r>
+              <a:rPr lang="en-US" sz="4400" b="1" dirty="0">
+                <a:solidFill>
+                  <a:schemeClr val="tx2"/>
+                </a:solidFill>
+                <a:latin typeface="Montserrat" panose="02000505000000020004" pitchFamily="2" charset="0"/>
+              </a:rPr>
+              <a:t>What to Do if Your Parent is addicted</a:t>
+            </a:r>
+            <a:endParaRPr lang="en-US" dirty="0"/>
+          </a:p>
+        </p:txBody>
+      </p:sp>
+      <p:sp>
+        <p:nvSpPr>
+          <p:cNvPr id="3" name="Content Placeholder 2">
+            <a:extLst>
+              <a:ext uri="{FF2B5EF4-FFF2-40B4-BE49-F238E27FC236}">
+                <a16:creationId xmlns:a16="http://schemas.microsoft.com/office/drawing/2014/main" id="{B782E71C-8A69-44DF-8927-990696A5E80E}"/>
+              </a:ext>
+            </a:extLst>
+          </p:cNvPr>
+          <p:cNvSpPr>
+            <a:spLocks noGrp="1"/>
+          </p:cNvSpPr>
+          <p:nvPr>
+            <p:ph idx="1"/>
+          </p:nvPr>
+        </p:nvSpPr>
+        <p:spPr/>
+        <p:txBody>
+          <a:bodyPr/>
+          <a:lstStyle/>
+          <a:p>
+            <a:r>
+              <a:rPr lang="en-US" dirty="0">
+                <a:solidFill>
+                  <a:schemeClr val="tx2"/>
+                </a:solidFill>
+                <a:latin typeface="Montserrat" panose="02000505000000020004" pitchFamily="2" charset="0"/>
+              </a:rPr>
+              <a:t>Your parent drug medicine should be inaccessible to your children</a:t>
+            </a:r>
+            <a:endParaRPr lang="en-US" sz="2800" dirty="0">
               <a:solidFill>
                 <a:schemeClr val="tx2"/>
               </a:solidFill>
               <a:latin typeface="Montserrat" panose="02000505000000020004" pitchFamily="2" charset="0"/>
             </a:endParaRPr>
           </a:p>
-        </p:txBody>
-      </p:sp>
-      <p:sp>
-        <p:nvSpPr>
-          <p:cNvPr id="5" name="Content Placeholder 4"/>
-          <p:cNvSpPr>
-            <a:spLocks noGrp="1"/>
-          </p:cNvSpPr>
-          <p:nvPr>
-            <p:ph idx="1"/>
-          </p:nvPr>
-        </p:nvSpPr>
-        <p:spPr/>
-        <p:txBody>
-          <a:bodyPr>
-            <a:noAutofit/>
-          </a:bodyPr>
-          <a:lstStyle/>
-          <a:p>
-            <a:r>
-              <a:rPr lang="en-US" sz="2400" dirty="0">
-                <a:solidFill>
-                  <a:schemeClr val="tx2"/>
-                </a:solidFill>
-                <a:latin typeface="Montserrat" panose="02000505000000020004" pitchFamily="2" charset="0"/>
-              </a:rPr>
-              <a:t>Doctors may not know best</a:t>
-            </a:r>
-          </a:p>
-          <a:p>
-            <a:r>
-              <a:rPr lang="en-US" sz="2400" dirty="0">
-                <a:solidFill>
-                  <a:schemeClr val="tx2"/>
-                </a:solidFill>
-                <a:latin typeface="Montserrat" panose="02000505000000020004" pitchFamily="2" charset="0"/>
-              </a:rPr>
-              <a:t>Someone who is recovering from addiction may not know best</a:t>
-            </a:r>
+          <a:p>
+            <a:r>
+              <a:rPr lang="en-US" sz="2800" dirty="0">
+                <a:solidFill>
+                  <a:schemeClr val="tx2"/>
+                </a:solidFill>
+                <a:latin typeface="Montserrat" panose="02000505000000020004" pitchFamily="2" charset="0"/>
+              </a:rPr>
+              <a:t>Potentially, by the time you know about it, the addiction has been in effect for a while</a:t>
+            </a:r>
+          </a:p>
+          <a:p>
+            <a:r>
+              <a:rPr lang="en-US" dirty="0">
+                <a:solidFill>
+                  <a:schemeClr val="tx2"/>
+                </a:solidFill>
+                <a:latin typeface="Montserrat" panose="02000505000000020004" pitchFamily="2" charset="0"/>
+              </a:rPr>
+              <a:t>You may need an elderly advocate</a:t>
+            </a:r>
+            <a:endParaRPr lang="en-US" sz="2800" dirty="0">
+              <a:solidFill>
+                <a:schemeClr val="tx2"/>
+              </a:solidFill>
+              <a:latin typeface="Montserrat" panose="02000505000000020004" pitchFamily="2" charset="0"/>
+            </a:endParaRPr>
+          </a:p>
+          <a:p>
+            <a:endParaRPr lang="en-US" dirty="0"/>
           </a:p>
         </p:txBody>
       </p:sp>
     </p:spTree>
     <p:extLst>
       <p:ext uri="{BB962C8B-B14F-4D97-AF65-F5344CB8AC3E}">
-        <p14:creationId xmlns:p14="http://schemas.microsoft.com/office/powerpoint/2010/main" val="2850213789"/>
+        <p14:creationId xmlns:p14="http://schemas.microsoft.com/office/powerpoint/2010/main" val="3946362815"/>
       </p:ext>
     </p:extLst>
   </p:cSld>
@@ -5085,30 +4901,13 @@
           <a:lstStyle/>
           <a:p>
             <a:r>
-              <a:rPr lang="en-US" b="1" dirty="0" smtClean="0">
-                <a:solidFill>
-                  <a:schemeClr val="tx2"/>
-                </a:solidFill>
-                <a:latin typeface="Montserrat" panose="02000505000000020004" pitchFamily="2" charset="0"/>
-              </a:rPr>
-              <a:t>The BTF </a:t>
-            </a:r>
-            <a:br>
-              <a:rPr lang="en-US" b="1" dirty="0" smtClean="0">
-                <a:solidFill>
-                  <a:schemeClr val="tx2"/>
-                </a:solidFill>
-                <a:latin typeface="Montserrat" panose="02000505000000020004" pitchFamily="2" charset="0"/>
-              </a:rPr>
-            </a:br>
-            <a:r>
-              <a:rPr lang="en-US" b="1" dirty="0" smtClean="0">
-                <a:solidFill>
-                  <a:schemeClr val="tx2"/>
-                </a:solidFill>
-                <a:latin typeface="Montserrat" panose="02000505000000020004" pitchFamily="2" charset="0"/>
-              </a:rPr>
-              <a:t>Movement.</a:t>
+              <a:rPr lang="en-US" b="1" dirty="0">
+                <a:solidFill>
+                  <a:schemeClr val="tx2"/>
+                </a:solidFill>
+                <a:latin typeface="Montserrat" panose="02000505000000020004" pitchFamily="2" charset="0"/>
+              </a:rPr>
+              <a:t>It is your responsibility to keep yourself and your children safe.</a:t>
             </a:r>
             <a:endParaRPr lang="en-US" sz="4800" b="1" dirty="0">
               <a:solidFill>
@@ -5137,7 +4936,129 @@
           <a:lstStyle/>
           <a:p>
             <a:r>
-              <a:rPr lang="en-US" sz="2400" dirty="0" smtClean="0">
+              <a:rPr lang="en-US" sz="2400" dirty="0">
+                <a:solidFill>
+                  <a:schemeClr val="tx2"/>
+                </a:solidFill>
+                <a:latin typeface="Montserrat" panose="02000505000000020004" pitchFamily="2" charset="0"/>
+              </a:rPr>
+              <a:t>Doctors may not know best</a:t>
+            </a:r>
+          </a:p>
+          <a:p>
+            <a:r>
+              <a:rPr lang="en-US" sz="2400" dirty="0">
+                <a:solidFill>
+                  <a:schemeClr val="tx2"/>
+                </a:solidFill>
+                <a:latin typeface="Montserrat" panose="02000505000000020004" pitchFamily="2" charset="0"/>
+              </a:rPr>
+              <a:t>Someone who is recovering from addiction may not know best</a:t>
+            </a:r>
+          </a:p>
+        </p:txBody>
+      </p:sp>
+    </p:spTree>
+    <p:extLst>
+      <p:ext uri="{BB962C8B-B14F-4D97-AF65-F5344CB8AC3E}">
+        <p14:creationId xmlns:p14="http://schemas.microsoft.com/office/powerpoint/2010/main" val="2850213789"/>
+      </p:ext>
+    </p:extLst>
+  </p:cSld>
+  <p:clrMapOvr>
+    <a:masterClrMapping/>
+  </p:clrMapOvr>
+</p:sld>
+</file>
+
+<file path=ppt/slides/slide14.xml><?xml version="1.0" encoding="utf-8"?>
+<p:sld xmlns:a="http://schemas.openxmlformats.org/drawingml/2006/main" xmlns:r="http://schemas.openxmlformats.org/officeDocument/2006/relationships" xmlns:p="http://schemas.openxmlformats.org/presentationml/2006/main">
+  <p:cSld>
+    <p:spTree>
+      <p:nvGrpSpPr>
+        <p:cNvPr id="1" name=""/>
+        <p:cNvGrpSpPr/>
+        <p:nvPr/>
+      </p:nvGrpSpPr>
+      <p:grpSpPr>
+        <a:xfrm>
+          <a:off x="0" y="0"/>
+          <a:ext cx="0" cy="0"/>
+          <a:chOff x="0" y="0"/>
+          <a:chExt cx="0" cy="0"/>
+        </a:xfrm>
+      </p:grpSpPr>
+      <p:sp>
+        <p:nvSpPr>
+          <p:cNvPr id="4" name="Title 3"/>
+          <p:cNvSpPr>
+            <a:spLocks noGrp="1"/>
+          </p:cNvSpPr>
+          <p:nvPr>
+            <p:ph type="title"/>
+          </p:nvPr>
+        </p:nvSpPr>
+        <p:spPr/>
+        <p:txBody>
+          <a:bodyPr>
+            <a:normAutofit/>
+          </a:bodyPr>
+          <a:lstStyle/>
+          <a:p>
+            <a:r>
+              <a:rPr lang="en-US" b="1" dirty="0">
+                <a:solidFill>
+                  <a:schemeClr val="tx2"/>
+                </a:solidFill>
+                <a:latin typeface="Montserrat" panose="02000505000000020004" pitchFamily="2" charset="0"/>
+              </a:rPr>
+              <a:t>The BTF </a:t>
+            </a:r>
+            <a:br>
+              <a:rPr lang="en-US" b="1" dirty="0">
+                <a:solidFill>
+                  <a:schemeClr val="tx2"/>
+                </a:solidFill>
+                <a:latin typeface="Montserrat" panose="02000505000000020004" pitchFamily="2" charset="0"/>
+              </a:rPr>
+            </a:br>
+            <a:r>
+              <a:rPr lang="en-US" b="1" dirty="0">
+                <a:solidFill>
+                  <a:schemeClr val="tx2"/>
+                </a:solidFill>
+                <a:latin typeface="Montserrat" panose="02000505000000020004" pitchFamily="2" charset="0"/>
+              </a:rPr>
+              <a:t>Movement.</a:t>
+            </a:r>
+            <a:endParaRPr lang="en-US" sz="4800" b="1" dirty="0">
+              <a:solidFill>
+                <a:schemeClr val="tx2"/>
+              </a:solidFill>
+              <a:latin typeface="Montserrat" panose="02000505000000020004" pitchFamily="2" charset="0"/>
+            </a:endParaRPr>
+          </a:p>
+        </p:txBody>
+      </p:sp>
+      <p:sp>
+        <p:nvSpPr>
+          <p:cNvPr id="5" name="Content Placeholder 4"/>
+          <p:cNvSpPr>
+            <a:spLocks noGrp="1"/>
+          </p:cNvSpPr>
+          <p:nvPr>
+            <p:ph idx="1"/>
+          </p:nvPr>
+        </p:nvSpPr>
+        <p:spPr/>
+        <p:txBody>
+          <a:bodyPr>
+            <a:noAutofit/>
+          </a:bodyPr>
+          <a:lstStyle/>
+          <a:p>
+            <a:r>
+              <a:rPr lang="en-US" sz="2400" dirty="0">
                 <a:solidFill>
                   <a:schemeClr val="tx2"/>
                 </a:solidFill>
@@ -5145,7 +5066,7 @@
               </a:rPr>
               <a:t>www.btfmovement.com</a:t>
             </a:r>
-            <a:endParaRPr lang="en-US" sz="2400" dirty="0" smtClean="0">
+            <a:endParaRPr lang="en-US" sz="2400" dirty="0">
               <a:solidFill>
                 <a:schemeClr val="tx2"/>
               </a:solidFill>
@@ -5153,7 +5074,7 @@
           </a:p>
           <a:p>
             <a:r>
-              <a:rPr lang="en-US" sz="2400" u="sng" dirty="0" smtClean="0">
+              <a:rPr lang="en-US" sz="2400" u="sng" dirty="0">
                 <a:hlinkClick r:id="rId4"/>
               </a:rPr>
               <a:t>info@btfmovement.com</a:t>
@@ -5204,391 +5125,6 @@
 </p:sld>
 </file>
 
-<file path=ppt/slides/slide14.xml><?xml version="1.0" encoding="utf-8"?>
-<p:sld xmlns:a="http://schemas.openxmlformats.org/drawingml/2006/main" xmlns:r="http://schemas.openxmlformats.org/officeDocument/2006/relationships" xmlns:p="http://schemas.openxmlformats.org/presentationml/2006/main">
-  <p:cSld>
-    <p:spTree>
-      <p:nvGrpSpPr>
-        <p:cNvPr id="1" name=""/>
-        <p:cNvGrpSpPr/>
-        <p:nvPr/>
-      </p:nvGrpSpPr>
-      <p:grpSpPr>
-        <a:xfrm>
-          <a:off x="0" y="0"/>
-          <a:ext cx="0" cy="0"/>
-          <a:chOff x="0" y="0"/>
-          <a:chExt cx="0" cy="0"/>
-        </a:xfrm>
-      </p:grpSpPr>
-      <p:sp>
-        <p:nvSpPr>
-          <p:cNvPr id="4" name="Title 3"/>
-          <p:cNvSpPr>
-            <a:spLocks noGrp="1"/>
-          </p:cNvSpPr>
-          <p:nvPr>
-            <p:ph type="title"/>
-          </p:nvPr>
-        </p:nvSpPr>
-        <p:spPr/>
-        <p:txBody>
-          <a:bodyPr>
-            <a:normAutofit/>
-          </a:bodyPr>
-          <a:lstStyle/>
-          <a:p>
-            <a:r>
-              <a:rPr lang="en-US" sz="4800" b="1" dirty="0" smtClean="0">
-                <a:solidFill>
-                  <a:schemeClr val="tx2"/>
-                </a:solidFill>
-                <a:latin typeface="Montserrat" panose="02000505000000020004" pitchFamily="2" charset="0"/>
-              </a:rPr>
-              <a:t>References.</a:t>
-            </a:r>
-            <a:endParaRPr lang="en-US" sz="4800" b="1" dirty="0">
-              <a:solidFill>
-                <a:schemeClr val="tx2">
-                  <a:lumMod val="60000"/>
-                  <a:lumOff val="40000"/>
-                </a:schemeClr>
-              </a:solidFill>
-              <a:latin typeface="Montserrat" panose="02000505000000020004" pitchFamily="2" charset="0"/>
-            </a:endParaRPr>
-          </a:p>
-        </p:txBody>
-      </p:sp>
-      <p:sp>
-        <p:nvSpPr>
-          <p:cNvPr id="5" name="Content Placeholder 4"/>
-          <p:cNvSpPr>
-            <a:spLocks noGrp="1"/>
-          </p:cNvSpPr>
-          <p:nvPr>
-            <p:ph idx="1"/>
-          </p:nvPr>
-        </p:nvSpPr>
-        <p:spPr>
-          <a:xfrm>
-            <a:off x="838200" y="1825625"/>
-            <a:ext cx="10515600" cy="4871010"/>
-          </a:xfrm>
-        </p:spPr>
-        <p:txBody>
-          <a:bodyPr>
-            <a:noAutofit/>
-          </a:bodyPr>
-          <a:lstStyle/>
-          <a:p>
-            <a:r>
-              <a:rPr lang="en-US" sz="2200" dirty="0">
-                <a:solidFill>
-                  <a:schemeClr val="tx2"/>
-                </a:solidFill>
-                <a:latin typeface="Montserrat" panose="02000505000000020004" pitchFamily="2" charset="0"/>
-                <a:hlinkClick r:id="rId2"/>
-              </a:rPr>
-              <a:t>Expert explains why drug overdose deaths soared to record 93,000 amid pandemic (msnbc.com)</a:t>
-            </a:r>
-            <a:endParaRPr lang="en-US" sz="2200" dirty="0">
-              <a:solidFill>
-                <a:schemeClr val="tx2"/>
-              </a:solidFill>
-              <a:latin typeface="Montserrat" panose="02000505000000020004" pitchFamily="2" charset="0"/>
-            </a:endParaRPr>
-          </a:p>
-          <a:p>
-            <a:r>
-              <a:rPr lang="en-US" sz="2200" dirty="0">
-                <a:solidFill>
-                  <a:schemeClr val="tx2"/>
-                </a:solidFill>
-                <a:latin typeface="Montserrat" panose="02000505000000020004" pitchFamily="2" charset="0"/>
-                <a:hlinkClick r:id="rId3"/>
-              </a:rPr>
-              <a:t>Dr. Lee: Pandemic has 'certainly' made opioid crisis worse (msnbc.com)</a:t>
-            </a:r>
-            <a:endParaRPr lang="en-US" sz="2200" dirty="0">
-              <a:solidFill>
-                <a:schemeClr val="tx2"/>
-              </a:solidFill>
-              <a:latin typeface="Montserrat" panose="02000505000000020004" pitchFamily="2" charset="0"/>
-            </a:endParaRPr>
-          </a:p>
-          <a:p>
-            <a:r>
-              <a:rPr lang="en-US" sz="2200" dirty="0">
-                <a:solidFill>
-                  <a:schemeClr val="tx2"/>
-                </a:solidFill>
-                <a:latin typeface="Montserrat" panose="02000505000000020004" pitchFamily="2" charset="0"/>
-              </a:rPr>
-              <a:t>Dr. Nora </a:t>
-            </a:r>
-            <a:r>
-              <a:rPr lang="en-US" sz="2200" dirty="0" err="1" smtClean="0">
-                <a:solidFill>
-                  <a:schemeClr val="tx2"/>
-                </a:solidFill>
-                <a:latin typeface="Montserrat" panose="02000505000000020004" pitchFamily="2" charset="0"/>
-              </a:rPr>
-              <a:t>Volkow’s</a:t>
-            </a:r>
-            <a:r>
-              <a:rPr lang="en-US" sz="2200" dirty="0" smtClean="0">
-                <a:solidFill>
-                  <a:schemeClr val="tx2"/>
-                </a:solidFill>
-                <a:latin typeface="Montserrat" panose="02000505000000020004" pitchFamily="2" charset="0"/>
-              </a:rPr>
-              <a:t> </a:t>
-            </a:r>
-            <a:r>
-              <a:rPr lang="en-US" sz="2200" dirty="0" smtClean="0">
-                <a:solidFill>
-                  <a:schemeClr val="tx2"/>
-                </a:solidFill>
-                <a:latin typeface="Montserrat" panose="02000505000000020004" pitchFamily="2" charset="0"/>
-                <a:hlinkClick r:id="rId4"/>
-              </a:rPr>
-              <a:t>YouTube videos </a:t>
-            </a:r>
-            <a:r>
-              <a:rPr lang="en-US" sz="2200" dirty="0" smtClean="0">
-                <a:solidFill>
-                  <a:schemeClr val="tx2"/>
-                </a:solidFill>
-                <a:latin typeface="Montserrat" panose="02000505000000020004" pitchFamily="2" charset="0"/>
-              </a:rPr>
-              <a:t>(heads </a:t>
-            </a:r>
-            <a:r>
-              <a:rPr lang="en-US" sz="2200" dirty="0">
-                <a:solidFill>
-                  <a:schemeClr val="tx2"/>
-                </a:solidFill>
-                <a:latin typeface="Montserrat" panose="02000505000000020004" pitchFamily="2" charset="0"/>
-              </a:rPr>
-              <a:t>the National Institute on Drug Abuse (part of the NIH) </a:t>
-            </a:r>
-            <a:endParaRPr lang="en-US" sz="2200" dirty="0" smtClean="0">
-              <a:solidFill>
-                <a:schemeClr val="tx2"/>
-              </a:solidFill>
-              <a:latin typeface="Montserrat" panose="02000505000000020004" pitchFamily="2" charset="0"/>
-            </a:endParaRPr>
-          </a:p>
-          <a:p>
-            <a:r>
-              <a:rPr lang="en-US" sz="2200" dirty="0" smtClean="0">
-                <a:solidFill>
-                  <a:schemeClr val="tx2"/>
-                </a:solidFill>
-                <a:latin typeface="Montserrat" panose="02000505000000020004" pitchFamily="2" charset="0"/>
-              </a:rPr>
-              <a:t>Dr</a:t>
-            </a:r>
-            <a:r>
-              <a:rPr lang="en-US" sz="2200" dirty="0">
-                <a:solidFill>
-                  <a:schemeClr val="tx2"/>
-                </a:solidFill>
-                <a:latin typeface="Montserrat" panose="02000505000000020004" pitchFamily="2" charset="0"/>
-              </a:rPr>
-              <a:t>. Ruth </a:t>
-            </a:r>
-            <a:r>
-              <a:rPr lang="en-US" sz="2200" dirty="0" err="1" smtClean="0">
-                <a:solidFill>
-                  <a:schemeClr val="tx2"/>
-                </a:solidFill>
-                <a:latin typeface="Montserrat" panose="02000505000000020004" pitchFamily="2" charset="0"/>
-              </a:rPr>
-              <a:t>Potee’s</a:t>
-            </a:r>
-            <a:r>
-              <a:rPr lang="en-US" sz="2200" dirty="0" smtClean="0">
-                <a:solidFill>
-                  <a:schemeClr val="tx2"/>
-                </a:solidFill>
-                <a:latin typeface="Montserrat" panose="02000505000000020004" pitchFamily="2" charset="0"/>
-              </a:rPr>
-              <a:t> </a:t>
-            </a:r>
-            <a:r>
-              <a:rPr lang="en-US" sz="2200" dirty="0" smtClean="0">
-                <a:solidFill>
-                  <a:schemeClr val="tx2"/>
-                </a:solidFill>
-                <a:latin typeface="Montserrat" panose="02000505000000020004" pitchFamily="2" charset="0"/>
-                <a:hlinkClick r:id="rId5"/>
-              </a:rPr>
-              <a:t>YouTube channel</a:t>
-            </a:r>
-            <a:endParaRPr lang="en-US" sz="2200" b="1" u="sng" dirty="0">
-              <a:solidFill>
-                <a:schemeClr val="tx2"/>
-              </a:solidFill>
-              <a:latin typeface="Montserrat" panose="02000505000000020004" pitchFamily="2" charset="0"/>
-            </a:endParaRPr>
-          </a:p>
-          <a:p>
-            <a:r>
-              <a:rPr lang="en-US" sz="2200" dirty="0">
-                <a:solidFill>
-                  <a:schemeClr val="tx2"/>
-                </a:solidFill>
-                <a:latin typeface="Montserrat" panose="02000505000000020004" pitchFamily="2" charset="0"/>
-              </a:rPr>
-              <a:t>Grieving </a:t>
-            </a:r>
-            <a:r>
-              <a:rPr lang="en-US" sz="2200" dirty="0" smtClean="0">
-                <a:solidFill>
-                  <a:schemeClr val="tx2"/>
-                </a:solidFill>
-                <a:latin typeface="Montserrat" panose="02000505000000020004" pitchFamily="2" charset="0"/>
-              </a:rPr>
-              <a:t>episode on </a:t>
-            </a:r>
-            <a:r>
-              <a:rPr lang="en-US" sz="2200" dirty="0" smtClean="0">
-                <a:solidFill>
-                  <a:schemeClr val="tx2"/>
-                </a:solidFill>
-                <a:latin typeface="Montserrat" panose="02000505000000020004" pitchFamily="2" charset="0"/>
-                <a:hlinkClick r:id="rId6"/>
-              </a:rPr>
-              <a:t>TransPerfect Podcast</a:t>
-            </a:r>
-            <a:endParaRPr lang="en-US" sz="2200" dirty="0">
-              <a:solidFill>
-                <a:schemeClr val="tx2"/>
-              </a:solidFill>
-              <a:latin typeface="Montserrat" panose="02000505000000020004" pitchFamily="2" charset="0"/>
-            </a:endParaRPr>
-          </a:p>
-          <a:p>
-            <a:r>
-              <a:rPr lang="en-US" sz="2200" dirty="0" smtClean="0">
-                <a:solidFill>
-                  <a:schemeClr val="tx2"/>
-                </a:solidFill>
-                <a:latin typeface="Montserrat" panose="02000505000000020004" pitchFamily="2" charset="0"/>
-                <a:hlinkClick r:id="rId7"/>
-              </a:rPr>
-              <a:t>Under </a:t>
-            </a:r>
-            <a:r>
-              <a:rPr lang="en-US" sz="2200" dirty="0">
-                <a:solidFill>
-                  <a:schemeClr val="tx2"/>
-                </a:solidFill>
-                <a:latin typeface="Montserrat" panose="02000505000000020004" pitchFamily="2" charset="0"/>
-                <a:hlinkClick r:id="rId7"/>
-              </a:rPr>
-              <a:t>Our Roof: A Son's Battle for Recovery, a Mother's Battle for Her </a:t>
-            </a:r>
-            <a:r>
-              <a:rPr lang="en-US" sz="2200" dirty="0" smtClean="0">
-                <a:solidFill>
-                  <a:schemeClr val="tx2"/>
-                </a:solidFill>
-                <a:latin typeface="Montserrat" panose="02000505000000020004" pitchFamily="2" charset="0"/>
-                <a:hlinkClick r:id="rId7"/>
-              </a:rPr>
-              <a:t>Son </a:t>
-            </a:r>
-            <a:r>
-              <a:rPr lang="en-US" sz="2200" dirty="0" smtClean="0">
-                <a:solidFill>
-                  <a:schemeClr val="tx2"/>
-                </a:solidFill>
-                <a:latin typeface="Montserrat" panose="02000505000000020004" pitchFamily="2" charset="0"/>
-              </a:rPr>
-              <a:t>(book by Madeleine Dean, Harry </a:t>
-            </a:r>
-            <a:r>
-              <a:rPr lang="en-US" sz="2200" dirty="0" err="1" smtClean="0">
-                <a:solidFill>
-                  <a:schemeClr val="tx2"/>
-                </a:solidFill>
-                <a:latin typeface="Montserrat" panose="02000505000000020004" pitchFamily="2" charset="0"/>
-              </a:rPr>
-              <a:t>Cunnane</a:t>
-            </a:r>
-            <a:r>
-              <a:rPr lang="en-US" sz="2200" dirty="0" smtClean="0">
-                <a:solidFill>
-                  <a:schemeClr val="tx2"/>
-                </a:solidFill>
-                <a:latin typeface="Montserrat" panose="02000505000000020004" pitchFamily="2" charset="0"/>
-              </a:rPr>
-              <a:t>) </a:t>
-            </a:r>
-          </a:p>
-          <a:p>
-            <a:r>
-              <a:rPr lang="en-US" sz="2200" dirty="0" smtClean="0">
-                <a:solidFill>
-                  <a:schemeClr val="tx2"/>
-                </a:solidFill>
-                <a:latin typeface="Montserrat" panose="02000505000000020004" pitchFamily="2" charset="0"/>
-                <a:hlinkClick r:id="rId8"/>
-              </a:rPr>
-              <a:t>Ted </a:t>
-            </a:r>
-            <a:r>
-              <a:rPr lang="en-US" sz="2200" dirty="0">
-                <a:solidFill>
-                  <a:schemeClr val="tx2"/>
-                </a:solidFill>
-                <a:latin typeface="Montserrat" panose="02000505000000020004" pitchFamily="2" charset="0"/>
-                <a:hlinkClick r:id="rId8"/>
-              </a:rPr>
-              <a:t>Talk: Why do our brains get addicted? </a:t>
-            </a:r>
-            <a:endParaRPr lang="en-US" sz="2200" dirty="0" smtClean="0">
-              <a:solidFill>
-                <a:schemeClr val="tx2"/>
-              </a:solidFill>
-              <a:latin typeface="Montserrat" panose="02000505000000020004" pitchFamily="2" charset="0"/>
-            </a:endParaRPr>
-          </a:p>
-          <a:p>
-            <a:r>
-              <a:rPr lang="en-US" sz="2200" dirty="0" smtClean="0">
-                <a:solidFill>
-                  <a:schemeClr val="tx2"/>
-                </a:solidFill>
-                <a:latin typeface="Montserrat" panose="02000505000000020004" pitchFamily="2" charset="0"/>
-                <a:hlinkClick r:id="rId9"/>
-              </a:rPr>
-              <a:t>Ted Talk: Everything you think you know about addiction is wrong. </a:t>
-            </a:r>
-            <a:endParaRPr lang="en-US" sz="2200" dirty="0">
-              <a:solidFill>
-                <a:schemeClr val="tx2"/>
-              </a:solidFill>
-              <a:latin typeface="Montserrat" panose="02000505000000020004" pitchFamily="2" charset="0"/>
-            </a:endParaRPr>
-          </a:p>
-        </p:txBody>
-      </p:sp>
-    </p:spTree>
-    <p:extLst>
-      <p:ext uri="{BB962C8B-B14F-4D97-AF65-F5344CB8AC3E}">
-        <p14:creationId xmlns:p14="http://schemas.microsoft.com/office/powerpoint/2010/main" val="3900782981"/>
-      </p:ext>
-    </p:extLst>
-  </p:cSld>
-  <p:clrMapOvr>
-    <a:masterClrMapping/>
-  </p:clrMapOvr>
-</p:sld>
-</file>
-
 <file path=ppt/slides/slide15.xml><?xml version="1.0" encoding="utf-8"?>
 <p:sld xmlns:a="http://schemas.openxmlformats.org/drawingml/2006/main" xmlns:r="http://schemas.openxmlformats.org/officeDocument/2006/relationships" xmlns:p="http://schemas.openxmlformats.org/presentationml/2006/main">
   <p:cSld>
@@ -5606,15 +5142,337 @@
           <a:chExt cx="0" cy="0"/>
         </a:xfrm>
       </p:grpSpPr>
+      <p:sp>
+        <p:nvSpPr>
+          <p:cNvPr id="4" name="Title 3"/>
+          <p:cNvSpPr>
+            <a:spLocks noGrp="1"/>
+          </p:cNvSpPr>
+          <p:nvPr>
+            <p:ph type="title"/>
+          </p:nvPr>
+        </p:nvSpPr>
+        <p:spPr/>
+        <p:txBody>
+          <a:bodyPr>
+            <a:normAutofit/>
+          </a:bodyPr>
+          <a:lstStyle/>
+          <a:p>
+            <a:r>
+              <a:rPr lang="en-US" sz="4800" b="1" dirty="0">
+                <a:solidFill>
+                  <a:schemeClr val="tx2"/>
+                </a:solidFill>
+                <a:latin typeface="Montserrat" panose="02000505000000020004" pitchFamily="2" charset="0"/>
+              </a:rPr>
+              <a:t>References.</a:t>
+            </a:r>
+            <a:endParaRPr lang="en-US" sz="4800" b="1" dirty="0">
+              <a:solidFill>
+                <a:schemeClr val="tx2">
+                  <a:lumMod val="60000"/>
+                  <a:lumOff val="40000"/>
+                </a:schemeClr>
+              </a:solidFill>
+              <a:latin typeface="Montserrat" panose="02000505000000020004" pitchFamily="2" charset="0"/>
+            </a:endParaRPr>
+          </a:p>
+        </p:txBody>
+      </p:sp>
+      <p:sp>
+        <p:nvSpPr>
+          <p:cNvPr id="5" name="Content Placeholder 4"/>
+          <p:cNvSpPr>
+            <a:spLocks noGrp="1"/>
+          </p:cNvSpPr>
+          <p:nvPr>
+            <p:ph idx="1"/>
+          </p:nvPr>
+        </p:nvSpPr>
+        <p:spPr>
+          <a:xfrm>
+            <a:off x="838200" y="1825625"/>
+            <a:ext cx="10515600" cy="4871010"/>
+          </a:xfrm>
+        </p:spPr>
+        <p:txBody>
+          <a:bodyPr>
+            <a:noAutofit/>
+          </a:bodyPr>
+          <a:lstStyle/>
+          <a:p>
+            <a:r>
+              <a:rPr lang="en-US" sz="2200" dirty="0">
+                <a:solidFill>
+                  <a:schemeClr val="tx2"/>
+                </a:solidFill>
+                <a:latin typeface="Montserrat" panose="02000505000000020004" pitchFamily="2" charset="0"/>
+                <a:hlinkClick r:id="rId2"/>
+              </a:rPr>
+              <a:t>Expert explains why drug overdose deaths soared to record 93,000 amid pandemic (msnbc.com)</a:t>
+            </a:r>
+            <a:endParaRPr lang="en-US" sz="2200" dirty="0">
+              <a:solidFill>
+                <a:schemeClr val="tx2"/>
+              </a:solidFill>
+              <a:latin typeface="Montserrat" panose="02000505000000020004" pitchFamily="2" charset="0"/>
+            </a:endParaRPr>
+          </a:p>
+          <a:p>
+            <a:r>
+              <a:rPr lang="en-US" sz="2200" dirty="0">
+                <a:solidFill>
+                  <a:schemeClr val="tx2"/>
+                </a:solidFill>
+                <a:latin typeface="Montserrat" panose="02000505000000020004" pitchFamily="2" charset="0"/>
+                <a:hlinkClick r:id="rId3"/>
+              </a:rPr>
+              <a:t>Dr. Lee: Pandemic has 'certainly' made opioid crisis worse (msnbc.com)</a:t>
+            </a:r>
+            <a:endParaRPr lang="en-US" sz="2200" dirty="0">
+              <a:solidFill>
+                <a:schemeClr val="tx2"/>
+              </a:solidFill>
+              <a:latin typeface="Montserrat" panose="02000505000000020004" pitchFamily="2" charset="0"/>
+            </a:endParaRPr>
+          </a:p>
+          <a:p>
+            <a:r>
+              <a:rPr lang="en-US" sz="2200" dirty="0">
+                <a:solidFill>
+                  <a:schemeClr val="tx2"/>
+                </a:solidFill>
+                <a:latin typeface="Montserrat" panose="02000505000000020004" pitchFamily="2" charset="0"/>
+              </a:rPr>
+              <a:t>Dr. Nora </a:t>
+            </a:r>
+            <a:r>
+              <a:rPr lang="en-US" sz="2200" dirty="0" err="1">
+                <a:solidFill>
+                  <a:schemeClr val="tx2"/>
+                </a:solidFill>
+                <a:latin typeface="Montserrat" panose="02000505000000020004" pitchFamily="2" charset="0"/>
+              </a:rPr>
+              <a:t>Volkow’s</a:t>
+            </a:r>
+            <a:r>
+              <a:rPr lang="en-US" sz="2200" dirty="0">
+                <a:solidFill>
+                  <a:schemeClr val="tx2"/>
+                </a:solidFill>
+                <a:latin typeface="Montserrat" panose="02000505000000020004" pitchFamily="2" charset="0"/>
+              </a:rPr>
+              <a:t> </a:t>
+            </a:r>
+            <a:r>
+              <a:rPr lang="en-US" sz="2200" dirty="0">
+                <a:solidFill>
+                  <a:schemeClr val="tx2"/>
+                </a:solidFill>
+                <a:latin typeface="Montserrat" panose="02000505000000020004" pitchFamily="2" charset="0"/>
+                <a:hlinkClick r:id="rId4"/>
+              </a:rPr>
+              <a:t>YouTube videos </a:t>
+            </a:r>
+            <a:r>
+              <a:rPr lang="en-US" sz="2200" dirty="0">
+                <a:solidFill>
+                  <a:schemeClr val="tx2"/>
+                </a:solidFill>
+                <a:latin typeface="Montserrat" panose="02000505000000020004" pitchFamily="2" charset="0"/>
+              </a:rPr>
+              <a:t>(heads the National Institute on Drug Abuse (part of the NIH) </a:t>
+            </a:r>
+          </a:p>
+          <a:p>
+            <a:r>
+              <a:rPr lang="en-US" sz="2200" dirty="0">
+                <a:solidFill>
+                  <a:schemeClr val="tx2"/>
+                </a:solidFill>
+                <a:latin typeface="Montserrat" panose="02000505000000020004" pitchFamily="2" charset="0"/>
+              </a:rPr>
+              <a:t>Dr. Ruth </a:t>
+            </a:r>
+            <a:r>
+              <a:rPr lang="en-US" sz="2200" dirty="0" err="1">
+                <a:solidFill>
+                  <a:schemeClr val="tx2"/>
+                </a:solidFill>
+                <a:latin typeface="Montserrat" panose="02000505000000020004" pitchFamily="2" charset="0"/>
+              </a:rPr>
+              <a:t>Potee’s</a:t>
+            </a:r>
+            <a:r>
+              <a:rPr lang="en-US" sz="2200" dirty="0">
+                <a:solidFill>
+                  <a:schemeClr val="tx2"/>
+                </a:solidFill>
+                <a:latin typeface="Montserrat" panose="02000505000000020004" pitchFamily="2" charset="0"/>
+              </a:rPr>
+              <a:t> </a:t>
+            </a:r>
+            <a:r>
+              <a:rPr lang="en-US" sz="2200" dirty="0">
+                <a:solidFill>
+                  <a:schemeClr val="tx2"/>
+                </a:solidFill>
+                <a:latin typeface="Montserrat" panose="02000505000000020004" pitchFamily="2" charset="0"/>
+                <a:hlinkClick r:id="rId5"/>
+              </a:rPr>
+              <a:t>YouTube channel</a:t>
+            </a:r>
+            <a:endParaRPr lang="en-US" sz="2200" b="1" u="sng" dirty="0">
+              <a:solidFill>
+                <a:schemeClr val="tx2"/>
+              </a:solidFill>
+              <a:latin typeface="Montserrat" panose="02000505000000020004" pitchFamily="2" charset="0"/>
+            </a:endParaRPr>
+          </a:p>
+          <a:p>
+            <a:r>
+              <a:rPr lang="en-US" sz="2200" dirty="0">
+                <a:solidFill>
+                  <a:schemeClr val="tx2"/>
+                </a:solidFill>
+                <a:latin typeface="Montserrat" panose="02000505000000020004" pitchFamily="2" charset="0"/>
+              </a:rPr>
+              <a:t>Grieving episode on </a:t>
+            </a:r>
+            <a:r>
+              <a:rPr lang="en-US" sz="2200" dirty="0">
+                <a:solidFill>
+                  <a:schemeClr val="tx2"/>
+                </a:solidFill>
+                <a:latin typeface="Montserrat" panose="02000505000000020004" pitchFamily="2" charset="0"/>
+                <a:hlinkClick r:id="rId6"/>
+              </a:rPr>
+              <a:t>TransPerfect Podcast</a:t>
+            </a:r>
+            <a:endParaRPr lang="en-US" sz="2200" dirty="0">
+              <a:solidFill>
+                <a:schemeClr val="tx2"/>
+              </a:solidFill>
+              <a:latin typeface="Montserrat" panose="02000505000000020004" pitchFamily="2" charset="0"/>
+            </a:endParaRPr>
+          </a:p>
+          <a:p>
+            <a:r>
+              <a:rPr lang="en-US" sz="2200" dirty="0">
+                <a:solidFill>
+                  <a:schemeClr val="tx2"/>
+                </a:solidFill>
+                <a:latin typeface="Montserrat" panose="02000505000000020004" pitchFamily="2" charset="0"/>
+                <a:hlinkClick r:id="rId7"/>
+              </a:rPr>
+              <a:t>Under Our Roof: A Son's Battle for Recovery, a Mother's Battle for Her Son </a:t>
+            </a:r>
+            <a:r>
+              <a:rPr lang="en-US" sz="2200" dirty="0">
+                <a:solidFill>
+                  <a:schemeClr val="tx2"/>
+                </a:solidFill>
+                <a:latin typeface="Montserrat" panose="02000505000000020004" pitchFamily="2" charset="0"/>
+              </a:rPr>
+              <a:t>(book by Madeleine Dean, Harry </a:t>
+            </a:r>
+            <a:r>
+              <a:rPr lang="en-US" sz="2200" dirty="0" err="1">
+                <a:solidFill>
+                  <a:schemeClr val="tx2"/>
+                </a:solidFill>
+                <a:latin typeface="Montserrat" panose="02000505000000020004" pitchFamily="2" charset="0"/>
+              </a:rPr>
+              <a:t>Cunnane</a:t>
+            </a:r>
+            <a:r>
+              <a:rPr lang="en-US" sz="2200" dirty="0">
+                <a:solidFill>
+                  <a:schemeClr val="tx2"/>
+                </a:solidFill>
+                <a:latin typeface="Montserrat" panose="02000505000000020004" pitchFamily="2" charset="0"/>
+              </a:rPr>
+              <a:t>) </a:t>
+            </a:r>
+          </a:p>
+          <a:p>
+            <a:r>
+              <a:rPr lang="en-US" sz="2200" dirty="0">
+                <a:solidFill>
+                  <a:schemeClr val="tx2"/>
+                </a:solidFill>
+                <a:latin typeface="Montserrat" panose="02000505000000020004" pitchFamily="2" charset="0"/>
+                <a:hlinkClick r:id="rId8"/>
+              </a:rPr>
+              <a:t>Ted Talk: Why do our brains get addicted? </a:t>
+            </a:r>
+            <a:endParaRPr lang="en-US" sz="2200" dirty="0">
+              <a:solidFill>
+                <a:schemeClr val="tx2"/>
+              </a:solidFill>
+              <a:latin typeface="Montserrat" panose="02000505000000020004" pitchFamily="2" charset="0"/>
+            </a:endParaRPr>
+          </a:p>
+          <a:p>
+            <a:r>
+              <a:rPr lang="en-US" sz="2200" dirty="0">
+                <a:solidFill>
+                  <a:schemeClr val="tx2"/>
+                </a:solidFill>
+                <a:latin typeface="Montserrat" panose="02000505000000020004" pitchFamily="2" charset="0"/>
+                <a:hlinkClick r:id="rId9"/>
+              </a:rPr>
+              <a:t>Ted Talk: Everything you think you know about addiction is wrong. </a:t>
+            </a:r>
+            <a:endParaRPr lang="en-US" sz="2200" dirty="0">
+              <a:solidFill>
+                <a:schemeClr val="tx2"/>
+              </a:solidFill>
+              <a:latin typeface="Montserrat" panose="02000505000000020004" pitchFamily="2" charset="0"/>
+            </a:endParaRPr>
+          </a:p>
+        </p:txBody>
+      </p:sp>
+    </p:spTree>
+    <p:extLst>
+      <p:ext uri="{BB962C8B-B14F-4D97-AF65-F5344CB8AC3E}">
+        <p14:creationId xmlns:p14="http://schemas.microsoft.com/office/powerpoint/2010/main" val="3900782981"/>
+      </p:ext>
+    </p:extLst>
+  </p:cSld>
+  <p:clrMapOvr>
+    <a:masterClrMapping/>
+  </p:clrMapOvr>
+</p:sld>
+</file>
+
+<file path=ppt/slides/slide16.xml><?xml version="1.0" encoding="utf-8"?>
+<p:sld xmlns:a="http://schemas.openxmlformats.org/drawingml/2006/main" xmlns:r="http://schemas.openxmlformats.org/officeDocument/2006/relationships" xmlns:p="http://schemas.openxmlformats.org/presentationml/2006/main">
+  <p:cSld>
+    <p:spTree>
+      <p:nvGrpSpPr>
+        <p:cNvPr id="1" name=""/>
+        <p:cNvGrpSpPr/>
+        <p:nvPr/>
+      </p:nvGrpSpPr>
+      <p:grpSpPr>
+        <a:xfrm>
+          <a:off x="0" y="0"/>
+          <a:ext cx="0" cy="0"/>
+          <a:chOff x="0" y="0"/>
+          <a:chExt cx="0" cy="0"/>
+        </a:xfrm>
+      </p:grpSpPr>
       <p:sp useBgFill="1">
         <p:nvSpPr>
           <p:cNvPr id="33" name="Rectangle 32">
             <a:extLst>
               <a:ext uri="{FF2B5EF4-FFF2-40B4-BE49-F238E27FC236}">
-                <a16:creationId xmlns="" xmlns:a16="http://schemas.microsoft.com/office/drawing/2014/main" id="{90D01200-0224-43C5-AB38-FB4D16B73FB7}"/>
+                <a16:creationId xmlns:a16="http://schemas.microsoft.com/office/drawing/2014/main" id="{90D01200-0224-43C5-AB38-FB4D16B73FB7}"/>
               </a:ext>
               <a:ext uri="{C183D7F6-B498-43B3-948B-1728B52AA6E4}">
-                <adec:decorative xmlns="" xmlns:adec="http://schemas.microsoft.com/office/drawing/2017/decorative" val="1"/>
+                <adec:decorative xmlns:adec="http://schemas.microsoft.com/office/drawing/2017/decorative" val="1"/>
               </a:ext>
             </a:extLst>
           </p:cNvPr>
@@ -5624,7 +5482,7 @@
           <p:nvPr>
             <p:extLst>
               <p:ext uri="{386F3935-93C4-4BCD-93E2-E3B085C9AB24}">
-                <p16:designElem xmlns="" xmlns:p16="http://schemas.microsoft.com/office/powerpoint/2015/main" val="1"/>
+                <p16:designElem xmlns:p16="http://schemas.microsoft.com/office/powerpoint/2015/main" val="1"/>
               </p:ext>
             </p:extLst>
           </p:nvPr>
@@ -5671,7 +5529,7 @@
           <p:cNvPr id="2" name="Title 1">
             <a:extLst>
               <a:ext uri="{FF2B5EF4-FFF2-40B4-BE49-F238E27FC236}">
-                <a16:creationId xmlns="" xmlns:a16="http://schemas.microsoft.com/office/drawing/2014/main" id="{CD749DA5-5A53-884D-85A8-03EA64B2BBDA}"/>
+                <a16:creationId xmlns:a16="http://schemas.microsoft.com/office/drawing/2014/main" id="{CD749DA5-5A53-884D-85A8-03EA64B2BBDA}"/>
               </a:ext>
             </a:extLst>
           </p:cNvPr>
@@ -5695,7 +5553,7 @@
           <a:lstStyle/>
           <a:p>
             <a:r>
-              <a:rPr lang="en-US" sz="4800" b="1" dirty="0" smtClean="0">
+              <a:rPr lang="en-US" sz="4800" b="1" dirty="0">
                 <a:solidFill>
                   <a:schemeClr val="tx2"/>
                 </a:solidFill>
@@ -5703,12 +5561,6 @@
               </a:rPr>
               <a:t>  Any Questions?</a:t>
             </a:r>
-            <a:endParaRPr lang="en-US" sz="4800" b="1" dirty="0">
-              <a:solidFill>
-                <a:schemeClr val="tx2"/>
-              </a:solidFill>
-              <a:latin typeface="Montserrat" panose="02000505000000020004" pitchFamily="2" charset="0"/>
-            </a:endParaRPr>
           </a:p>
         </p:txBody>
       </p:sp>
@@ -5794,13 +5646,6 @@
   <p:clrMapOvr>
     <a:masterClrMapping/>
   </p:clrMapOvr>
-  <p:timing>
-    <p:tnLst>
-      <p:par>
-        <p:cTn id="1" dur="indefinite" restart="never" nodeType="tmRoot"/>
-      </p:par>
-    </p:tnLst>
-  </p:timing>
 </p:sld>
 </file>
 
@@ -5826,10 +5671,10 @@
           <p:cNvPr id="33" name="Rectangle 32">
             <a:extLst>
               <a:ext uri="{FF2B5EF4-FFF2-40B4-BE49-F238E27FC236}">
-                <a16:creationId xmlns="" xmlns:a16="http://schemas.microsoft.com/office/drawing/2014/main" id="{90D01200-0224-43C5-AB38-FB4D16B73FB7}"/>
+                <a16:creationId xmlns:a16="http://schemas.microsoft.com/office/drawing/2014/main" id="{90D01200-0224-43C5-AB38-FB4D16B73FB7}"/>
               </a:ext>
               <a:ext uri="{C183D7F6-B498-43B3-948B-1728B52AA6E4}">
-                <adec:decorative xmlns="" xmlns:adec="http://schemas.microsoft.com/office/drawing/2017/decorative" val="1"/>
+                <adec:decorative xmlns:adec="http://schemas.microsoft.com/office/drawing/2017/decorative" val="1"/>
               </a:ext>
             </a:extLst>
           </p:cNvPr>
@@ -5839,7 +5684,7 @@
           <p:nvPr>
             <p:extLst>
               <p:ext uri="{386F3935-93C4-4BCD-93E2-E3B085C9AB24}">
-                <p16:designElem xmlns="" xmlns:p16="http://schemas.microsoft.com/office/powerpoint/2015/main" val="1"/>
+                <p16:designElem xmlns:p16="http://schemas.microsoft.com/office/powerpoint/2015/main" val="1"/>
               </p:ext>
             </p:extLst>
           </p:nvPr>
@@ -5886,7 +5731,7 @@
           <p:cNvPr id="2" name="Title 1">
             <a:extLst>
               <a:ext uri="{FF2B5EF4-FFF2-40B4-BE49-F238E27FC236}">
-                <a16:creationId xmlns="" xmlns:a16="http://schemas.microsoft.com/office/drawing/2014/main" id="{CD749DA5-5A53-884D-85A8-03EA64B2BBDA}"/>
+                <a16:creationId xmlns:a16="http://schemas.microsoft.com/office/drawing/2014/main" id="{CD749DA5-5A53-884D-85A8-03EA64B2BBDA}"/>
               </a:ext>
             </a:extLst>
           </p:cNvPr>
@@ -5910,7 +5755,7 @@
           <a:lstStyle/>
           <a:p>
             <a:r>
-              <a:rPr lang="en-US" sz="4800" b="1" dirty="0" smtClean="0">
+              <a:rPr lang="en-US" sz="4800" b="1" dirty="0">
                 <a:solidFill>
                   <a:schemeClr val="tx2"/>
                 </a:solidFill>
@@ -5919,7 +5764,7 @@
               <a:t>  Intro to</a:t>
             </a:r>
             <a:br>
-              <a:rPr lang="en-US" sz="4800" b="1" dirty="0" smtClean="0">
+              <a:rPr lang="en-US" sz="4800" b="1" dirty="0">
                 <a:solidFill>
                   <a:schemeClr val="tx2"/>
                 </a:solidFill>
@@ -5927,7 +5772,7 @@
               </a:rPr>
             </a:br>
             <a:r>
-              <a:rPr lang="en-US" sz="4800" b="1" dirty="0" smtClean="0">
+              <a:rPr lang="en-US" sz="4800" b="1" dirty="0">
                 <a:solidFill>
                   <a:schemeClr val="tx2"/>
                 </a:solidFill>
@@ -5935,12 +5780,6 @@
               </a:rPr>
               <a:t>  Family Support</a:t>
             </a:r>
-            <a:endParaRPr lang="en-US" sz="4800" b="1" dirty="0">
-              <a:solidFill>
-                <a:schemeClr val="tx2"/>
-              </a:solidFill>
-              <a:latin typeface="Montserrat" panose="02000505000000020004" pitchFamily="2" charset="0"/>
-            </a:endParaRPr>
           </a:p>
         </p:txBody>
       </p:sp>
@@ -6021,7 +5860,7 @@
           <p:cNvPr id="7" name="Content Placeholder 2">
             <a:extLst>
               <a:ext uri="{FF2B5EF4-FFF2-40B4-BE49-F238E27FC236}">
-                <a16:creationId xmlns="" xmlns:a16="http://schemas.microsoft.com/office/drawing/2014/main" id="{01CAC563-2271-494F-B958-B3DE858CF9D9}"/>
+                <a16:creationId xmlns:a16="http://schemas.microsoft.com/office/drawing/2014/main" id="{01CAC563-2271-494F-B958-B3DE858CF9D9}"/>
               </a:ext>
             </a:extLst>
           </p:cNvPr>
@@ -6217,7 +6056,7 @@
               </a:spcAft>
             </a:pPr>
             <a:r>
-              <a:rPr lang="en-US" sz="2200" dirty="0" smtClean="0">
+              <a:rPr lang="en-US" sz="2200" dirty="0">
                 <a:solidFill>
                   <a:schemeClr val="tx2"/>
                 </a:solidFill>
@@ -6236,7 +6075,7 @@
               </a:spcAft>
             </a:pPr>
             <a:r>
-              <a:rPr lang="en-US" sz="2200" dirty="0" smtClean="0">
+              <a:rPr lang="en-US" sz="2200" dirty="0">
                 <a:solidFill>
                   <a:schemeClr val="tx2"/>
                 </a:solidFill>
@@ -6255,7 +6094,7 @@
               </a:spcAft>
             </a:pPr>
             <a:r>
-              <a:rPr lang="en-US" sz="2200" dirty="0" smtClean="0">
+              <a:rPr lang="en-US" sz="2200" dirty="0">
                 <a:solidFill>
                   <a:schemeClr val="tx2"/>
                 </a:solidFill>
@@ -6276,7 +6115,7 @@
               <a:buChar char="-"/>
             </a:pPr>
             <a:r>
-              <a:rPr lang="en-US" sz="2200" dirty="0" smtClean="0">
+              <a:rPr lang="en-US" sz="2200" dirty="0">
                 <a:solidFill>
                   <a:schemeClr val="tx2"/>
                 </a:solidFill>
@@ -6297,7 +6136,7 @@
               <a:buChar char="-"/>
             </a:pPr>
             <a:r>
-              <a:rPr lang="en-US" sz="2200" dirty="0" smtClean="0">
+              <a:rPr lang="en-US" sz="2200" dirty="0">
                 <a:solidFill>
                   <a:schemeClr val="tx2"/>
                 </a:solidFill>
@@ -6306,7 +6145,7 @@
               <a:t>Email </a:t>
             </a:r>
             <a:r>
-              <a:rPr lang="en-US" sz="2200" dirty="0" smtClean="0">
+              <a:rPr lang="en-US" sz="2200" dirty="0">
                 <a:latin typeface="Montserrat" panose="02000505000000020004" pitchFamily="2" charset="0"/>
                 <a:hlinkClick r:id="rId3"/>
               </a:rPr>
@@ -6753,23 +6592,8 @@
                 </a:solidFill>
                 <a:latin typeface="Montserrat" panose="02000505000000020004" pitchFamily="2" charset="0"/>
               </a:rPr>
-              <a:t>If you have </a:t>
-            </a:r>
-            <a:r>
-              <a:rPr lang="en-US" dirty="0" smtClean="0">
-                <a:solidFill>
-                  <a:schemeClr val="tx2"/>
-                </a:solidFill>
-                <a:latin typeface="Montserrat" panose="02000505000000020004" pitchFamily="2" charset="0"/>
-              </a:rPr>
-              <a:t>teenagers</a:t>
-            </a:r>
-            <a:endParaRPr lang="en-US" dirty="0">
-              <a:solidFill>
-                <a:schemeClr val="tx2"/>
-              </a:solidFill>
-              <a:latin typeface="Montserrat" panose="02000505000000020004" pitchFamily="2" charset="0"/>
-            </a:endParaRPr>
+              <a:t>If you have teenagers</a:t>
+            </a:r>
           </a:p>
           <a:p>
             <a:r>
@@ -6779,25 +6603,7 @@
                 </a:solidFill>
                 <a:latin typeface="Montserrat" panose="02000505000000020004" pitchFamily="2" charset="0"/>
               </a:rPr>
-              <a:t>If you have </a:t>
-            </a:r>
-            <a:r>
-              <a:rPr lang="en-US" dirty="0" smtClean="0">
-                <a:solidFill>
-                  <a:schemeClr val="tx2"/>
-                </a:solidFill>
-                <a:latin typeface="Montserrat" panose="02000505000000020004" pitchFamily="2" charset="0"/>
-              </a:rPr>
-              <a:t>elderly </a:t>
-            </a:r>
-            <a:r>
-              <a:rPr lang="en-US" dirty="0">
-                <a:solidFill>
-                  <a:schemeClr val="tx2"/>
-                </a:solidFill>
-                <a:latin typeface="Montserrat" panose="02000505000000020004" pitchFamily="2" charset="0"/>
-              </a:rPr>
-              <a:t>parents</a:t>
+              <a:t>If you have elderly parents</a:t>
             </a:r>
           </a:p>
           <a:p>
@@ -6861,7 +6667,7 @@
           <a:lstStyle/>
           <a:p>
             <a:r>
-              <a:rPr lang="en-US" sz="4800" b="1" dirty="0" smtClean="0">
+              <a:rPr lang="en-US" sz="4800" b="1" dirty="0">
                 <a:solidFill>
                   <a:schemeClr val="tx2"/>
                 </a:solidFill>
@@ -6869,12 +6675,6 @@
               </a:rPr>
               <a:t>About Me.</a:t>
             </a:r>
-            <a:endParaRPr lang="en-US" sz="4800" b="1" dirty="0">
-              <a:solidFill>
-                <a:schemeClr val="tx2"/>
-              </a:solidFill>
-              <a:latin typeface="Montserrat" panose="02000505000000020004" pitchFamily="2" charset="0"/>
-            </a:endParaRPr>
           </a:p>
         </p:txBody>
       </p:sp>
@@ -6905,22 +6705,13 @@
           </a:p>
           <a:p>
             <a:r>
-              <a:rPr lang="en-US" dirty="0" smtClean="0">
-                <a:solidFill>
-                  <a:schemeClr val="tx2"/>
-                </a:solidFill>
-                <a:latin typeface="Montserrat" panose="02000505000000020004" pitchFamily="2" charset="0"/>
-              </a:rPr>
-              <a:t>My wife </a:t>
-            </a:r>
-            <a:r>
               <a:rPr lang="en-US" dirty="0">
                 <a:solidFill>
                   <a:schemeClr val="tx2"/>
                 </a:solidFill>
                 <a:latin typeface="Montserrat" panose="02000505000000020004" pitchFamily="2" charset="0"/>
               </a:rPr>
-              <a:t>heard stories about her grandmother’s brother / alcoholism</a:t>
+              <a:t>My wife heard stories about her grandmother’s brother / alcoholism</a:t>
             </a:r>
           </a:p>
           <a:p>
@@ -6975,25 +6766,7 @@
                 </a:solidFill>
                 <a:latin typeface="Montserrat" panose="02000505000000020004" pitchFamily="2" charset="0"/>
               </a:rPr>
-              <a:t>We knew that Ben had ADHD, sleeping disorder, </a:t>
-            </a:r>
-            <a:r>
-              <a:rPr lang="en-US" dirty="0" smtClean="0">
-                <a:solidFill>
-                  <a:schemeClr val="tx2"/>
-                </a:solidFill>
-                <a:latin typeface="Montserrat" panose="02000505000000020004" pitchFamily="2" charset="0"/>
-              </a:rPr>
-              <a:t>impulsive </a:t>
-            </a:r>
-            <a:r>
-              <a:rPr lang="en-US" dirty="0">
-                <a:solidFill>
-                  <a:schemeClr val="tx2"/>
-                </a:solidFill>
-                <a:latin typeface="Montserrat" panose="02000505000000020004" pitchFamily="2" charset="0"/>
-              </a:rPr>
-              <a:t>and addictive personality</a:t>
+              <a:t>We knew that Ben had ADHD, sleeping disorder, impulsive and addictive personality</a:t>
             </a:r>
           </a:p>
         </p:txBody>
@@ -7046,7 +6819,7 @@
           <a:lstStyle/>
           <a:p>
             <a:r>
-              <a:rPr lang="en-US" sz="4800" b="1" dirty="0" smtClean="0">
+              <a:rPr lang="en-US" sz="4800" b="1" dirty="0">
                 <a:solidFill>
                   <a:schemeClr val="tx2"/>
                 </a:solidFill>
@@ -7055,7 +6828,7 @@
               <a:t>Who’s At Risk?  </a:t>
             </a:r>
             <a:r>
-              <a:rPr lang="en-US" sz="4800" b="1" dirty="0" smtClean="0">
+              <a:rPr lang="en-US" sz="4800" b="1" dirty="0">
                 <a:solidFill>
                   <a:schemeClr val="tx2">
                     <a:lumMod val="60000"/>
@@ -7066,15 +6839,6 @@
               </a:rPr>
               <a:t>14-45 &amp; Elderly</a:t>
             </a:r>
-            <a:endParaRPr lang="en-US" sz="4800" b="1" dirty="0">
-              <a:solidFill>
-                <a:schemeClr val="tx2">
-                  <a:lumMod val="60000"/>
-                  <a:lumOff val="40000"/>
-                </a:schemeClr>
-              </a:solidFill>
-              <a:latin typeface="Montserrat" panose="02000505000000020004" pitchFamily="2" charset="0"/>
-            </a:endParaRPr>
           </a:p>
         </p:txBody>
       </p:sp>
@@ -7190,7 +6954,7 @@
                 </a:solidFill>
                 <a:latin typeface="Montserrat" panose="02000505000000020004" pitchFamily="2" charset="0"/>
               </a:rPr>
-              <a:t>** Live in pain, perceived or actual (physical or emotional) **</a:t>
+              <a:t>** Live in pain, perceived or actual (physical or emotional)</a:t>
             </a:r>
           </a:p>
         </p:txBody>
@@ -7243,7 +7007,7 @@
           <a:lstStyle/>
           <a:p>
             <a:r>
-              <a:rPr lang="en-US" sz="4800" b="1" dirty="0" smtClean="0">
+              <a:rPr lang="en-US" sz="4800" b="1" dirty="0">
                 <a:solidFill>
                   <a:schemeClr val="tx2"/>
                 </a:solidFill>
@@ -7251,12 +7015,6 @@
               </a:rPr>
               <a:t>What is Addiction?</a:t>
             </a:r>
-            <a:endParaRPr lang="en-US" sz="4800" b="1" dirty="0">
-              <a:solidFill>
-                <a:schemeClr val="tx2"/>
-              </a:solidFill>
-              <a:latin typeface="Montserrat" panose="02000505000000020004" pitchFamily="2" charset="0"/>
-            </a:endParaRPr>
           </a:p>
         </p:txBody>
       </p:sp>
@@ -7278,22 +7036,13 @@
           <a:lstStyle/>
           <a:p>
             <a:r>
-              <a:rPr lang="en-US" dirty="0" smtClean="0">
-                <a:solidFill>
-                  <a:schemeClr val="tx2"/>
-                </a:solidFill>
-                <a:latin typeface="Montserrat" panose="02000505000000020004" pitchFamily="2" charset="0"/>
-              </a:rPr>
-              <a:t>A chronic </a:t>
-            </a:r>
-            <a:r>
               <a:rPr lang="en-US" dirty="0">
                 <a:solidFill>
                   <a:schemeClr val="tx2"/>
                 </a:solidFill>
                 <a:latin typeface="Montserrat" panose="02000505000000020004" pitchFamily="2" charset="0"/>
               </a:rPr>
-              <a:t>disease</a:t>
+              <a:t>A chronic disease</a:t>
             </a:r>
           </a:p>
           <a:p>
@@ -7317,34 +7066,16 @@
           </a:p>
           <a:p>
             <a:r>
-              <a:rPr lang="en-US" dirty="0" smtClean="0">
-                <a:solidFill>
-                  <a:schemeClr val="tx2"/>
-                </a:solidFill>
-                <a:latin typeface="Montserrat" panose="02000505000000020004" pitchFamily="2" charset="0"/>
-              </a:rPr>
-              <a:t>Not </a:t>
-            </a:r>
-            <a:r>
               <a:rPr lang="en-US" dirty="0">
                 <a:solidFill>
                   <a:schemeClr val="tx2"/>
                 </a:solidFill>
                 <a:latin typeface="Montserrat" panose="02000505000000020004" pitchFamily="2" charset="0"/>
               </a:rPr>
-              <a:t>limited to substance abuse</a:t>
-            </a:r>
-          </a:p>
-          <a:p>
-            <a:r>
-              <a:rPr lang="en-US" dirty="0" smtClean="0">
-                <a:solidFill>
-                  <a:schemeClr val="tx2"/>
-                </a:solidFill>
-                <a:latin typeface="Montserrat" panose="02000505000000020004" pitchFamily="2" charset="0"/>
-              </a:rPr>
-              <a:t>Attacks </a:t>
-            </a:r>
+              <a:t>Not limited to substance abuse</a:t>
+            </a:r>
+          </a:p>
+          <a:p>
             <a:r>
               <a:rPr lang="en-US" dirty="0">
                 <a:solidFill>
@@ -7352,19 +7083,10 @@
                 </a:solidFill>
                 <a:latin typeface="Montserrat" panose="02000505000000020004" pitchFamily="2" charset="0"/>
               </a:rPr>
-              <a:t>the decision center of our brain</a:t>
-            </a:r>
-          </a:p>
-          <a:p>
-            <a:r>
-              <a:rPr lang="en-US" dirty="0" smtClean="0">
-                <a:solidFill>
-                  <a:schemeClr val="tx2"/>
-                </a:solidFill>
-                <a:latin typeface="Montserrat" panose="02000505000000020004" pitchFamily="2" charset="0"/>
-              </a:rPr>
-              <a:t>Cannot </a:t>
-            </a:r>
+              <a:t>Attacks the decision center of our brain</a:t>
+            </a:r>
+          </a:p>
+          <a:p>
             <a:r>
               <a:rPr lang="en-US" dirty="0">
                 <a:solidFill>
@@ -7372,7 +7094,7 @@
                 </a:solidFill>
                 <a:latin typeface="Montserrat" panose="02000505000000020004" pitchFamily="2" charset="0"/>
               </a:rPr>
-              <a:t>be controlled with will power</a:t>
+              <a:t>Cannot be controlled with will power</a:t>
             </a:r>
           </a:p>
           <a:p>
@@ -7391,25 +7113,7 @@
                 </a:solidFill>
                 <a:latin typeface="Montserrat" panose="02000505000000020004" pitchFamily="2" charset="0"/>
               </a:rPr>
-              <a:t>21 </a:t>
-            </a:r>
-            <a:r>
-              <a:rPr lang="en-US" dirty="0" smtClean="0">
-                <a:solidFill>
-                  <a:schemeClr val="tx2"/>
-                </a:solidFill>
-                <a:latin typeface="Montserrat" panose="02000505000000020004" pitchFamily="2" charset="0"/>
-              </a:rPr>
-              <a:t>years old </a:t>
-            </a:r>
-            <a:r>
-              <a:rPr lang="en-US" dirty="0">
-                <a:solidFill>
-                  <a:schemeClr val="tx2"/>
-                </a:solidFill>
-                <a:latin typeface="Montserrat" panose="02000505000000020004" pitchFamily="2" charset="0"/>
-              </a:rPr>
-              <a:t>is a magic age</a:t>
+              <a:t>21 years old is a magic age</a:t>
             </a:r>
           </a:p>
         </p:txBody>
@@ -7468,23 +7172,8 @@
                 </a:solidFill>
                 <a:latin typeface="Montserrat" panose="02000505000000020004" pitchFamily="2" charset="0"/>
               </a:rPr>
-              <a:t>Path to </a:t>
-            </a:r>
-            <a:r>
-              <a:rPr lang="en-US" sz="4800" b="1" dirty="0" smtClean="0">
-                <a:solidFill>
-                  <a:schemeClr val="tx2"/>
-                </a:solidFill>
-                <a:latin typeface="Montserrat" panose="02000505000000020004" pitchFamily="2" charset="0"/>
-              </a:rPr>
-              <a:t>Opiate Addiction.</a:t>
-            </a:r>
-            <a:endParaRPr lang="en-US" sz="4800" b="1" dirty="0">
-              <a:solidFill>
-                <a:schemeClr val="tx2"/>
-              </a:solidFill>
-              <a:latin typeface="Montserrat" panose="02000505000000020004" pitchFamily="2" charset="0"/>
-            </a:endParaRPr>
+              <a:t>Path to Opiate Addiction.</a:t>
+            </a:r>
           </a:p>
         </p:txBody>
       </p:sp>
@@ -7534,17 +7223,10 @@
                 </a:solidFill>
                 <a:latin typeface="Montserrat" panose="02000505000000020004" pitchFamily="2" charset="0"/>
               </a:rPr>
-              <a:t>As parents, we all talk to our children about </a:t>
-            </a:r>
-            <a:r>
-              <a:rPr lang="en-US" sz="2400" dirty="0" smtClean="0">
-                <a:solidFill>
-                  <a:schemeClr val="tx2"/>
-                </a:solidFill>
-                <a:latin typeface="Montserrat" panose="02000505000000020004" pitchFamily="2" charset="0"/>
-              </a:rPr>
-              <a:t>drugs infrequently </a:t>
-            </a:r>
+              <a:t>As parents, we all talk to our children about drugs infrequently and we tend to exaggerate</a:t>
+            </a:r>
+          </a:p>
+          <a:p>
             <a:r>
               <a:rPr lang="en-US" sz="2400" dirty="0">
                 <a:solidFill>
@@ -7552,34 +7234,8 @@
                 </a:solidFill>
                 <a:latin typeface="Montserrat" panose="02000505000000020004" pitchFamily="2" charset="0"/>
               </a:rPr>
-              <a:t>and we tend to exaggerate</a:t>
-            </a:r>
-          </a:p>
-          <a:p>
-            <a:r>
-              <a:rPr lang="en-US" sz="2400" dirty="0">
-                <a:solidFill>
-                  <a:schemeClr val="tx2"/>
-                </a:solidFill>
-                <a:latin typeface="Montserrat" panose="02000505000000020004" pitchFamily="2" charset="0"/>
-              </a:rPr>
-              <a:t>Path to drug </a:t>
-            </a:r>
-            <a:r>
-              <a:rPr lang="en-US" sz="2400" dirty="0" smtClean="0">
-                <a:solidFill>
-                  <a:schemeClr val="tx2"/>
-                </a:solidFill>
-                <a:latin typeface="Montserrat" panose="02000505000000020004" pitchFamily="2" charset="0"/>
-              </a:rPr>
-              <a:t>addiction:</a:t>
-            </a:r>
-            <a:endParaRPr lang="en-US" sz="2400" dirty="0">
-              <a:solidFill>
-                <a:schemeClr val="tx2"/>
-              </a:solidFill>
-              <a:latin typeface="Montserrat" panose="02000505000000020004" pitchFamily="2" charset="0"/>
-            </a:endParaRPr>
+              <a:t>Path to drug addiction:</a:t>
+            </a:r>
           </a:p>
           <a:p>
             <a:pPr lvl="1"/>
@@ -7666,7 +7322,7 @@
           <a:lstStyle/>
           <a:p>
             <a:r>
-              <a:rPr lang="en-US" sz="4800" b="1" dirty="0" smtClean="0">
+              <a:rPr lang="en-US" sz="4800" b="1" dirty="0">
                 <a:solidFill>
                   <a:schemeClr val="tx2"/>
                 </a:solidFill>
@@ -7674,31 +7330,96 @@
               </a:rPr>
               <a:t>Your Child Starts Using.</a:t>
             </a:r>
-            <a:endParaRPr lang="en-US" sz="4800" b="1" dirty="0">
+          </a:p>
+        </p:txBody>
+      </p:sp>
+      <p:sp>
+        <p:nvSpPr>
+          <p:cNvPr id="5" name="Content Placeholder 4"/>
+          <p:cNvSpPr>
+            <a:spLocks noGrp="1"/>
+          </p:cNvSpPr>
+          <p:nvPr>
+            <p:ph idx="1"/>
+          </p:nvPr>
+        </p:nvSpPr>
+        <p:spPr/>
+        <p:txBody>
+          <a:bodyPr>
+            <a:noAutofit/>
+          </a:bodyPr>
+          <a:lstStyle/>
+          <a:p>
+            <a:r>
+              <a:rPr lang="en-US" sz="2400" dirty="0">
+                <a:solidFill>
+                  <a:schemeClr val="tx2"/>
+                </a:solidFill>
+                <a:latin typeface="Montserrat" panose="02000505000000020004" pitchFamily="2" charset="0"/>
+              </a:rPr>
+              <a:t>We as parents do not know</a:t>
+            </a:r>
+          </a:p>
+          <a:p>
+            <a:r>
+              <a:rPr lang="en-US" sz="2400" dirty="0">
+                <a:solidFill>
+                  <a:schemeClr val="tx2"/>
+                </a:solidFill>
+                <a:latin typeface="Montserrat" panose="02000505000000020004" pitchFamily="2" charset="0"/>
+              </a:rPr>
+              <a:t>If you do find out that your child is using, be your child’s best advocate</a:t>
+            </a:r>
+          </a:p>
+          <a:p>
+            <a:r>
+              <a:rPr lang="en-US" sz="2400" dirty="0">
+                <a:solidFill>
+                  <a:schemeClr val="tx2"/>
+                </a:solidFill>
+                <a:latin typeface="Montserrat" panose="02000505000000020004" pitchFamily="2" charset="0"/>
+              </a:rPr>
+              <a:t>Be careful not to be an enabler</a:t>
+            </a:r>
+          </a:p>
+          <a:p>
+            <a:r>
+              <a:rPr lang="en-US" sz="2400" dirty="0">
+                <a:solidFill>
+                  <a:schemeClr val="tx2"/>
+                </a:solidFill>
+                <a:latin typeface="Montserrat" panose="02000505000000020004" pitchFamily="2" charset="0"/>
+              </a:rPr>
+              <a:t>Your goal is to have your child want to quit using</a:t>
+            </a:r>
+          </a:p>
+          <a:p>
+            <a:r>
+              <a:rPr lang="en-US" sz="2400" dirty="0">
+                <a:solidFill>
+                  <a:schemeClr val="tx2"/>
+                </a:solidFill>
+                <a:latin typeface="Montserrat" panose="02000505000000020004" pitchFamily="2" charset="0"/>
+              </a:rPr>
+              <a:t>Make sure that you do not alienate your child</a:t>
+            </a:r>
+          </a:p>
+          <a:p>
+            <a:r>
+              <a:rPr lang="en-US" sz="2400" b="1" dirty="0">
+                <a:latin typeface="Montserrat" panose="02000505000000020004" pitchFamily="2" charset="0"/>
+              </a:rPr>
+              <a:t>Approaching your child with a negative attitude will not end positively</a:t>
+            </a:r>
+          </a:p>
+          <a:p>
+            <a:endParaRPr lang="en-US" sz="2400" dirty="0">
               <a:solidFill>
                 <a:schemeClr val="tx2"/>
               </a:solidFill>
               <a:latin typeface="Montserrat" panose="02000505000000020004" pitchFamily="2" charset="0"/>
             </a:endParaRPr>
           </a:p>
-        </p:txBody>
-      </p:sp>
-      <p:sp>
-        <p:nvSpPr>
-          <p:cNvPr id="5" name="Content Placeholder 4"/>
-          <p:cNvSpPr>
-            <a:spLocks noGrp="1"/>
-          </p:cNvSpPr>
-          <p:nvPr>
-            <p:ph idx="1"/>
-          </p:nvPr>
-        </p:nvSpPr>
-        <p:spPr/>
-        <p:txBody>
-          <a:bodyPr>
-            <a:noAutofit/>
-          </a:bodyPr>
-          <a:lstStyle/>
           <a:p>
             <a:r>
               <a:rPr lang="en-US" sz="2400" dirty="0">
@@ -7707,150 +7428,7 @@
                 </a:solidFill>
                 <a:latin typeface="Montserrat" panose="02000505000000020004" pitchFamily="2" charset="0"/>
               </a:rPr>
-              <a:t>We as parents do not know</a:t>
-            </a:r>
-          </a:p>
-          <a:p>
-            <a:r>
-              <a:rPr lang="en-US" sz="2400" dirty="0" smtClean="0">
-                <a:solidFill>
-                  <a:schemeClr val="tx2"/>
-                </a:solidFill>
-                <a:latin typeface="Montserrat" panose="02000505000000020004" pitchFamily="2" charset="0"/>
-              </a:rPr>
-              <a:t>If </a:t>
-            </a:r>
-            <a:r>
-              <a:rPr lang="en-US" sz="2400" dirty="0">
-                <a:solidFill>
-                  <a:schemeClr val="tx2"/>
-                </a:solidFill>
-                <a:latin typeface="Montserrat" panose="02000505000000020004" pitchFamily="2" charset="0"/>
-              </a:rPr>
-              <a:t>you do find out that your child is </a:t>
-            </a:r>
-            <a:r>
-              <a:rPr lang="en-US" sz="2400" dirty="0" smtClean="0">
-                <a:solidFill>
-                  <a:schemeClr val="tx2"/>
-                </a:solidFill>
-                <a:latin typeface="Montserrat" panose="02000505000000020004" pitchFamily="2" charset="0"/>
-              </a:rPr>
-              <a:t>using, be </a:t>
-            </a:r>
-            <a:r>
-              <a:rPr lang="en-US" sz="2400" dirty="0">
-                <a:solidFill>
-                  <a:schemeClr val="tx2"/>
-                </a:solidFill>
-                <a:latin typeface="Montserrat" panose="02000505000000020004" pitchFamily="2" charset="0"/>
-              </a:rPr>
-              <a:t>your </a:t>
-            </a:r>
-            <a:r>
-              <a:rPr lang="en-US" sz="2400" dirty="0" smtClean="0">
-                <a:solidFill>
-                  <a:schemeClr val="tx2"/>
-                </a:solidFill>
-                <a:latin typeface="Montserrat" panose="02000505000000020004" pitchFamily="2" charset="0"/>
-              </a:rPr>
-              <a:t>child’s best </a:t>
-            </a:r>
-            <a:r>
-              <a:rPr lang="en-US" sz="2400" dirty="0">
-                <a:solidFill>
-                  <a:schemeClr val="tx2"/>
-                </a:solidFill>
-                <a:latin typeface="Montserrat" panose="02000505000000020004" pitchFamily="2" charset="0"/>
-              </a:rPr>
-              <a:t>advocate</a:t>
-            </a:r>
-          </a:p>
-          <a:p>
-            <a:r>
-              <a:rPr lang="en-US" sz="2400" dirty="0">
-                <a:solidFill>
-                  <a:schemeClr val="tx2"/>
-                </a:solidFill>
-                <a:latin typeface="Montserrat" panose="02000505000000020004" pitchFamily="2" charset="0"/>
-              </a:rPr>
-              <a:t>Be careful not to be an enabler</a:t>
-            </a:r>
-          </a:p>
-          <a:p>
-            <a:r>
-              <a:rPr lang="en-US" sz="2400" dirty="0">
-                <a:solidFill>
-                  <a:schemeClr val="tx2"/>
-                </a:solidFill>
-                <a:latin typeface="Montserrat" panose="02000505000000020004" pitchFamily="2" charset="0"/>
-              </a:rPr>
-              <a:t>Your goal is to have your child want to quit using</a:t>
-            </a:r>
-          </a:p>
-          <a:p>
-            <a:r>
-              <a:rPr lang="en-US" sz="2400" dirty="0">
-                <a:solidFill>
-                  <a:schemeClr val="tx2"/>
-                </a:solidFill>
-                <a:latin typeface="Montserrat" panose="02000505000000020004" pitchFamily="2" charset="0"/>
-              </a:rPr>
-              <a:t>Make sure that you do not alienate your child</a:t>
-            </a:r>
-          </a:p>
-          <a:p>
-            <a:r>
-              <a:rPr lang="en-US" sz="2400" b="1" dirty="0">
-                <a:latin typeface="Montserrat" panose="02000505000000020004" pitchFamily="2" charset="0"/>
-              </a:rPr>
-              <a:t>Approaching your child with a negative attitude will not end positively</a:t>
-            </a:r>
-          </a:p>
-          <a:p>
-            <a:endParaRPr lang="en-US" sz="2400" dirty="0" smtClean="0">
-              <a:solidFill>
-                <a:schemeClr val="tx2"/>
-              </a:solidFill>
-              <a:latin typeface="Montserrat" panose="02000505000000020004" pitchFamily="2" charset="0"/>
-            </a:endParaRPr>
-          </a:p>
-          <a:p>
-            <a:r>
-              <a:rPr lang="en-US" sz="2400" dirty="0" smtClean="0">
-                <a:solidFill>
-                  <a:schemeClr val="tx2"/>
-                </a:solidFill>
-                <a:latin typeface="Montserrat" panose="02000505000000020004" pitchFamily="2" charset="0"/>
-              </a:rPr>
-              <a:t>If </a:t>
-            </a:r>
-            <a:r>
-              <a:rPr lang="en-US" sz="2400" dirty="0">
-                <a:solidFill>
-                  <a:schemeClr val="tx2"/>
-                </a:solidFill>
-                <a:latin typeface="Montserrat" panose="02000505000000020004" pitchFamily="2" charset="0"/>
-              </a:rPr>
-              <a:t>you loose a </a:t>
-            </a:r>
-            <a:r>
-              <a:rPr lang="en-US" sz="2400" dirty="0" smtClean="0">
-                <a:solidFill>
-                  <a:schemeClr val="tx2"/>
-                </a:solidFill>
-                <a:latin typeface="Montserrat" panose="02000505000000020004" pitchFamily="2" charset="0"/>
-              </a:rPr>
-              <a:t>child, </a:t>
-            </a:r>
-            <a:r>
-              <a:rPr lang="en-US" sz="2400" dirty="0">
-                <a:solidFill>
-                  <a:schemeClr val="tx2"/>
-                </a:solidFill>
-                <a:latin typeface="Montserrat" panose="02000505000000020004" pitchFamily="2" charset="0"/>
-              </a:rPr>
-              <a:t>you need grief counseling</a:t>
+              <a:t>If you loose a child, you need grief counseling</a:t>
             </a:r>
           </a:p>
         </p:txBody>
@@ -7903,7 +7481,7 @@
           <a:lstStyle/>
           <a:p>
             <a:r>
-              <a:rPr lang="en-US" sz="4800" b="1" dirty="0" smtClean="0">
+              <a:rPr lang="en-US" sz="4800" b="1" dirty="0">
                 <a:solidFill>
                   <a:schemeClr val="tx2"/>
                 </a:solidFill>
@@ -7912,7 +7490,7 @@
               <a:t>How to Talk to our Children:</a:t>
             </a:r>
             <a:br>
-              <a:rPr lang="en-US" sz="4800" b="1" dirty="0" smtClean="0">
+              <a:rPr lang="en-US" sz="4800" b="1" dirty="0">
                 <a:solidFill>
                   <a:schemeClr val="tx2"/>
                 </a:solidFill>
@@ -7920,7 +7498,7 @@
               </a:rPr>
             </a:br>
             <a:r>
-              <a:rPr lang="en-US" sz="4800" b="1" dirty="0" smtClean="0">
+              <a:rPr lang="en-US" sz="4800" b="1" dirty="0">
                 <a:solidFill>
                   <a:schemeClr val="tx2">
                     <a:lumMod val="60000"/>
@@ -7931,15 +7509,6 @@
               </a:rPr>
               <a:t>Take Action.</a:t>
             </a:r>
-            <a:endParaRPr lang="en-US" sz="4800" b="1" dirty="0">
-              <a:solidFill>
-                <a:schemeClr val="tx2">
-                  <a:lumMod val="60000"/>
-                  <a:lumOff val="40000"/>
-                </a:schemeClr>
-              </a:solidFill>
-              <a:latin typeface="Montserrat" panose="02000505000000020004" pitchFamily="2" charset="0"/>
-            </a:endParaRPr>
           </a:p>
         </p:txBody>
       </p:sp>
@@ -7972,38 +7541,14 @@
           </a:p>
           <a:p>
             <a:r>
-              <a:rPr lang="en-US" sz="2400" dirty="0" smtClean="0">
-                <a:solidFill>
-                  <a:schemeClr val="tx2"/>
-                </a:solidFill>
-                <a:latin typeface="Montserrat" panose="02000505000000020004" pitchFamily="2" charset="0"/>
-              </a:rPr>
-              <a:t>Role </a:t>
-            </a:r>
-            <a:r>
               <a:rPr lang="en-US" sz="2400" dirty="0">
                 <a:solidFill>
                   <a:schemeClr val="tx2"/>
                 </a:solidFill>
                 <a:latin typeface="Montserrat" panose="02000505000000020004" pitchFamily="2" charset="0"/>
               </a:rPr>
-              <a:t>play how your children handle situations: school dance, party, any gathering with no adult </a:t>
-            </a:r>
-            <a:r>
-              <a:rPr lang="en-US" sz="2400" dirty="0" smtClean="0">
-                <a:solidFill>
-                  <a:schemeClr val="tx2"/>
-                </a:solidFill>
-                <a:latin typeface="Montserrat" panose="02000505000000020004" pitchFamily="2" charset="0"/>
-              </a:rPr>
-              <a:t>present</a:t>
-            </a:r>
-            <a:endParaRPr lang="en-US" sz="2400" dirty="0">
-              <a:solidFill>
-                <a:schemeClr val="tx2"/>
-              </a:solidFill>
-              <a:latin typeface="Montserrat" panose="02000505000000020004" pitchFamily="2" charset="0"/>
-            </a:endParaRPr>
+              <a:t>Role play how your children handle situations: school dance, party, any gathering with no adult present</a:t>
+            </a:r>
           </a:p>
           <a:p>
             <a:pPr lvl="2">
@@ -8050,41 +7595,8 @@
                 </a:solidFill>
                 <a:latin typeface="Montserrat" panose="02000505000000020004" pitchFamily="2" charset="0"/>
               </a:rPr>
-              <a:t>Someone pushes hard on your child </a:t>
-            </a:r>
-            <a:r>
-              <a:rPr lang="en-US" sz="2400" dirty="0" smtClean="0">
-                <a:solidFill>
-                  <a:schemeClr val="tx2"/>
-                </a:solidFill>
-                <a:latin typeface="Montserrat" panose="02000505000000020004" pitchFamily="2" charset="0"/>
-              </a:rPr>
-              <a:t>to take a </a:t>
-            </a:r>
-            <a:r>
-              <a:rPr lang="en-US" sz="2400" dirty="0">
-                <a:solidFill>
-                  <a:schemeClr val="tx2"/>
-                </a:solidFill>
-                <a:latin typeface="Montserrat" panose="02000505000000020004" pitchFamily="2" charset="0"/>
-              </a:rPr>
-              <a:t>pill or </a:t>
-            </a:r>
-            <a:r>
-              <a:rPr lang="en-US" sz="2400" dirty="0" smtClean="0">
-                <a:solidFill>
-                  <a:schemeClr val="tx2"/>
-                </a:solidFill>
-                <a:latin typeface="Montserrat" panose="02000505000000020004" pitchFamily="2" charset="0"/>
-              </a:rPr>
-              <a:t>drink</a:t>
-            </a:r>
-            <a:endParaRPr lang="en-US" sz="2400" dirty="0">
-              <a:solidFill>
-                <a:schemeClr val="tx2"/>
-              </a:solidFill>
-              <a:latin typeface="Montserrat" panose="02000505000000020004" pitchFamily="2" charset="0"/>
-            </a:endParaRPr>
+              <a:t>Someone pushes hard on your child to take a pill or drink</a:t>
+            </a:r>
           </a:p>
           <a:p>
             <a:pPr lvl="2">

</xml_diff>

<commit_message>
2022 01 09 --2
</commit_message>
<xml_diff>
--- a/Know the Signs_When and How to Talk about Drugs.pptx
+++ b/Know the Signs_When and How to Talk about Drugs.pptx
@@ -224,7 +224,7 @@
           <a:p>
             <a:fld id="{1853AC80-A2F9-754B-A2F3-270DAC1BA0D2}" type="datetimeFigureOut">
               <a:rPr lang="en-US" smtClean="0"/>
-              <a:t>1/7/2022</a:t>
+              <a:t>1/9/2022</a:t>
             </a:fld>
             <a:endParaRPr lang="en-US"/>
           </a:p>
@@ -949,7 +949,7 @@
           <a:p>
             <a:fld id="{D410641E-BA88-BE47-8EA7-CB068B6AAA79}" type="datetimeFigureOut">
               <a:rPr lang="en-US" smtClean="0"/>
-              <a:t>1/7/2022</a:t>
+              <a:t>1/9/2022</a:t>
             </a:fld>
             <a:endParaRPr lang="en-US"/>
           </a:p>
@@ -1147,7 +1147,7 @@
           <a:p>
             <a:fld id="{D410641E-BA88-BE47-8EA7-CB068B6AAA79}" type="datetimeFigureOut">
               <a:rPr lang="en-US" smtClean="0"/>
-              <a:t>1/7/2022</a:t>
+              <a:t>1/9/2022</a:t>
             </a:fld>
             <a:endParaRPr lang="en-US"/>
           </a:p>
@@ -1355,7 +1355,7 @@
           <a:p>
             <a:fld id="{D410641E-BA88-BE47-8EA7-CB068B6AAA79}" type="datetimeFigureOut">
               <a:rPr lang="en-US" smtClean="0"/>
-              <a:t>1/7/2022</a:t>
+              <a:t>1/9/2022</a:t>
             </a:fld>
             <a:endParaRPr lang="en-US"/>
           </a:p>
@@ -1553,7 +1553,7 @@
           <a:p>
             <a:fld id="{D410641E-BA88-BE47-8EA7-CB068B6AAA79}" type="datetimeFigureOut">
               <a:rPr lang="en-US" smtClean="0"/>
-              <a:t>1/7/2022</a:t>
+              <a:t>1/9/2022</a:t>
             </a:fld>
             <a:endParaRPr lang="en-US"/>
           </a:p>
@@ -1828,7 +1828,7 @@
           <a:p>
             <a:fld id="{D410641E-BA88-BE47-8EA7-CB068B6AAA79}" type="datetimeFigureOut">
               <a:rPr lang="en-US" smtClean="0"/>
-              <a:t>1/7/2022</a:t>
+              <a:t>1/9/2022</a:t>
             </a:fld>
             <a:endParaRPr lang="en-US"/>
           </a:p>
@@ -2093,7 +2093,7 @@
           <a:p>
             <a:fld id="{D410641E-BA88-BE47-8EA7-CB068B6AAA79}" type="datetimeFigureOut">
               <a:rPr lang="en-US" smtClean="0"/>
-              <a:t>1/7/2022</a:t>
+              <a:t>1/9/2022</a:t>
             </a:fld>
             <a:endParaRPr lang="en-US"/>
           </a:p>
@@ -2505,7 +2505,7 @@
           <a:p>
             <a:fld id="{D410641E-BA88-BE47-8EA7-CB068B6AAA79}" type="datetimeFigureOut">
               <a:rPr lang="en-US" smtClean="0"/>
-              <a:t>1/7/2022</a:t>
+              <a:t>1/9/2022</a:t>
             </a:fld>
             <a:endParaRPr lang="en-US"/>
           </a:p>
@@ -2646,7 +2646,7 @@
           <a:p>
             <a:fld id="{D410641E-BA88-BE47-8EA7-CB068B6AAA79}" type="datetimeFigureOut">
               <a:rPr lang="en-US" smtClean="0"/>
-              <a:t>1/7/2022</a:t>
+              <a:t>1/9/2022</a:t>
             </a:fld>
             <a:endParaRPr lang="en-US"/>
           </a:p>
@@ -2759,7 +2759,7 @@
           <a:p>
             <a:fld id="{D410641E-BA88-BE47-8EA7-CB068B6AAA79}" type="datetimeFigureOut">
               <a:rPr lang="en-US" smtClean="0"/>
-              <a:t>1/7/2022</a:t>
+              <a:t>1/9/2022</a:t>
             </a:fld>
             <a:endParaRPr lang="en-US"/>
           </a:p>
@@ -3070,7 +3070,7 @@
           <a:p>
             <a:fld id="{D410641E-BA88-BE47-8EA7-CB068B6AAA79}" type="datetimeFigureOut">
               <a:rPr lang="en-US" smtClean="0"/>
-              <a:t>1/7/2022</a:t>
+              <a:t>1/9/2022</a:t>
             </a:fld>
             <a:endParaRPr lang="en-US"/>
           </a:p>
@@ -3358,7 +3358,7 @@
           <a:p>
             <a:fld id="{D410641E-BA88-BE47-8EA7-CB068B6AAA79}" type="datetimeFigureOut">
               <a:rPr lang="en-US" smtClean="0"/>
-              <a:t>1/7/2022</a:t>
+              <a:t>1/9/2022</a:t>
             </a:fld>
             <a:endParaRPr lang="en-US"/>
           </a:p>
@@ -3599,7 +3599,7 @@
           <a:p>
             <a:fld id="{D410641E-BA88-BE47-8EA7-CB068B6AAA79}" type="datetimeFigureOut">
               <a:rPr lang="en-US" smtClean="0"/>
-              <a:t>1/7/2022</a:t>
+              <a:t>1/9/2022</a:t>
             </a:fld>
             <a:endParaRPr lang="en-US"/>
           </a:p>
@@ -7419,6 +7419,21 @@
               </a:rPr>
               <a:t>Be careful not to be an enabler</a:t>
             </a:r>
+            <a:r>
+              <a:rPr lang="en-US" sz="2400">
+                <a:solidFill>
+                  <a:schemeClr val="tx2"/>
+                </a:solidFill>
+                <a:latin typeface="Montserrat" panose="02000505000000020004" pitchFamily="2" charset="0"/>
+              </a:rPr>
+              <a:t>—example</a:t>
+            </a:r>
+            <a:endParaRPr lang="en-US" sz="2400" dirty="0">
+              <a:solidFill>
+                <a:schemeClr val="tx2"/>
+              </a:solidFill>
+              <a:latin typeface="Montserrat" panose="02000505000000020004" pitchFamily="2" charset="0"/>
+            </a:endParaRPr>
           </a:p>
           <a:p>
             <a:r>

</xml_diff>

<commit_message>
Add Cyndi's cover picture
</commit_message>
<xml_diff>
--- a/Know the Signs_When and How to Talk about Drugs.pptx
+++ b/Know the Signs_When and How to Talk about Drugs.pptx
@@ -224,7 +224,7 @@
           <a:p>
             <a:fld id="{1853AC80-A2F9-754B-A2F3-270DAC1BA0D2}" type="datetimeFigureOut">
               <a:rPr lang="en-US" smtClean="0"/>
-              <a:t>1/9/2022</a:t>
+              <a:t>1/10/2022</a:t>
             </a:fld>
             <a:endParaRPr lang="en-US"/>
           </a:p>
@@ -824,7 +824,7 @@
           <p:cNvPr id="2" name="Title 1">
             <a:extLst>
               <a:ext uri="{FF2B5EF4-FFF2-40B4-BE49-F238E27FC236}">
-                <a16:creationId xmlns:a16="http://schemas.microsoft.com/office/drawing/2014/main" id="{E588418B-A6DE-8D43-8F45-DC6C463F3DD5}"/>
+                <a16:creationId xmlns:a16="http://schemas.microsoft.com/office/drawing/2014/main" xmlns="" id="{E588418B-A6DE-8D43-8F45-DC6C463F3DD5}"/>
               </a:ext>
             </a:extLst>
           </p:cNvPr>
@@ -861,7 +861,7 @@
           <p:cNvPr id="3" name="Subtitle 2">
             <a:extLst>
               <a:ext uri="{FF2B5EF4-FFF2-40B4-BE49-F238E27FC236}">
-                <a16:creationId xmlns:a16="http://schemas.microsoft.com/office/drawing/2014/main" id="{AE1CE7C5-E839-3849-97A2-7E1F984472C7}"/>
+                <a16:creationId xmlns:a16="http://schemas.microsoft.com/office/drawing/2014/main" xmlns="" id="{AE1CE7C5-E839-3849-97A2-7E1F984472C7}"/>
               </a:ext>
             </a:extLst>
           </p:cNvPr>
@@ -931,7 +931,7 @@
           <p:cNvPr id="4" name="Date Placeholder 3">
             <a:extLst>
               <a:ext uri="{FF2B5EF4-FFF2-40B4-BE49-F238E27FC236}">
-                <a16:creationId xmlns:a16="http://schemas.microsoft.com/office/drawing/2014/main" id="{48DD5A3F-975D-B44E-A1E3-2B2C43920F94}"/>
+                <a16:creationId xmlns:a16="http://schemas.microsoft.com/office/drawing/2014/main" xmlns="" id="{48DD5A3F-975D-B44E-A1E3-2B2C43920F94}"/>
               </a:ext>
             </a:extLst>
           </p:cNvPr>
@@ -949,7 +949,7 @@
           <a:p>
             <a:fld id="{D410641E-BA88-BE47-8EA7-CB068B6AAA79}" type="datetimeFigureOut">
               <a:rPr lang="en-US" smtClean="0"/>
-              <a:t>1/9/2022</a:t>
+              <a:t>1/10/2022</a:t>
             </a:fld>
             <a:endParaRPr lang="en-US"/>
           </a:p>
@@ -960,7 +960,7 @@
           <p:cNvPr id="5" name="Footer Placeholder 4">
             <a:extLst>
               <a:ext uri="{FF2B5EF4-FFF2-40B4-BE49-F238E27FC236}">
-                <a16:creationId xmlns:a16="http://schemas.microsoft.com/office/drawing/2014/main" id="{7B8C601E-189F-EF42-BDF5-E7B18169796A}"/>
+                <a16:creationId xmlns:a16="http://schemas.microsoft.com/office/drawing/2014/main" xmlns="" id="{7B8C601E-189F-EF42-BDF5-E7B18169796A}"/>
               </a:ext>
             </a:extLst>
           </p:cNvPr>
@@ -985,7 +985,7 @@
           <p:cNvPr id="6" name="Slide Number Placeholder 5">
             <a:extLst>
               <a:ext uri="{FF2B5EF4-FFF2-40B4-BE49-F238E27FC236}">
-                <a16:creationId xmlns:a16="http://schemas.microsoft.com/office/drawing/2014/main" id="{BE35C719-EFE3-BA44-9B79-C47CD2C01C77}"/>
+                <a16:creationId xmlns:a16="http://schemas.microsoft.com/office/drawing/2014/main" xmlns="" id="{BE35C719-EFE3-BA44-9B79-C47CD2C01C77}"/>
               </a:ext>
             </a:extLst>
           </p:cNvPr>
@@ -1044,7 +1044,7 @@
           <p:cNvPr id="2" name="Title 1">
             <a:extLst>
               <a:ext uri="{FF2B5EF4-FFF2-40B4-BE49-F238E27FC236}">
-                <a16:creationId xmlns:a16="http://schemas.microsoft.com/office/drawing/2014/main" id="{8A0F0800-3B78-7046-9F03-7FDB15CBC529}"/>
+                <a16:creationId xmlns:a16="http://schemas.microsoft.com/office/drawing/2014/main" xmlns="" id="{8A0F0800-3B78-7046-9F03-7FDB15CBC529}"/>
               </a:ext>
             </a:extLst>
           </p:cNvPr>
@@ -1072,7 +1072,7 @@
           <p:cNvPr id="3" name="Vertical Text Placeholder 2">
             <a:extLst>
               <a:ext uri="{FF2B5EF4-FFF2-40B4-BE49-F238E27FC236}">
-                <a16:creationId xmlns:a16="http://schemas.microsoft.com/office/drawing/2014/main" id="{3407C157-CF74-F745-970C-B5B16FBE5A18}"/>
+                <a16:creationId xmlns:a16="http://schemas.microsoft.com/office/drawing/2014/main" xmlns="" id="{3407C157-CF74-F745-970C-B5B16FBE5A18}"/>
               </a:ext>
             </a:extLst>
           </p:cNvPr>
@@ -1129,7 +1129,7 @@
           <p:cNvPr id="4" name="Date Placeholder 3">
             <a:extLst>
               <a:ext uri="{FF2B5EF4-FFF2-40B4-BE49-F238E27FC236}">
-                <a16:creationId xmlns:a16="http://schemas.microsoft.com/office/drawing/2014/main" id="{10D2E06D-49D1-8346-AF30-A7A58266C99B}"/>
+                <a16:creationId xmlns:a16="http://schemas.microsoft.com/office/drawing/2014/main" xmlns="" id="{10D2E06D-49D1-8346-AF30-A7A58266C99B}"/>
               </a:ext>
             </a:extLst>
           </p:cNvPr>
@@ -1147,7 +1147,7 @@
           <a:p>
             <a:fld id="{D410641E-BA88-BE47-8EA7-CB068B6AAA79}" type="datetimeFigureOut">
               <a:rPr lang="en-US" smtClean="0"/>
-              <a:t>1/9/2022</a:t>
+              <a:t>1/10/2022</a:t>
             </a:fld>
             <a:endParaRPr lang="en-US"/>
           </a:p>
@@ -1158,7 +1158,7 @@
           <p:cNvPr id="5" name="Footer Placeholder 4">
             <a:extLst>
               <a:ext uri="{FF2B5EF4-FFF2-40B4-BE49-F238E27FC236}">
-                <a16:creationId xmlns:a16="http://schemas.microsoft.com/office/drawing/2014/main" id="{FED0E39C-C906-6340-8888-F8D486564BE8}"/>
+                <a16:creationId xmlns:a16="http://schemas.microsoft.com/office/drawing/2014/main" xmlns="" id="{FED0E39C-C906-6340-8888-F8D486564BE8}"/>
               </a:ext>
             </a:extLst>
           </p:cNvPr>
@@ -1183,7 +1183,7 @@
           <p:cNvPr id="6" name="Slide Number Placeholder 5">
             <a:extLst>
               <a:ext uri="{FF2B5EF4-FFF2-40B4-BE49-F238E27FC236}">
-                <a16:creationId xmlns:a16="http://schemas.microsoft.com/office/drawing/2014/main" id="{3A4BF487-65FD-1C43-83BA-1432C716B4D7}"/>
+                <a16:creationId xmlns:a16="http://schemas.microsoft.com/office/drawing/2014/main" xmlns="" id="{3A4BF487-65FD-1C43-83BA-1432C716B4D7}"/>
               </a:ext>
             </a:extLst>
           </p:cNvPr>
@@ -1242,7 +1242,7 @@
           <p:cNvPr id="2" name="Vertical Title 1">
             <a:extLst>
               <a:ext uri="{FF2B5EF4-FFF2-40B4-BE49-F238E27FC236}">
-                <a16:creationId xmlns:a16="http://schemas.microsoft.com/office/drawing/2014/main" id="{A899EA69-7604-414A-A906-CC3E0E69CC7E}"/>
+                <a16:creationId xmlns:a16="http://schemas.microsoft.com/office/drawing/2014/main" xmlns="" id="{A899EA69-7604-414A-A906-CC3E0E69CC7E}"/>
               </a:ext>
             </a:extLst>
           </p:cNvPr>
@@ -1275,7 +1275,7 @@
           <p:cNvPr id="3" name="Vertical Text Placeholder 2">
             <a:extLst>
               <a:ext uri="{FF2B5EF4-FFF2-40B4-BE49-F238E27FC236}">
-                <a16:creationId xmlns:a16="http://schemas.microsoft.com/office/drawing/2014/main" id="{075B694F-87C6-CB48-99D1-30A51F219901}"/>
+                <a16:creationId xmlns:a16="http://schemas.microsoft.com/office/drawing/2014/main" xmlns="" id="{075B694F-87C6-CB48-99D1-30A51F219901}"/>
               </a:ext>
             </a:extLst>
           </p:cNvPr>
@@ -1337,7 +1337,7 @@
           <p:cNvPr id="4" name="Date Placeholder 3">
             <a:extLst>
               <a:ext uri="{FF2B5EF4-FFF2-40B4-BE49-F238E27FC236}">
-                <a16:creationId xmlns:a16="http://schemas.microsoft.com/office/drawing/2014/main" id="{C7D42998-F4E4-1043-BCB6-07AA5282209E}"/>
+                <a16:creationId xmlns:a16="http://schemas.microsoft.com/office/drawing/2014/main" xmlns="" id="{C7D42998-F4E4-1043-BCB6-07AA5282209E}"/>
               </a:ext>
             </a:extLst>
           </p:cNvPr>
@@ -1355,7 +1355,7 @@
           <a:p>
             <a:fld id="{D410641E-BA88-BE47-8EA7-CB068B6AAA79}" type="datetimeFigureOut">
               <a:rPr lang="en-US" smtClean="0"/>
-              <a:t>1/9/2022</a:t>
+              <a:t>1/10/2022</a:t>
             </a:fld>
             <a:endParaRPr lang="en-US"/>
           </a:p>
@@ -1366,7 +1366,7 @@
           <p:cNvPr id="5" name="Footer Placeholder 4">
             <a:extLst>
               <a:ext uri="{FF2B5EF4-FFF2-40B4-BE49-F238E27FC236}">
-                <a16:creationId xmlns:a16="http://schemas.microsoft.com/office/drawing/2014/main" id="{C9BA0479-7C00-7B41-BBA6-8DF28263FF74}"/>
+                <a16:creationId xmlns:a16="http://schemas.microsoft.com/office/drawing/2014/main" xmlns="" id="{C9BA0479-7C00-7B41-BBA6-8DF28263FF74}"/>
               </a:ext>
             </a:extLst>
           </p:cNvPr>
@@ -1391,7 +1391,7 @@
           <p:cNvPr id="6" name="Slide Number Placeholder 5">
             <a:extLst>
               <a:ext uri="{FF2B5EF4-FFF2-40B4-BE49-F238E27FC236}">
-                <a16:creationId xmlns:a16="http://schemas.microsoft.com/office/drawing/2014/main" id="{35A86DAB-05F6-7849-9D65-F80D9814D51D}"/>
+                <a16:creationId xmlns:a16="http://schemas.microsoft.com/office/drawing/2014/main" xmlns="" id="{35A86DAB-05F6-7849-9D65-F80D9814D51D}"/>
               </a:ext>
             </a:extLst>
           </p:cNvPr>
@@ -1450,7 +1450,7 @@
           <p:cNvPr id="2" name="Title 1">
             <a:extLst>
               <a:ext uri="{FF2B5EF4-FFF2-40B4-BE49-F238E27FC236}">
-                <a16:creationId xmlns:a16="http://schemas.microsoft.com/office/drawing/2014/main" id="{D5337368-112D-7647-87D5-07D43436F6E6}"/>
+                <a16:creationId xmlns:a16="http://schemas.microsoft.com/office/drawing/2014/main" xmlns="" id="{D5337368-112D-7647-87D5-07D43436F6E6}"/>
               </a:ext>
             </a:extLst>
           </p:cNvPr>
@@ -1478,7 +1478,7 @@
           <p:cNvPr id="3" name="Content Placeholder 2">
             <a:extLst>
               <a:ext uri="{FF2B5EF4-FFF2-40B4-BE49-F238E27FC236}">
-                <a16:creationId xmlns:a16="http://schemas.microsoft.com/office/drawing/2014/main" id="{2BD9680C-9FFD-5143-A016-1B4CEDCEF388}"/>
+                <a16:creationId xmlns:a16="http://schemas.microsoft.com/office/drawing/2014/main" xmlns="" id="{2BD9680C-9FFD-5143-A016-1B4CEDCEF388}"/>
               </a:ext>
             </a:extLst>
           </p:cNvPr>
@@ -1535,7 +1535,7 @@
           <p:cNvPr id="4" name="Date Placeholder 3">
             <a:extLst>
               <a:ext uri="{FF2B5EF4-FFF2-40B4-BE49-F238E27FC236}">
-                <a16:creationId xmlns:a16="http://schemas.microsoft.com/office/drawing/2014/main" id="{3496A5C2-AA89-6247-AD1E-4B229868DD4C}"/>
+                <a16:creationId xmlns:a16="http://schemas.microsoft.com/office/drawing/2014/main" xmlns="" id="{3496A5C2-AA89-6247-AD1E-4B229868DD4C}"/>
               </a:ext>
             </a:extLst>
           </p:cNvPr>
@@ -1553,7 +1553,7 @@
           <a:p>
             <a:fld id="{D410641E-BA88-BE47-8EA7-CB068B6AAA79}" type="datetimeFigureOut">
               <a:rPr lang="en-US" smtClean="0"/>
-              <a:t>1/9/2022</a:t>
+              <a:t>1/10/2022</a:t>
             </a:fld>
             <a:endParaRPr lang="en-US"/>
           </a:p>
@@ -1564,7 +1564,7 @@
           <p:cNvPr id="5" name="Footer Placeholder 4">
             <a:extLst>
               <a:ext uri="{FF2B5EF4-FFF2-40B4-BE49-F238E27FC236}">
-                <a16:creationId xmlns:a16="http://schemas.microsoft.com/office/drawing/2014/main" id="{B4EB4D15-2FC3-E246-A99D-2B3B371DA48C}"/>
+                <a16:creationId xmlns:a16="http://schemas.microsoft.com/office/drawing/2014/main" xmlns="" id="{B4EB4D15-2FC3-E246-A99D-2B3B371DA48C}"/>
               </a:ext>
             </a:extLst>
           </p:cNvPr>
@@ -1589,7 +1589,7 @@
           <p:cNvPr id="6" name="Slide Number Placeholder 5">
             <a:extLst>
               <a:ext uri="{FF2B5EF4-FFF2-40B4-BE49-F238E27FC236}">
-                <a16:creationId xmlns:a16="http://schemas.microsoft.com/office/drawing/2014/main" id="{E6387981-38B0-474D-B958-662FE41CF7A0}"/>
+                <a16:creationId xmlns:a16="http://schemas.microsoft.com/office/drawing/2014/main" xmlns="" id="{E6387981-38B0-474D-B958-662FE41CF7A0}"/>
               </a:ext>
             </a:extLst>
           </p:cNvPr>
@@ -1648,7 +1648,7 @@
           <p:cNvPr id="2" name="Title 1">
             <a:extLst>
               <a:ext uri="{FF2B5EF4-FFF2-40B4-BE49-F238E27FC236}">
-                <a16:creationId xmlns:a16="http://schemas.microsoft.com/office/drawing/2014/main" id="{2DED3023-4546-8946-8303-43C272E3CBE8}"/>
+                <a16:creationId xmlns:a16="http://schemas.microsoft.com/office/drawing/2014/main" xmlns="" id="{2DED3023-4546-8946-8303-43C272E3CBE8}"/>
               </a:ext>
             </a:extLst>
           </p:cNvPr>
@@ -1685,7 +1685,7 @@
           <p:cNvPr id="3" name="Text Placeholder 2">
             <a:extLst>
               <a:ext uri="{FF2B5EF4-FFF2-40B4-BE49-F238E27FC236}">
-                <a16:creationId xmlns:a16="http://schemas.microsoft.com/office/drawing/2014/main" id="{940933E9-FAAA-3042-B8AD-F9B1D9711264}"/>
+                <a16:creationId xmlns:a16="http://schemas.microsoft.com/office/drawing/2014/main" xmlns="" id="{940933E9-FAAA-3042-B8AD-F9B1D9711264}"/>
               </a:ext>
             </a:extLst>
           </p:cNvPr>
@@ -1810,7 +1810,7 @@
           <p:cNvPr id="4" name="Date Placeholder 3">
             <a:extLst>
               <a:ext uri="{FF2B5EF4-FFF2-40B4-BE49-F238E27FC236}">
-                <a16:creationId xmlns:a16="http://schemas.microsoft.com/office/drawing/2014/main" id="{0C26F230-D6E7-744F-9B14-82E14849DCD0}"/>
+                <a16:creationId xmlns:a16="http://schemas.microsoft.com/office/drawing/2014/main" xmlns="" id="{0C26F230-D6E7-744F-9B14-82E14849DCD0}"/>
               </a:ext>
             </a:extLst>
           </p:cNvPr>
@@ -1828,7 +1828,7 @@
           <a:p>
             <a:fld id="{D410641E-BA88-BE47-8EA7-CB068B6AAA79}" type="datetimeFigureOut">
               <a:rPr lang="en-US" smtClean="0"/>
-              <a:t>1/9/2022</a:t>
+              <a:t>1/10/2022</a:t>
             </a:fld>
             <a:endParaRPr lang="en-US"/>
           </a:p>
@@ -1839,7 +1839,7 @@
           <p:cNvPr id="5" name="Footer Placeholder 4">
             <a:extLst>
               <a:ext uri="{FF2B5EF4-FFF2-40B4-BE49-F238E27FC236}">
-                <a16:creationId xmlns:a16="http://schemas.microsoft.com/office/drawing/2014/main" id="{8B83D4CD-A53F-424A-9954-DE6692110116}"/>
+                <a16:creationId xmlns:a16="http://schemas.microsoft.com/office/drawing/2014/main" xmlns="" id="{8B83D4CD-A53F-424A-9954-DE6692110116}"/>
               </a:ext>
             </a:extLst>
           </p:cNvPr>
@@ -1864,7 +1864,7 @@
           <p:cNvPr id="6" name="Slide Number Placeholder 5">
             <a:extLst>
               <a:ext uri="{FF2B5EF4-FFF2-40B4-BE49-F238E27FC236}">
-                <a16:creationId xmlns:a16="http://schemas.microsoft.com/office/drawing/2014/main" id="{33391748-53E3-E447-A2B3-88348AD1D3C6}"/>
+                <a16:creationId xmlns:a16="http://schemas.microsoft.com/office/drawing/2014/main" xmlns="" id="{33391748-53E3-E447-A2B3-88348AD1D3C6}"/>
               </a:ext>
             </a:extLst>
           </p:cNvPr>
@@ -1923,7 +1923,7 @@
           <p:cNvPr id="2" name="Title 1">
             <a:extLst>
               <a:ext uri="{FF2B5EF4-FFF2-40B4-BE49-F238E27FC236}">
-                <a16:creationId xmlns:a16="http://schemas.microsoft.com/office/drawing/2014/main" id="{644734D9-D319-E546-9D4D-004C62596606}"/>
+                <a16:creationId xmlns:a16="http://schemas.microsoft.com/office/drawing/2014/main" xmlns="" id="{644734D9-D319-E546-9D4D-004C62596606}"/>
               </a:ext>
             </a:extLst>
           </p:cNvPr>
@@ -1951,7 +1951,7 @@
           <p:cNvPr id="3" name="Content Placeholder 2">
             <a:extLst>
               <a:ext uri="{FF2B5EF4-FFF2-40B4-BE49-F238E27FC236}">
-                <a16:creationId xmlns:a16="http://schemas.microsoft.com/office/drawing/2014/main" id="{AB1C8503-BD2F-E643-8473-3B1EC1085120}"/>
+                <a16:creationId xmlns:a16="http://schemas.microsoft.com/office/drawing/2014/main" xmlns="" id="{AB1C8503-BD2F-E643-8473-3B1EC1085120}"/>
               </a:ext>
             </a:extLst>
           </p:cNvPr>
@@ -2013,7 +2013,7 @@
           <p:cNvPr id="4" name="Content Placeholder 3">
             <a:extLst>
               <a:ext uri="{FF2B5EF4-FFF2-40B4-BE49-F238E27FC236}">
-                <a16:creationId xmlns:a16="http://schemas.microsoft.com/office/drawing/2014/main" id="{995BDC64-6141-6844-B2ED-A2D241B9C895}"/>
+                <a16:creationId xmlns:a16="http://schemas.microsoft.com/office/drawing/2014/main" xmlns="" id="{995BDC64-6141-6844-B2ED-A2D241B9C895}"/>
               </a:ext>
             </a:extLst>
           </p:cNvPr>
@@ -2075,7 +2075,7 @@
           <p:cNvPr id="5" name="Date Placeholder 4">
             <a:extLst>
               <a:ext uri="{FF2B5EF4-FFF2-40B4-BE49-F238E27FC236}">
-                <a16:creationId xmlns:a16="http://schemas.microsoft.com/office/drawing/2014/main" id="{662F0519-FBE1-4F4E-B4A1-89B16E48A13A}"/>
+                <a16:creationId xmlns:a16="http://schemas.microsoft.com/office/drawing/2014/main" xmlns="" id="{662F0519-FBE1-4F4E-B4A1-89B16E48A13A}"/>
               </a:ext>
             </a:extLst>
           </p:cNvPr>
@@ -2093,7 +2093,7 @@
           <a:p>
             <a:fld id="{D410641E-BA88-BE47-8EA7-CB068B6AAA79}" type="datetimeFigureOut">
               <a:rPr lang="en-US" smtClean="0"/>
-              <a:t>1/9/2022</a:t>
+              <a:t>1/10/2022</a:t>
             </a:fld>
             <a:endParaRPr lang="en-US"/>
           </a:p>
@@ -2104,7 +2104,7 @@
           <p:cNvPr id="6" name="Footer Placeholder 5">
             <a:extLst>
               <a:ext uri="{FF2B5EF4-FFF2-40B4-BE49-F238E27FC236}">
-                <a16:creationId xmlns:a16="http://schemas.microsoft.com/office/drawing/2014/main" id="{08A15D0E-32D3-DD4C-8A18-AB66F260A895}"/>
+                <a16:creationId xmlns:a16="http://schemas.microsoft.com/office/drawing/2014/main" xmlns="" id="{08A15D0E-32D3-DD4C-8A18-AB66F260A895}"/>
               </a:ext>
             </a:extLst>
           </p:cNvPr>
@@ -2129,7 +2129,7 @@
           <p:cNvPr id="7" name="Slide Number Placeholder 6">
             <a:extLst>
               <a:ext uri="{FF2B5EF4-FFF2-40B4-BE49-F238E27FC236}">
-                <a16:creationId xmlns:a16="http://schemas.microsoft.com/office/drawing/2014/main" id="{EE3A626E-7BF8-864B-8D98-880CF871CA2E}"/>
+                <a16:creationId xmlns:a16="http://schemas.microsoft.com/office/drawing/2014/main" xmlns="" id="{EE3A626E-7BF8-864B-8D98-880CF871CA2E}"/>
               </a:ext>
             </a:extLst>
           </p:cNvPr>
@@ -2188,7 +2188,7 @@
           <p:cNvPr id="2" name="Title 1">
             <a:extLst>
               <a:ext uri="{FF2B5EF4-FFF2-40B4-BE49-F238E27FC236}">
-                <a16:creationId xmlns:a16="http://schemas.microsoft.com/office/drawing/2014/main" id="{3E1C5939-77C4-4F47-802F-DD075CDC928F}"/>
+                <a16:creationId xmlns:a16="http://schemas.microsoft.com/office/drawing/2014/main" xmlns="" id="{3E1C5939-77C4-4F47-802F-DD075CDC928F}"/>
               </a:ext>
             </a:extLst>
           </p:cNvPr>
@@ -2221,7 +2221,7 @@
           <p:cNvPr id="3" name="Text Placeholder 2">
             <a:extLst>
               <a:ext uri="{FF2B5EF4-FFF2-40B4-BE49-F238E27FC236}">
-                <a16:creationId xmlns:a16="http://schemas.microsoft.com/office/drawing/2014/main" id="{D1DF791B-499B-654E-B203-79191F47F444}"/>
+                <a16:creationId xmlns:a16="http://schemas.microsoft.com/office/drawing/2014/main" xmlns="" id="{D1DF791B-499B-654E-B203-79191F47F444}"/>
               </a:ext>
             </a:extLst>
           </p:cNvPr>
@@ -2292,7 +2292,7 @@
           <p:cNvPr id="4" name="Content Placeholder 3">
             <a:extLst>
               <a:ext uri="{FF2B5EF4-FFF2-40B4-BE49-F238E27FC236}">
-                <a16:creationId xmlns:a16="http://schemas.microsoft.com/office/drawing/2014/main" id="{867567A7-F453-7343-818A-FF58B018D7BE}"/>
+                <a16:creationId xmlns:a16="http://schemas.microsoft.com/office/drawing/2014/main" xmlns="" id="{867567A7-F453-7343-818A-FF58B018D7BE}"/>
               </a:ext>
             </a:extLst>
           </p:cNvPr>
@@ -2354,7 +2354,7 @@
           <p:cNvPr id="5" name="Text Placeholder 4">
             <a:extLst>
               <a:ext uri="{FF2B5EF4-FFF2-40B4-BE49-F238E27FC236}">
-                <a16:creationId xmlns:a16="http://schemas.microsoft.com/office/drawing/2014/main" id="{A480518B-6F13-EA4A-8343-6D4C990EBA4E}"/>
+                <a16:creationId xmlns:a16="http://schemas.microsoft.com/office/drawing/2014/main" xmlns="" id="{A480518B-6F13-EA4A-8343-6D4C990EBA4E}"/>
               </a:ext>
             </a:extLst>
           </p:cNvPr>
@@ -2425,7 +2425,7 @@
           <p:cNvPr id="6" name="Content Placeholder 5">
             <a:extLst>
               <a:ext uri="{FF2B5EF4-FFF2-40B4-BE49-F238E27FC236}">
-                <a16:creationId xmlns:a16="http://schemas.microsoft.com/office/drawing/2014/main" id="{8A70A1A9-FCA2-B246-B637-10028A35098D}"/>
+                <a16:creationId xmlns:a16="http://schemas.microsoft.com/office/drawing/2014/main" xmlns="" id="{8A70A1A9-FCA2-B246-B637-10028A35098D}"/>
               </a:ext>
             </a:extLst>
           </p:cNvPr>
@@ -2487,7 +2487,7 @@
           <p:cNvPr id="7" name="Date Placeholder 6">
             <a:extLst>
               <a:ext uri="{FF2B5EF4-FFF2-40B4-BE49-F238E27FC236}">
-                <a16:creationId xmlns:a16="http://schemas.microsoft.com/office/drawing/2014/main" id="{1EC4E2B1-DF33-6A42-8B2D-3B8988D5139E}"/>
+                <a16:creationId xmlns:a16="http://schemas.microsoft.com/office/drawing/2014/main" xmlns="" id="{1EC4E2B1-DF33-6A42-8B2D-3B8988D5139E}"/>
               </a:ext>
             </a:extLst>
           </p:cNvPr>
@@ -2505,7 +2505,7 @@
           <a:p>
             <a:fld id="{D410641E-BA88-BE47-8EA7-CB068B6AAA79}" type="datetimeFigureOut">
               <a:rPr lang="en-US" smtClean="0"/>
-              <a:t>1/9/2022</a:t>
+              <a:t>1/10/2022</a:t>
             </a:fld>
             <a:endParaRPr lang="en-US"/>
           </a:p>
@@ -2516,7 +2516,7 @@
           <p:cNvPr id="8" name="Footer Placeholder 7">
             <a:extLst>
               <a:ext uri="{FF2B5EF4-FFF2-40B4-BE49-F238E27FC236}">
-                <a16:creationId xmlns:a16="http://schemas.microsoft.com/office/drawing/2014/main" id="{DB88758D-CDB2-FE44-86E3-9D78AABD9BCE}"/>
+                <a16:creationId xmlns:a16="http://schemas.microsoft.com/office/drawing/2014/main" xmlns="" id="{DB88758D-CDB2-FE44-86E3-9D78AABD9BCE}"/>
               </a:ext>
             </a:extLst>
           </p:cNvPr>
@@ -2541,7 +2541,7 @@
           <p:cNvPr id="9" name="Slide Number Placeholder 8">
             <a:extLst>
               <a:ext uri="{FF2B5EF4-FFF2-40B4-BE49-F238E27FC236}">
-                <a16:creationId xmlns:a16="http://schemas.microsoft.com/office/drawing/2014/main" id="{52BFB8E1-1EDB-B642-B4E2-52120C51321D}"/>
+                <a16:creationId xmlns:a16="http://schemas.microsoft.com/office/drawing/2014/main" xmlns="" id="{52BFB8E1-1EDB-B642-B4E2-52120C51321D}"/>
               </a:ext>
             </a:extLst>
           </p:cNvPr>
@@ -2600,7 +2600,7 @@
           <p:cNvPr id="2" name="Title 1">
             <a:extLst>
               <a:ext uri="{FF2B5EF4-FFF2-40B4-BE49-F238E27FC236}">
-                <a16:creationId xmlns:a16="http://schemas.microsoft.com/office/drawing/2014/main" id="{2009A996-8A9A-B344-BF3D-F471F396895C}"/>
+                <a16:creationId xmlns:a16="http://schemas.microsoft.com/office/drawing/2014/main" xmlns="" id="{2009A996-8A9A-B344-BF3D-F471F396895C}"/>
               </a:ext>
             </a:extLst>
           </p:cNvPr>
@@ -2628,7 +2628,7 @@
           <p:cNvPr id="3" name="Date Placeholder 2">
             <a:extLst>
               <a:ext uri="{FF2B5EF4-FFF2-40B4-BE49-F238E27FC236}">
-                <a16:creationId xmlns:a16="http://schemas.microsoft.com/office/drawing/2014/main" id="{39AA58D4-5CD7-7A44-A25A-4746F8CDCAC7}"/>
+                <a16:creationId xmlns:a16="http://schemas.microsoft.com/office/drawing/2014/main" xmlns="" id="{39AA58D4-5CD7-7A44-A25A-4746F8CDCAC7}"/>
               </a:ext>
             </a:extLst>
           </p:cNvPr>
@@ -2646,7 +2646,7 @@
           <a:p>
             <a:fld id="{D410641E-BA88-BE47-8EA7-CB068B6AAA79}" type="datetimeFigureOut">
               <a:rPr lang="en-US" smtClean="0"/>
-              <a:t>1/9/2022</a:t>
+              <a:t>1/10/2022</a:t>
             </a:fld>
             <a:endParaRPr lang="en-US"/>
           </a:p>
@@ -2657,7 +2657,7 @@
           <p:cNvPr id="4" name="Footer Placeholder 3">
             <a:extLst>
               <a:ext uri="{FF2B5EF4-FFF2-40B4-BE49-F238E27FC236}">
-                <a16:creationId xmlns:a16="http://schemas.microsoft.com/office/drawing/2014/main" id="{A37B593A-BB62-3D4E-91C1-2548ACDB290E}"/>
+                <a16:creationId xmlns:a16="http://schemas.microsoft.com/office/drawing/2014/main" xmlns="" id="{A37B593A-BB62-3D4E-91C1-2548ACDB290E}"/>
               </a:ext>
             </a:extLst>
           </p:cNvPr>
@@ -2682,7 +2682,7 @@
           <p:cNvPr id="5" name="Slide Number Placeholder 4">
             <a:extLst>
               <a:ext uri="{FF2B5EF4-FFF2-40B4-BE49-F238E27FC236}">
-                <a16:creationId xmlns:a16="http://schemas.microsoft.com/office/drawing/2014/main" id="{D7206E35-5615-FE42-A244-1A266D56F539}"/>
+                <a16:creationId xmlns:a16="http://schemas.microsoft.com/office/drawing/2014/main" xmlns="" id="{D7206E35-5615-FE42-A244-1A266D56F539}"/>
               </a:ext>
             </a:extLst>
           </p:cNvPr>
@@ -2741,7 +2741,7 @@
           <p:cNvPr id="2" name="Date Placeholder 1">
             <a:extLst>
               <a:ext uri="{FF2B5EF4-FFF2-40B4-BE49-F238E27FC236}">
-                <a16:creationId xmlns:a16="http://schemas.microsoft.com/office/drawing/2014/main" id="{B79B2E51-3DD8-AC4B-B365-3D1B4E75E489}"/>
+                <a16:creationId xmlns:a16="http://schemas.microsoft.com/office/drawing/2014/main" xmlns="" id="{B79B2E51-3DD8-AC4B-B365-3D1B4E75E489}"/>
               </a:ext>
             </a:extLst>
           </p:cNvPr>
@@ -2759,7 +2759,7 @@
           <a:p>
             <a:fld id="{D410641E-BA88-BE47-8EA7-CB068B6AAA79}" type="datetimeFigureOut">
               <a:rPr lang="en-US" smtClean="0"/>
-              <a:t>1/9/2022</a:t>
+              <a:t>1/10/2022</a:t>
             </a:fld>
             <a:endParaRPr lang="en-US"/>
           </a:p>
@@ -2770,7 +2770,7 @@
           <p:cNvPr id="3" name="Footer Placeholder 2">
             <a:extLst>
               <a:ext uri="{FF2B5EF4-FFF2-40B4-BE49-F238E27FC236}">
-                <a16:creationId xmlns:a16="http://schemas.microsoft.com/office/drawing/2014/main" id="{9647DCEC-68F1-4E44-9B9E-A748FA83F3C1}"/>
+                <a16:creationId xmlns:a16="http://schemas.microsoft.com/office/drawing/2014/main" xmlns="" id="{9647DCEC-68F1-4E44-9B9E-A748FA83F3C1}"/>
               </a:ext>
             </a:extLst>
           </p:cNvPr>
@@ -2795,7 +2795,7 @@
           <p:cNvPr id="4" name="Slide Number Placeholder 3">
             <a:extLst>
               <a:ext uri="{FF2B5EF4-FFF2-40B4-BE49-F238E27FC236}">
-                <a16:creationId xmlns:a16="http://schemas.microsoft.com/office/drawing/2014/main" id="{CE0084A6-642C-594B-940A-FB1936F3C737}"/>
+                <a16:creationId xmlns:a16="http://schemas.microsoft.com/office/drawing/2014/main" xmlns="" id="{CE0084A6-642C-594B-940A-FB1936F3C737}"/>
               </a:ext>
             </a:extLst>
           </p:cNvPr>
@@ -2854,7 +2854,7 @@
           <p:cNvPr id="2" name="Title 1">
             <a:extLst>
               <a:ext uri="{FF2B5EF4-FFF2-40B4-BE49-F238E27FC236}">
-                <a16:creationId xmlns:a16="http://schemas.microsoft.com/office/drawing/2014/main" id="{154E8861-A207-EF41-9921-AB983D4660D2}"/>
+                <a16:creationId xmlns:a16="http://schemas.microsoft.com/office/drawing/2014/main" xmlns="" id="{154E8861-A207-EF41-9921-AB983D4660D2}"/>
               </a:ext>
             </a:extLst>
           </p:cNvPr>
@@ -2891,7 +2891,7 @@
           <p:cNvPr id="3" name="Content Placeholder 2">
             <a:extLst>
               <a:ext uri="{FF2B5EF4-FFF2-40B4-BE49-F238E27FC236}">
-                <a16:creationId xmlns:a16="http://schemas.microsoft.com/office/drawing/2014/main" id="{F4F6EB9B-9337-B143-8BD0-09B4440A770D}"/>
+                <a16:creationId xmlns:a16="http://schemas.microsoft.com/office/drawing/2014/main" xmlns="" id="{F4F6EB9B-9337-B143-8BD0-09B4440A770D}"/>
               </a:ext>
             </a:extLst>
           </p:cNvPr>
@@ -2981,7 +2981,7 @@
           <p:cNvPr id="4" name="Text Placeholder 3">
             <a:extLst>
               <a:ext uri="{FF2B5EF4-FFF2-40B4-BE49-F238E27FC236}">
-                <a16:creationId xmlns:a16="http://schemas.microsoft.com/office/drawing/2014/main" id="{4117C306-7318-064A-9E37-7E559CA8FBB0}"/>
+                <a16:creationId xmlns:a16="http://schemas.microsoft.com/office/drawing/2014/main" xmlns="" id="{4117C306-7318-064A-9E37-7E559CA8FBB0}"/>
               </a:ext>
             </a:extLst>
           </p:cNvPr>
@@ -3052,7 +3052,7 @@
           <p:cNvPr id="5" name="Date Placeholder 4">
             <a:extLst>
               <a:ext uri="{FF2B5EF4-FFF2-40B4-BE49-F238E27FC236}">
-                <a16:creationId xmlns:a16="http://schemas.microsoft.com/office/drawing/2014/main" id="{6265A917-1B57-764D-89AA-7A6F78F76332}"/>
+                <a16:creationId xmlns:a16="http://schemas.microsoft.com/office/drawing/2014/main" xmlns="" id="{6265A917-1B57-764D-89AA-7A6F78F76332}"/>
               </a:ext>
             </a:extLst>
           </p:cNvPr>
@@ -3070,7 +3070,7 @@
           <a:p>
             <a:fld id="{D410641E-BA88-BE47-8EA7-CB068B6AAA79}" type="datetimeFigureOut">
               <a:rPr lang="en-US" smtClean="0"/>
-              <a:t>1/9/2022</a:t>
+              <a:t>1/10/2022</a:t>
             </a:fld>
             <a:endParaRPr lang="en-US"/>
           </a:p>
@@ -3081,7 +3081,7 @@
           <p:cNvPr id="6" name="Footer Placeholder 5">
             <a:extLst>
               <a:ext uri="{FF2B5EF4-FFF2-40B4-BE49-F238E27FC236}">
-                <a16:creationId xmlns:a16="http://schemas.microsoft.com/office/drawing/2014/main" id="{0808C17E-79F9-5240-AF08-A54DDCE6F954}"/>
+                <a16:creationId xmlns:a16="http://schemas.microsoft.com/office/drawing/2014/main" xmlns="" id="{0808C17E-79F9-5240-AF08-A54DDCE6F954}"/>
               </a:ext>
             </a:extLst>
           </p:cNvPr>
@@ -3106,7 +3106,7 @@
           <p:cNvPr id="7" name="Slide Number Placeholder 6">
             <a:extLst>
               <a:ext uri="{FF2B5EF4-FFF2-40B4-BE49-F238E27FC236}">
-                <a16:creationId xmlns:a16="http://schemas.microsoft.com/office/drawing/2014/main" id="{E95BCBD1-2E9A-AF46-8A13-7E3F360DC3FB}"/>
+                <a16:creationId xmlns:a16="http://schemas.microsoft.com/office/drawing/2014/main" xmlns="" id="{E95BCBD1-2E9A-AF46-8A13-7E3F360DC3FB}"/>
               </a:ext>
             </a:extLst>
           </p:cNvPr>
@@ -3165,7 +3165,7 @@
           <p:cNvPr id="2" name="Title 1">
             <a:extLst>
               <a:ext uri="{FF2B5EF4-FFF2-40B4-BE49-F238E27FC236}">
-                <a16:creationId xmlns:a16="http://schemas.microsoft.com/office/drawing/2014/main" id="{CD656AE0-F8AF-4843-AB4D-A4223378124B}"/>
+                <a16:creationId xmlns:a16="http://schemas.microsoft.com/office/drawing/2014/main" xmlns="" id="{CD656AE0-F8AF-4843-AB4D-A4223378124B}"/>
               </a:ext>
             </a:extLst>
           </p:cNvPr>
@@ -3202,7 +3202,7 @@
           <p:cNvPr id="3" name="Picture Placeholder 2">
             <a:extLst>
               <a:ext uri="{FF2B5EF4-FFF2-40B4-BE49-F238E27FC236}">
-                <a16:creationId xmlns:a16="http://schemas.microsoft.com/office/drawing/2014/main" id="{80E7016B-6806-154B-A859-1DB55CC368D3}"/>
+                <a16:creationId xmlns:a16="http://schemas.microsoft.com/office/drawing/2014/main" xmlns="" id="{80E7016B-6806-154B-A859-1DB55CC368D3}"/>
               </a:ext>
             </a:extLst>
           </p:cNvPr>
@@ -3269,7 +3269,7 @@
           <p:cNvPr id="4" name="Text Placeholder 3">
             <a:extLst>
               <a:ext uri="{FF2B5EF4-FFF2-40B4-BE49-F238E27FC236}">
-                <a16:creationId xmlns:a16="http://schemas.microsoft.com/office/drawing/2014/main" id="{853137BE-0A64-254F-87DF-34454B7C75C2}"/>
+                <a16:creationId xmlns:a16="http://schemas.microsoft.com/office/drawing/2014/main" xmlns="" id="{853137BE-0A64-254F-87DF-34454B7C75C2}"/>
               </a:ext>
             </a:extLst>
           </p:cNvPr>
@@ -3340,7 +3340,7 @@
           <p:cNvPr id="5" name="Date Placeholder 4">
             <a:extLst>
               <a:ext uri="{FF2B5EF4-FFF2-40B4-BE49-F238E27FC236}">
-                <a16:creationId xmlns:a16="http://schemas.microsoft.com/office/drawing/2014/main" id="{2F3C036A-1BE6-7C4C-9115-D722FCE759E3}"/>
+                <a16:creationId xmlns:a16="http://schemas.microsoft.com/office/drawing/2014/main" xmlns="" id="{2F3C036A-1BE6-7C4C-9115-D722FCE759E3}"/>
               </a:ext>
             </a:extLst>
           </p:cNvPr>
@@ -3358,7 +3358,7 @@
           <a:p>
             <a:fld id="{D410641E-BA88-BE47-8EA7-CB068B6AAA79}" type="datetimeFigureOut">
               <a:rPr lang="en-US" smtClean="0"/>
-              <a:t>1/9/2022</a:t>
+              <a:t>1/10/2022</a:t>
             </a:fld>
             <a:endParaRPr lang="en-US"/>
           </a:p>
@@ -3369,7 +3369,7 @@
           <p:cNvPr id="6" name="Footer Placeholder 5">
             <a:extLst>
               <a:ext uri="{FF2B5EF4-FFF2-40B4-BE49-F238E27FC236}">
-                <a16:creationId xmlns:a16="http://schemas.microsoft.com/office/drawing/2014/main" id="{85DF9699-9007-A749-AA7D-5E4EA2ABAC16}"/>
+                <a16:creationId xmlns:a16="http://schemas.microsoft.com/office/drawing/2014/main" xmlns="" id="{85DF9699-9007-A749-AA7D-5E4EA2ABAC16}"/>
               </a:ext>
             </a:extLst>
           </p:cNvPr>
@@ -3394,7 +3394,7 @@
           <p:cNvPr id="7" name="Slide Number Placeholder 6">
             <a:extLst>
               <a:ext uri="{FF2B5EF4-FFF2-40B4-BE49-F238E27FC236}">
-                <a16:creationId xmlns:a16="http://schemas.microsoft.com/office/drawing/2014/main" id="{5C2F2665-7610-FE49-89A1-2FCAD96F26C5}"/>
+                <a16:creationId xmlns:a16="http://schemas.microsoft.com/office/drawing/2014/main" xmlns="" id="{5C2F2665-7610-FE49-89A1-2FCAD96F26C5}"/>
               </a:ext>
             </a:extLst>
           </p:cNvPr>
@@ -3458,7 +3458,7 @@
           <p:cNvPr id="2" name="Title Placeholder 1">
             <a:extLst>
               <a:ext uri="{FF2B5EF4-FFF2-40B4-BE49-F238E27FC236}">
-                <a16:creationId xmlns:a16="http://schemas.microsoft.com/office/drawing/2014/main" id="{2A61EC0F-0D06-504A-B8F3-F16DF6B78708}"/>
+                <a16:creationId xmlns:a16="http://schemas.microsoft.com/office/drawing/2014/main" xmlns="" id="{2A61EC0F-0D06-504A-B8F3-F16DF6B78708}"/>
               </a:ext>
             </a:extLst>
           </p:cNvPr>
@@ -3496,7 +3496,7 @@
           <p:cNvPr id="3" name="Text Placeholder 2">
             <a:extLst>
               <a:ext uri="{FF2B5EF4-FFF2-40B4-BE49-F238E27FC236}">
-                <a16:creationId xmlns:a16="http://schemas.microsoft.com/office/drawing/2014/main" id="{C416D925-797B-4D4D-9D11-F828996DC359}"/>
+                <a16:creationId xmlns:a16="http://schemas.microsoft.com/office/drawing/2014/main" xmlns="" id="{C416D925-797B-4D4D-9D11-F828996DC359}"/>
               </a:ext>
             </a:extLst>
           </p:cNvPr>
@@ -3563,7 +3563,7 @@
           <p:cNvPr id="4" name="Date Placeholder 3">
             <a:extLst>
               <a:ext uri="{FF2B5EF4-FFF2-40B4-BE49-F238E27FC236}">
-                <a16:creationId xmlns:a16="http://schemas.microsoft.com/office/drawing/2014/main" id="{9E327E55-8ECA-F645-9D4E-6B73BB82DD37}"/>
+                <a16:creationId xmlns:a16="http://schemas.microsoft.com/office/drawing/2014/main" xmlns="" id="{9E327E55-8ECA-F645-9D4E-6B73BB82DD37}"/>
               </a:ext>
             </a:extLst>
           </p:cNvPr>
@@ -3599,7 +3599,7 @@
           <a:p>
             <a:fld id="{D410641E-BA88-BE47-8EA7-CB068B6AAA79}" type="datetimeFigureOut">
               <a:rPr lang="en-US" smtClean="0"/>
-              <a:t>1/9/2022</a:t>
+              <a:t>1/10/2022</a:t>
             </a:fld>
             <a:endParaRPr lang="en-US"/>
           </a:p>
@@ -3610,7 +3610,7 @@
           <p:cNvPr id="5" name="Footer Placeholder 4">
             <a:extLst>
               <a:ext uri="{FF2B5EF4-FFF2-40B4-BE49-F238E27FC236}">
-                <a16:creationId xmlns:a16="http://schemas.microsoft.com/office/drawing/2014/main" id="{B710A558-09F3-FB44-9630-BE51B5B2B9AF}"/>
+                <a16:creationId xmlns:a16="http://schemas.microsoft.com/office/drawing/2014/main" xmlns="" id="{B710A558-09F3-FB44-9630-BE51B5B2B9AF}"/>
               </a:ext>
             </a:extLst>
           </p:cNvPr>
@@ -3653,7 +3653,7 @@
           <p:cNvPr id="6" name="Slide Number Placeholder 5">
             <a:extLst>
               <a:ext uri="{FF2B5EF4-FFF2-40B4-BE49-F238E27FC236}">
-                <a16:creationId xmlns:a16="http://schemas.microsoft.com/office/drawing/2014/main" id="{F18A6910-6D87-B549-BF0B-E41EC3389B7D}"/>
+                <a16:creationId xmlns:a16="http://schemas.microsoft.com/office/drawing/2014/main" xmlns="" id="{F18A6910-6D87-B549-BF0B-E41EC3389B7D}"/>
               </a:ext>
             </a:extLst>
           </p:cNvPr>
@@ -4029,10 +4029,10 @@
           <p:cNvPr id="50" name="Rectangle 49">
             <a:extLst>
               <a:ext uri="{FF2B5EF4-FFF2-40B4-BE49-F238E27FC236}">
-                <a16:creationId xmlns:a16="http://schemas.microsoft.com/office/drawing/2014/main" id="{0E91F5CA-B392-444C-88E3-BF5BAAEBDEB0}"/>
+                <a16:creationId xmlns:a16="http://schemas.microsoft.com/office/drawing/2014/main" xmlns="" id="{0E91F5CA-B392-444C-88E3-BF5BAAEBDEB0}"/>
               </a:ext>
               <a:ext uri="{C183D7F6-B498-43B3-948B-1728B52AA6E4}">
-                <adec:decorative xmlns:adec="http://schemas.microsoft.com/office/drawing/2017/decorative" val="1"/>
+                <adec:decorative xmlns:adec="http://schemas.microsoft.com/office/drawing/2017/decorative" xmlns="" val="1"/>
               </a:ext>
             </a:extLst>
           </p:cNvPr>
@@ -4042,7 +4042,7 @@
           <p:nvPr>
             <p:extLst>
               <p:ext uri="{386F3935-93C4-4BCD-93E2-E3B085C9AB24}">
-                <p16:designElem xmlns:p16="http://schemas.microsoft.com/office/powerpoint/2015/main" val="1"/>
+                <p16:designElem xmlns:p16="http://schemas.microsoft.com/office/powerpoint/2015/main" xmlns="" val="1"/>
               </p:ext>
             </p:extLst>
           </p:nvPr>
@@ -4107,7 +4107,7 @@
           <p:cNvPr id="2" name="Title 1">
             <a:extLst>
               <a:ext uri="{FF2B5EF4-FFF2-40B4-BE49-F238E27FC236}">
-                <a16:creationId xmlns:a16="http://schemas.microsoft.com/office/drawing/2014/main" id="{B8456828-2028-8C44-99BB-7273D828BDF2}"/>
+                <a16:creationId xmlns:a16="http://schemas.microsoft.com/office/drawing/2014/main" xmlns="" id="{B8456828-2028-8C44-99BB-7273D828BDF2}"/>
               </a:ext>
             </a:extLst>
           </p:cNvPr>
@@ -4120,8 +4120,8 @@
         </p:nvSpPr>
         <p:spPr>
           <a:xfrm>
-            <a:off x="5917640" y="1689339"/>
-            <a:ext cx="5777019" cy="1373216"/>
+            <a:off x="5917640" y="978195"/>
+            <a:ext cx="5777019" cy="2084360"/>
           </a:xfrm>
         </p:spPr>
         <p:txBody>
@@ -4170,7 +4170,7 @@
           <p:cNvPr id="3" name="Subtitle 2">
             <a:extLst>
               <a:ext uri="{FF2B5EF4-FFF2-40B4-BE49-F238E27FC236}">
-                <a16:creationId xmlns:a16="http://schemas.microsoft.com/office/drawing/2014/main" id="{1FBA87C5-F535-134C-ACE5-21720C0B25C9}"/>
+                <a16:creationId xmlns:a16="http://schemas.microsoft.com/office/drawing/2014/main" xmlns="" id="{1FBA87C5-F535-134C-ACE5-21720C0B25C9}"/>
               </a:ext>
             </a:extLst>
           </p:cNvPr>
@@ -4255,26 +4255,56 @@
       </p:pic>
       <p:pic>
         <p:nvPicPr>
-          <p:cNvPr id="8" name="Picture 7"/>
+          <p:cNvPr id="1026" name="Picture 2"/>
           <p:cNvPicPr>
-            <a:picLocks noChangeAspect="1"/>
+            <a:picLocks noChangeAspect="1" noChangeArrowheads="1"/>
           </p:cNvPicPr>
           <p:nvPr/>
         </p:nvPicPr>
         <p:blipFill>
-          <a:blip r:embed="rId4"/>
+          <a:blip r:embed="rId4">
+            <a:extLst>
+              <a:ext uri="{28A0092B-C50C-407E-A947-70E740481C1C}">
+                <a14:useLocalDpi xmlns:a14="http://schemas.microsoft.com/office/drawing/2010/main" val="0"/>
+              </a:ext>
+            </a:extLst>
+          </a:blip>
+          <a:srcRect/>
           <a:stretch>
             <a:fillRect/>
           </a:stretch>
         </p:blipFill>
-        <p:spPr>
+        <p:spPr bwMode="auto">
           <a:xfrm>
-            <a:off x="263099" y="1570813"/>
-            <a:ext cx="5668590" cy="3716374"/>
+            <a:off x="755689" y="2642192"/>
+            <a:ext cx="5448137" cy="3583328"/>
           </a:xfrm>
           <a:prstGeom prst="rect">
             <a:avLst/>
           </a:prstGeom>
+          <a:noFill/>
+          <a:ln>
+            <a:noFill/>
+          </a:ln>
+          <a:extLst>
+            <a:ext uri="{909E8E84-426E-40DD-AFC4-6F175D3DCCD1}">
+              <a14:hiddenFill xmlns:a14="http://schemas.microsoft.com/office/drawing/2010/main">
+                <a:solidFill>
+                  <a:srgbClr val="FFFFFF"/>
+                </a:solidFill>
+              </a14:hiddenFill>
+            </a:ext>
+            <a:ext uri="{91240B29-F687-4F45-9708-019B960494DF}">
+              <a14:hiddenLine xmlns:a14="http://schemas.microsoft.com/office/drawing/2010/main" w="9525">
+                <a:solidFill>
+                  <a:srgbClr val="000000"/>
+                </a:solidFill>
+                <a:miter lim="800000"/>
+                <a:headEnd/>
+                <a:tailEnd/>
+              </a14:hiddenLine>
+            </a:ext>
+          </a:extLst>
         </p:spPr>
       </p:pic>
     </p:spTree>
@@ -4772,7 +4802,7 @@
           <p:cNvPr id="2" name="Title 1">
             <a:extLst>
               <a:ext uri="{FF2B5EF4-FFF2-40B4-BE49-F238E27FC236}">
-                <a16:creationId xmlns:a16="http://schemas.microsoft.com/office/drawing/2014/main" id="{5C962C17-64BB-41A3-A446-195A0D2F5385}"/>
+                <a16:creationId xmlns:a16="http://schemas.microsoft.com/office/drawing/2014/main" xmlns="" id="{5C962C17-64BB-41A3-A446-195A0D2F5385}"/>
               </a:ext>
             </a:extLst>
           </p:cNvPr>
@@ -4806,7 +4836,7 @@
           <p:cNvPr id="3" name="Content Placeholder 2">
             <a:extLst>
               <a:ext uri="{FF2B5EF4-FFF2-40B4-BE49-F238E27FC236}">
-                <a16:creationId xmlns:a16="http://schemas.microsoft.com/office/drawing/2014/main" id="{B782E71C-8A69-44DF-8927-990696A5E80E}"/>
+                <a16:creationId xmlns:a16="http://schemas.microsoft.com/office/drawing/2014/main" xmlns="" id="{B782E71C-8A69-44DF-8927-990696A5E80E}"/>
               </a:ext>
             </a:extLst>
           </p:cNvPr>
@@ -5507,10 +5537,10 @@
           <p:cNvPr id="33" name="Rectangle 32">
             <a:extLst>
               <a:ext uri="{FF2B5EF4-FFF2-40B4-BE49-F238E27FC236}">
-                <a16:creationId xmlns:a16="http://schemas.microsoft.com/office/drawing/2014/main" id="{90D01200-0224-43C5-AB38-FB4D16B73FB7}"/>
+                <a16:creationId xmlns:a16="http://schemas.microsoft.com/office/drawing/2014/main" xmlns="" id="{90D01200-0224-43C5-AB38-FB4D16B73FB7}"/>
               </a:ext>
               <a:ext uri="{C183D7F6-B498-43B3-948B-1728B52AA6E4}">
-                <adec:decorative xmlns:adec="http://schemas.microsoft.com/office/drawing/2017/decorative" val="1"/>
+                <adec:decorative xmlns:adec="http://schemas.microsoft.com/office/drawing/2017/decorative" xmlns="" val="1"/>
               </a:ext>
             </a:extLst>
           </p:cNvPr>
@@ -5520,7 +5550,7 @@
           <p:nvPr>
             <p:extLst>
               <p:ext uri="{386F3935-93C4-4BCD-93E2-E3B085C9AB24}">
-                <p16:designElem xmlns:p16="http://schemas.microsoft.com/office/powerpoint/2015/main" val="1"/>
+                <p16:designElem xmlns:p16="http://schemas.microsoft.com/office/powerpoint/2015/main" xmlns="" val="1"/>
               </p:ext>
             </p:extLst>
           </p:nvPr>
@@ -5567,7 +5597,7 @@
           <p:cNvPr id="2" name="Title 1">
             <a:extLst>
               <a:ext uri="{FF2B5EF4-FFF2-40B4-BE49-F238E27FC236}">
-                <a16:creationId xmlns:a16="http://schemas.microsoft.com/office/drawing/2014/main" id="{CD749DA5-5A53-884D-85A8-03EA64B2BBDA}"/>
+                <a16:creationId xmlns:a16="http://schemas.microsoft.com/office/drawing/2014/main" xmlns="" id="{CD749DA5-5A53-884D-85A8-03EA64B2BBDA}"/>
               </a:ext>
             </a:extLst>
           </p:cNvPr>
@@ -5709,10 +5739,10 @@
           <p:cNvPr id="33" name="Rectangle 32">
             <a:extLst>
               <a:ext uri="{FF2B5EF4-FFF2-40B4-BE49-F238E27FC236}">
-                <a16:creationId xmlns:a16="http://schemas.microsoft.com/office/drawing/2014/main" id="{90D01200-0224-43C5-AB38-FB4D16B73FB7}"/>
+                <a16:creationId xmlns:a16="http://schemas.microsoft.com/office/drawing/2014/main" xmlns="" id="{90D01200-0224-43C5-AB38-FB4D16B73FB7}"/>
               </a:ext>
               <a:ext uri="{C183D7F6-B498-43B3-948B-1728B52AA6E4}">
-                <adec:decorative xmlns:adec="http://schemas.microsoft.com/office/drawing/2017/decorative" val="1"/>
+                <adec:decorative xmlns:adec="http://schemas.microsoft.com/office/drawing/2017/decorative" xmlns="" val="1"/>
               </a:ext>
             </a:extLst>
           </p:cNvPr>
@@ -5722,7 +5752,7 @@
           <p:nvPr>
             <p:extLst>
               <p:ext uri="{386F3935-93C4-4BCD-93E2-E3B085C9AB24}">
-                <p16:designElem xmlns:p16="http://schemas.microsoft.com/office/powerpoint/2015/main" val="1"/>
+                <p16:designElem xmlns:p16="http://schemas.microsoft.com/office/powerpoint/2015/main" xmlns="" val="1"/>
               </p:ext>
             </p:extLst>
           </p:nvPr>
@@ -5769,7 +5799,7 @@
           <p:cNvPr id="2" name="Title 1">
             <a:extLst>
               <a:ext uri="{FF2B5EF4-FFF2-40B4-BE49-F238E27FC236}">
-                <a16:creationId xmlns:a16="http://schemas.microsoft.com/office/drawing/2014/main" id="{CD749DA5-5A53-884D-85A8-03EA64B2BBDA}"/>
+                <a16:creationId xmlns:a16="http://schemas.microsoft.com/office/drawing/2014/main" xmlns="" id="{CD749DA5-5A53-884D-85A8-03EA64B2BBDA}"/>
               </a:ext>
             </a:extLst>
           </p:cNvPr>
@@ -5898,7 +5928,7 @@
           <p:cNvPr id="7" name="Content Placeholder 2">
             <a:extLst>
               <a:ext uri="{FF2B5EF4-FFF2-40B4-BE49-F238E27FC236}">
-                <a16:creationId xmlns:a16="http://schemas.microsoft.com/office/drawing/2014/main" id="{01CAC563-2271-494F-B958-B3DE858CF9D9}"/>
+                <a16:creationId xmlns:a16="http://schemas.microsoft.com/office/drawing/2014/main" xmlns="" id="{01CAC563-2271-494F-B958-B3DE858CF9D9}"/>
               </a:ext>
             </a:extLst>
           </p:cNvPr>

</xml_diff>

<commit_message>
Change About me to background about me
</commit_message>
<xml_diff>
--- a/Know the Signs_When and How to Talk about Drugs.pptx
+++ b/Know the Signs_When and How to Talk about Drugs.pptx
@@ -6840,13 +6840,22 @@
           <a:lstStyle/>
           <a:p>
             <a:r>
+              <a:rPr lang="en-US" sz="4800" b="1">
+                <a:solidFill>
+                  <a:schemeClr val="tx2"/>
+                </a:solidFill>
+                <a:latin typeface="Montserrat" panose="02000505000000020004" pitchFamily="2" charset="0"/>
+              </a:rPr>
+              <a:t>Background About </a:t>
+            </a:r>
+            <a:r>
               <a:rPr lang="en-US" sz="4800" b="1" dirty="0">
                 <a:solidFill>
                   <a:schemeClr val="tx2"/>
                 </a:solidFill>
                 <a:latin typeface="Montserrat" panose="02000505000000020004" pitchFamily="2" charset="0"/>
               </a:rPr>
-              <a:t>About Me</a:t>
+              <a:t>Me</a:t>
             </a:r>
           </a:p>
         </p:txBody>

</xml_diff>